<commit_message>
update on rendering workflow
</commit_message>
<xml_diff>
--- a/docs/React & Redux.pptx
+++ b/docs/React & Redux.pptx
@@ -5,20 +5,21 @@
     <p:sldMasterId id="2147483648" r:id="rId1"/>
   </p:sldMasterIdLst>
   <p:notesMasterIdLst>
-    <p:notesMasterId r:id="rId13"/>
+    <p:notesMasterId r:id="rId14"/>
   </p:notesMasterIdLst>
   <p:sldIdLst>
     <p:sldId id="256" r:id="rId2"/>
-    <p:sldId id="257" r:id="rId3"/>
-    <p:sldId id="258" r:id="rId4"/>
-    <p:sldId id="259" r:id="rId5"/>
-    <p:sldId id="260" r:id="rId6"/>
-    <p:sldId id="266" r:id="rId7"/>
-    <p:sldId id="267" r:id="rId8"/>
-    <p:sldId id="261" r:id="rId9"/>
-    <p:sldId id="264" r:id="rId10"/>
-    <p:sldId id="262" r:id="rId11"/>
-    <p:sldId id="263" r:id="rId12"/>
+    <p:sldId id="268" r:id="rId3"/>
+    <p:sldId id="257" r:id="rId4"/>
+    <p:sldId id="258" r:id="rId5"/>
+    <p:sldId id="259" r:id="rId6"/>
+    <p:sldId id="260" r:id="rId7"/>
+    <p:sldId id="266" r:id="rId8"/>
+    <p:sldId id="267" r:id="rId9"/>
+    <p:sldId id="261" r:id="rId10"/>
+    <p:sldId id="264" r:id="rId11"/>
+    <p:sldId id="262" r:id="rId12"/>
+    <p:sldId id="263" r:id="rId13"/>
   </p:sldIdLst>
   <p:sldSz cx="12192000" cy="6858000"/>
   <p:notesSz cx="6858000" cy="9144000"/>
@@ -119,10 +120,11 @@
   </p:defaultTextStyle>
   <p:extLst>
     <p:ext uri="{521415D9-36F7-43E2-AB2F-B90AF26B5E84}">
-      <p14:sectionLst xmlns:p14="http://schemas.microsoft.com/office/powerpoint/2010/main" xmlns="">
+      <p14:sectionLst xmlns:p14="http://schemas.microsoft.com/office/powerpoint/2010/main">
         <p14:section name="Default Section" id="{38AEF286-1107-4392-A940-F023FF97C08A}">
           <p14:sldIdLst>
             <p14:sldId id="256"/>
+            <p14:sldId id="268"/>
           </p14:sldIdLst>
         </p14:section>
         <p14:section name="React" id="{C7962A5D-700F-449E-94F7-7F59E464C259}">
@@ -131,6 +133,8 @@
             <p14:sldId id="258"/>
             <p14:sldId id="259"/>
             <p14:sldId id="260"/>
+            <p14:sldId id="266"/>
+            <p14:sldId id="267"/>
           </p14:sldIdLst>
         </p14:section>
         <p14:section name="Redux" id="{16342404-4B47-46E4-8E67-21489C16DD5A}">
@@ -150,6 +154,23 @@
           </p14:sldIdLst>
         </p14:section>
       </p14:sectionLst>
+    </p:ext>
+    <p:ext uri="{EFAFB233-063F-42B5-8137-9DF3F51BA10A}">
+      <p15:sldGuideLst xmlns:p15="http://schemas.microsoft.com/office/powerpoint/2012/main">
+        <p15:guide id="1" orient="horz" pos="2160">
+          <p15:clr>
+            <a:srgbClr val="A4A3A4"/>
+          </p15:clr>
+        </p15:guide>
+        <p15:guide id="2" pos="3840">
+          <p15:clr>
+            <a:srgbClr val="A4A3A4"/>
+          </p15:clr>
+        </p15:guide>
+      </p15:sldGuideLst>
+    </p:ext>
+    <p:ext uri="{2D200454-40CA-4A62-9FC3-DE9A4176ACB9}">
+      <p15:notesGuideLst xmlns:p15="http://schemas.microsoft.com/office/powerpoint/2012/main"/>
     </p:ext>
   </p:extLst>
 </p:presentation>
@@ -238,7 +259,7 @@
             <a:fld id="{68F520A5-0AD6-418C-8F4A-9FB003B35E28}" type="datetimeFigureOut">
               <a:rPr lang="fr-FR" smtClean="0"/>
               <a:pPr/>
-              <a:t>27/02/2017</a:t>
+              <a:t>10/03/2017</a:t>
             </a:fld>
             <a:endParaRPr lang="fr-FR"/>
           </a:p>
@@ -398,7 +419,7 @@
             <a:fld id="{BEBDC360-122B-48B3-A8C4-3D87876233B6}" type="slidenum">
               <a:rPr lang="fr-FR" smtClean="0"/>
               <a:pPr/>
-              <a:t>‹N°›</a:t>
+              <a:t>‹#›</a:t>
             </a:fld>
             <a:endParaRPr lang="fr-FR"/>
           </a:p>
@@ -407,7 +428,7 @@
     </p:spTree>
     <p:extLst>
       <p:ext uri="{BB962C8B-B14F-4D97-AF65-F5344CB8AC3E}">
-        <p14:creationId xmlns:p14="http://schemas.microsoft.com/office/powerpoint/2010/main" xmlns="" val="713127464"/>
+        <p14:creationId xmlns:p14="http://schemas.microsoft.com/office/powerpoint/2010/main" val="713127464"/>
       </p:ext>
     </p:extLst>
   </p:cSld>
@@ -573,7 +594,7 @@
             <a:fld id="{BEBDC360-122B-48B3-A8C4-3D87876233B6}" type="slidenum">
               <a:rPr lang="fr-FR" smtClean="0"/>
               <a:pPr/>
-              <a:t>2</a:t>
+              <a:t>3</a:t>
             </a:fld>
             <a:endParaRPr lang="fr-FR"/>
           </a:p>
@@ -582,7 +603,7 @@
     </p:spTree>
     <p:extLst>
       <p:ext uri="{BB962C8B-B14F-4D97-AF65-F5344CB8AC3E}">
-        <p14:creationId xmlns:p14="http://schemas.microsoft.com/office/powerpoint/2010/main" xmlns="" val="3739366414"/>
+        <p14:creationId xmlns:p14="http://schemas.microsoft.com/office/powerpoint/2010/main" val="3739366414"/>
       </p:ext>
     </p:extLst>
   </p:cSld>
@@ -621,7 +642,7 @@
           <a:blip r:embed="rId2" cstate="print">
             <a:extLst>
               <a:ext uri="{28A0092B-C50C-407E-A947-70E740481C1C}">
-                <a14:useLocalDpi xmlns:a14="http://schemas.microsoft.com/office/drawing/2010/main" xmlns="" val="0"/>
+                <a14:useLocalDpi xmlns:a14="http://schemas.microsoft.com/office/drawing/2010/main" val="0"/>
               </a:ext>
             </a:extLst>
           </a:blip>
@@ -804,7 +825,7 @@
             <a:fld id="{44139E8D-6066-4080-AC46-DB89673BFC8E}" type="slidenum">
               <a:rPr lang="fr-FR" smtClean="0"/>
               <a:pPr/>
-              <a:t>‹N°›</a:t>
+              <a:t>‹#›</a:t>
             </a:fld>
             <a:endParaRPr lang="fr-FR"/>
           </a:p>
@@ -813,7 +834,7 @@
     </p:spTree>
     <p:extLst>
       <p:ext uri="{BB962C8B-B14F-4D97-AF65-F5344CB8AC3E}">
-        <p14:creationId xmlns:p14="http://schemas.microsoft.com/office/powerpoint/2010/main" xmlns="" val="2394847408"/>
+        <p14:creationId xmlns:p14="http://schemas.microsoft.com/office/powerpoint/2010/main" val="2394847408"/>
       </p:ext>
     </p:extLst>
   </p:cSld>
@@ -986,7 +1007,7 @@
             <a:fld id="{44139E8D-6066-4080-AC46-DB89673BFC8E}" type="slidenum">
               <a:rPr lang="fr-FR" smtClean="0"/>
               <a:pPr/>
-              <a:t>‹N°›</a:t>
+              <a:t>‹#›</a:t>
             </a:fld>
             <a:endParaRPr lang="fr-FR"/>
           </a:p>
@@ -995,7 +1016,7 @@
     </p:spTree>
     <p:extLst>
       <p:ext uri="{BB962C8B-B14F-4D97-AF65-F5344CB8AC3E}">
-        <p14:creationId xmlns:p14="http://schemas.microsoft.com/office/powerpoint/2010/main" xmlns="" val="2354828228"/>
+        <p14:creationId xmlns:p14="http://schemas.microsoft.com/office/powerpoint/2010/main" val="2354828228"/>
       </p:ext>
     </p:extLst>
   </p:cSld>
@@ -1171,7 +1192,7 @@
             <a:fld id="{44139E8D-6066-4080-AC46-DB89673BFC8E}" type="slidenum">
               <a:rPr lang="fr-FR" smtClean="0"/>
               <a:pPr/>
-              <a:t>‹N°›</a:t>
+              <a:t>‹#›</a:t>
             </a:fld>
             <a:endParaRPr lang="fr-FR"/>
           </a:p>
@@ -1180,7 +1201,7 @@
     </p:spTree>
     <p:extLst>
       <p:ext uri="{BB962C8B-B14F-4D97-AF65-F5344CB8AC3E}">
-        <p14:creationId xmlns:p14="http://schemas.microsoft.com/office/powerpoint/2010/main" xmlns="" val="449464392"/>
+        <p14:creationId xmlns:p14="http://schemas.microsoft.com/office/powerpoint/2010/main" val="449464392"/>
       </p:ext>
     </p:extLst>
   </p:cSld>
@@ -1390,7 +1411,7 @@
             <a:fld id="{44139E8D-6066-4080-AC46-DB89673BFC8E}" type="slidenum">
               <a:rPr lang="fr-FR" smtClean="0"/>
               <a:pPr/>
-              <a:t>‹N°›</a:t>
+              <a:t>‹#›</a:t>
             </a:fld>
             <a:endParaRPr lang="fr-FR"/>
           </a:p>
@@ -1399,7 +1420,7 @@
     </p:spTree>
     <p:extLst>
       <p:ext uri="{BB962C8B-B14F-4D97-AF65-F5344CB8AC3E}">
-        <p14:creationId xmlns:p14="http://schemas.microsoft.com/office/powerpoint/2010/main" xmlns="" val="2540995877"/>
+        <p14:creationId xmlns:p14="http://schemas.microsoft.com/office/powerpoint/2010/main" val="2540995877"/>
       </p:ext>
     </p:extLst>
   </p:cSld>
@@ -1681,7 +1702,7 @@
             <a:fld id="{44139E8D-6066-4080-AC46-DB89673BFC8E}" type="slidenum">
               <a:rPr lang="fr-FR" smtClean="0"/>
               <a:pPr/>
-              <a:t>‹N°›</a:t>
+              <a:t>‹#›</a:t>
             </a:fld>
             <a:endParaRPr lang="fr-FR"/>
           </a:p>
@@ -1690,7 +1711,7 @@
     </p:spTree>
     <p:extLst>
       <p:ext uri="{BB962C8B-B14F-4D97-AF65-F5344CB8AC3E}">
-        <p14:creationId xmlns:p14="http://schemas.microsoft.com/office/powerpoint/2010/main" xmlns="" val="658130668"/>
+        <p14:creationId xmlns:p14="http://schemas.microsoft.com/office/powerpoint/2010/main" val="658130668"/>
       </p:ext>
     </p:extLst>
   </p:cSld>
@@ -1965,7 +1986,7 @@
             <a:fld id="{44139E8D-6066-4080-AC46-DB89673BFC8E}" type="slidenum">
               <a:rPr lang="fr-FR" smtClean="0"/>
               <a:pPr/>
-              <a:t>‹N°›</a:t>
+              <a:t>‹#›</a:t>
             </a:fld>
             <a:endParaRPr lang="fr-FR"/>
           </a:p>
@@ -1974,7 +1995,7 @@
     </p:spTree>
     <p:extLst>
       <p:ext uri="{BB962C8B-B14F-4D97-AF65-F5344CB8AC3E}">
-        <p14:creationId xmlns:p14="http://schemas.microsoft.com/office/powerpoint/2010/main" xmlns="" val="3650240110"/>
+        <p14:creationId xmlns:p14="http://schemas.microsoft.com/office/powerpoint/2010/main" val="3650240110"/>
       </p:ext>
     </p:extLst>
   </p:cSld>
@@ -2379,7 +2400,7 @@
             <a:fld id="{44139E8D-6066-4080-AC46-DB89673BFC8E}" type="slidenum">
               <a:rPr lang="fr-FR" smtClean="0"/>
               <a:pPr/>
-              <a:t>‹N°›</a:t>
+              <a:t>‹#›</a:t>
             </a:fld>
             <a:endParaRPr lang="fr-FR"/>
           </a:p>
@@ -2388,7 +2409,7 @@
     </p:spTree>
     <p:extLst>
       <p:ext uri="{BB962C8B-B14F-4D97-AF65-F5344CB8AC3E}">
-        <p14:creationId xmlns:p14="http://schemas.microsoft.com/office/powerpoint/2010/main" xmlns="" val="2798887854"/>
+        <p14:creationId xmlns:p14="http://schemas.microsoft.com/office/powerpoint/2010/main" val="2798887854"/>
       </p:ext>
     </p:extLst>
   </p:cSld>
@@ -2549,7 +2570,7 @@
             <a:fld id="{44139E8D-6066-4080-AC46-DB89673BFC8E}" type="slidenum">
               <a:rPr lang="fr-FR" smtClean="0"/>
               <a:pPr/>
-              <a:t>‹N°›</a:t>
+              <a:t>‹#›</a:t>
             </a:fld>
             <a:endParaRPr lang="fr-FR"/>
           </a:p>
@@ -2558,7 +2579,7 @@
     </p:spTree>
     <p:extLst>
       <p:ext uri="{BB962C8B-B14F-4D97-AF65-F5344CB8AC3E}">
-        <p14:creationId xmlns:p14="http://schemas.microsoft.com/office/powerpoint/2010/main" xmlns="" val="1141629464"/>
+        <p14:creationId xmlns:p14="http://schemas.microsoft.com/office/powerpoint/2010/main" val="1141629464"/>
       </p:ext>
     </p:extLst>
   </p:cSld>
@@ -2656,7 +2677,7 @@
             <a:fld id="{44139E8D-6066-4080-AC46-DB89673BFC8E}" type="slidenum">
               <a:rPr lang="fr-FR" smtClean="0"/>
               <a:pPr/>
-              <a:t>‹N°›</a:t>
+              <a:t>‹#›</a:t>
             </a:fld>
             <a:endParaRPr lang="fr-FR"/>
           </a:p>
@@ -2665,7 +2686,7 @@
     </p:spTree>
     <p:extLst>
       <p:ext uri="{BB962C8B-B14F-4D97-AF65-F5344CB8AC3E}">
-        <p14:creationId xmlns:p14="http://schemas.microsoft.com/office/powerpoint/2010/main" xmlns="" val="1467798435"/>
+        <p14:creationId xmlns:p14="http://schemas.microsoft.com/office/powerpoint/2010/main" val="1467798435"/>
       </p:ext>
     </p:extLst>
   </p:cSld>
@@ -2945,7 +2966,7 @@
             <a:fld id="{44139E8D-6066-4080-AC46-DB89673BFC8E}" type="slidenum">
               <a:rPr lang="fr-FR" smtClean="0"/>
               <a:pPr/>
-              <a:t>‹N°›</a:t>
+              <a:t>‹#›</a:t>
             </a:fld>
             <a:endParaRPr lang="fr-FR"/>
           </a:p>
@@ -2954,7 +2975,7 @@
     </p:spTree>
     <p:extLst>
       <p:ext uri="{BB962C8B-B14F-4D97-AF65-F5344CB8AC3E}">
-        <p14:creationId xmlns:p14="http://schemas.microsoft.com/office/powerpoint/2010/main" xmlns="" val="3610359101"/>
+        <p14:creationId xmlns:p14="http://schemas.microsoft.com/office/powerpoint/2010/main" val="3610359101"/>
       </p:ext>
     </p:extLst>
   </p:cSld>
@@ -3210,7 +3231,7 @@
             <a:fld id="{44139E8D-6066-4080-AC46-DB89673BFC8E}" type="slidenum">
               <a:rPr lang="fr-FR" smtClean="0"/>
               <a:pPr/>
-              <a:t>‹N°›</a:t>
+              <a:t>‹#›</a:t>
             </a:fld>
             <a:endParaRPr lang="fr-FR"/>
           </a:p>
@@ -3219,7 +3240,7 @@
     </p:spTree>
     <p:extLst>
       <p:ext uri="{BB962C8B-B14F-4D97-AF65-F5344CB8AC3E}">
-        <p14:creationId xmlns:p14="http://schemas.microsoft.com/office/powerpoint/2010/main" xmlns="" val="3433813898"/>
+        <p14:creationId xmlns:p14="http://schemas.microsoft.com/office/powerpoint/2010/main" val="3433813898"/>
       </p:ext>
     </p:extLst>
   </p:cSld>
@@ -3471,7 +3492,7 @@
             <a:fld id="{44139E8D-6066-4080-AC46-DB89673BFC8E}" type="slidenum">
               <a:rPr lang="fr-FR" smtClean="0"/>
               <a:pPr/>
-              <a:t>‹N°›</a:t>
+              <a:t>‹#›</a:t>
             </a:fld>
             <a:endParaRPr lang="fr-FR"/>
           </a:p>
@@ -3480,7 +3501,7 @@
     </p:spTree>
     <p:extLst>
       <p:ext uri="{BB962C8B-B14F-4D97-AF65-F5344CB8AC3E}">
-        <p14:creationId xmlns:p14="http://schemas.microsoft.com/office/powerpoint/2010/main" xmlns="" val="530832461"/>
+        <p14:creationId xmlns:p14="http://schemas.microsoft.com/office/powerpoint/2010/main" val="530832461"/>
       </p:ext>
     </p:extLst>
   </p:cSld>
@@ -3848,7 +3869,6 @@
               <a:rPr lang="en-US" dirty="0" smtClean="0"/>
               <a:t>Keep your head cool and focused, there’s a tons of stuff to see today</a:t>
             </a:r>
-            <a:endParaRPr lang="en-US" dirty="0" smtClean="0"/>
           </a:p>
           <a:p>
             <a:endParaRPr lang="en-US" dirty="0"/>
@@ -3865,7 +3885,7 @@
     </p:spTree>
     <p:extLst>
       <p:ext uri="{BB962C8B-B14F-4D97-AF65-F5344CB8AC3E}">
-        <p14:creationId xmlns:p14="http://schemas.microsoft.com/office/powerpoint/2010/main" xmlns="" val="1719999807"/>
+        <p14:creationId xmlns:p14="http://schemas.microsoft.com/office/powerpoint/2010/main" val="1719999807"/>
       </p:ext>
     </p:extLst>
   </p:cSld>
@@ -3901,7 +3921,7 @@
       </p:grpSpPr>
       <p:sp>
         <p:nvSpPr>
-          <p:cNvPr id="2" name="Title 1"/>
+          <p:cNvPr id="7" name="Title 6"/>
           <p:cNvSpPr>
             <a:spLocks noGrp="1"/>
           </p:cNvSpPr>
@@ -3914,34 +3934,26 @@
           <a:bodyPr/>
           <a:lstStyle/>
           <a:p>
-            <a:r>
-              <a:rPr lang="en-US" dirty="0" smtClean="0"/>
-              <a:t>React &amp; Redux</a:t>
-            </a:r>
-            <a:endParaRPr lang="fr-FR" dirty="0"/>
-          </a:p>
-        </p:txBody>
-      </p:sp>
-      <p:sp>
-        <p:nvSpPr>
-          <p:cNvPr id="3" name="Text Placeholder 2"/>
-          <p:cNvSpPr>
-            <a:spLocks noGrp="1"/>
-          </p:cNvSpPr>
-          <p:nvPr>
-            <p:ph type="body" idx="1"/>
-          </p:nvPr>
-        </p:nvSpPr>
-        <p:spPr/>
-        <p:txBody>
-          <a:bodyPr/>
-          <a:lstStyle/>
-          <a:p>
-            <a:r>
-              <a:rPr lang="en-US" dirty="0" smtClean="0"/>
-              <a:t>Rock &amp; Roll</a:t>
-            </a:r>
-            <a:endParaRPr lang="fr-FR" dirty="0"/>
+            <a:endParaRPr lang="fr-FR"/>
+          </a:p>
+        </p:txBody>
+      </p:sp>
+      <p:sp>
+        <p:nvSpPr>
+          <p:cNvPr id="8" name="Content Placeholder 7"/>
+          <p:cNvSpPr>
+            <a:spLocks noGrp="1"/>
+          </p:cNvSpPr>
+          <p:nvPr>
+            <p:ph idx="1"/>
+          </p:nvPr>
+        </p:nvSpPr>
+        <p:spPr/>
+        <p:txBody>
+          <a:bodyPr/>
+          <a:lstStyle/>
+          <a:p>
+            <a:endParaRPr lang="fr-FR"/>
           </a:p>
         </p:txBody>
       </p:sp>
@@ -3984,10 +3996,10 @@
           <a:lstStyle/>
           <a:p>
             <a:r>
-              <a:rPr lang="fr-FR" dirty="0" smtClean="0"/>
+              <a:rPr lang="fr-FR" smtClean="0"/>
               <a:t>cedric.hartland@gmail.com</a:t>
             </a:r>
-            <a:endParaRPr lang="fr-FR" dirty="0"/>
+            <a:endParaRPr lang="fr-FR"/>
           </a:p>
         </p:txBody>
       </p:sp>
@@ -4018,7 +4030,7 @@
     </p:spTree>
     <p:extLst>
       <p:ext uri="{BB962C8B-B14F-4D97-AF65-F5344CB8AC3E}">
-        <p14:creationId xmlns:p14="http://schemas.microsoft.com/office/powerpoint/2010/main" xmlns="" val="3691361"/>
+        <p14:creationId xmlns:p14="http://schemas.microsoft.com/office/powerpoint/2010/main" val="3916897931"/>
       </p:ext>
     </p:extLst>
   </p:cSld>
@@ -4069,7 +4081,7 @@
           <a:p>
             <a:r>
               <a:rPr lang="en-US" dirty="0" smtClean="0"/>
-              <a:t>Wait, there’s more</a:t>
+              <a:t>React &amp; Redux</a:t>
             </a:r>
             <a:endParaRPr lang="fr-FR" dirty="0"/>
           </a:p>
@@ -4092,7 +4104,7 @@
           <a:p>
             <a:r>
               <a:rPr lang="en-US" dirty="0" smtClean="0"/>
-              <a:t>Build, enhanced development process and how to test</a:t>
+              <a:t>Rock &amp; Roll</a:t>
             </a:r>
             <a:endParaRPr lang="fr-FR" dirty="0"/>
           </a:p>
@@ -4137,10 +4149,10 @@
           <a:lstStyle/>
           <a:p>
             <a:r>
-              <a:rPr lang="fr-FR" smtClean="0"/>
+              <a:rPr lang="fr-FR" dirty="0" smtClean="0"/>
               <a:t>cedric.hartland@gmail.com</a:t>
             </a:r>
-            <a:endParaRPr lang="fr-FR"/>
+            <a:endParaRPr lang="fr-FR" dirty="0"/>
           </a:p>
         </p:txBody>
       </p:sp>
@@ -4171,7 +4183,160 @@
     </p:spTree>
     <p:extLst>
       <p:ext uri="{BB962C8B-B14F-4D97-AF65-F5344CB8AC3E}">
-        <p14:creationId xmlns:p14="http://schemas.microsoft.com/office/powerpoint/2010/main" xmlns="" val="1940074127"/>
+        <p14:creationId xmlns:p14="http://schemas.microsoft.com/office/powerpoint/2010/main" val="3691361"/>
+      </p:ext>
+    </p:extLst>
+  </p:cSld>
+  <p:clrMapOvr>
+    <a:masterClrMapping/>
+  </p:clrMapOvr>
+  <p:timing>
+    <p:tnLst>
+      <p:par>
+        <p:cTn id="1" dur="indefinite" restart="never" nodeType="tmRoot"/>
+      </p:par>
+    </p:tnLst>
+  </p:timing>
+</p:sld>
+</file>
+
+<file path=ppt/slides/slide12.xml><?xml version="1.0" encoding="utf-8"?>
+<p:sld xmlns:a="http://schemas.openxmlformats.org/drawingml/2006/main" xmlns:r="http://schemas.openxmlformats.org/officeDocument/2006/relationships" xmlns:p="http://schemas.openxmlformats.org/presentationml/2006/main">
+  <p:cSld>
+    <p:spTree>
+      <p:nvGrpSpPr>
+        <p:cNvPr id="1" name=""/>
+        <p:cNvGrpSpPr/>
+        <p:nvPr/>
+      </p:nvGrpSpPr>
+      <p:grpSpPr>
+        <a:xfrm>
+          <a:off x="0" y="0"/>
+          <a:ext cx="0" cy="0"/>
+          <a:chOff x="0" y="0"/>
+          <a:chExt cx="0" cy="0"/>
+        </a:xfrm>
+      </p:grpSpPr>
+      <p:sp>
+        <p:nvSpPr>
+          <p:cNvPr id="2" name="Title 1"/>
+          <p:cNvSpPr>
+            <a:spLocks noGrp="1"/>
+          </p:cNvSpPr>
+          <p:nvPr>
+            <p:ph type="title"/>
+          </p:nvPr>
+        </p:nvSpPr>
+        <p:spPr/>
+        <p:txBody>
+          <a:bodyPr/>
+          <a:lstStyle/>
+          <a:p>
+            <a:r>
+              <a:rPr lang="en-US" dirty="0" smtClean="0"/>
+              <a:t>Wait, there’s more</a:t>
+            </a:r>
+            <a:endParaRPr lang="fr-FR" dirty="0"/>
+          </a:p>
+        </p:txBody>
+      </p:sp>
+      <p:sp>
+        <p:nvSpPr>
+          <p:cNvPr id="3" name="Text Placeholder 2"/>
+          <p:cNvSpPr>
+            <a:spLocks noGrp="1"/>
+          </p:cNvSpPr>
+          <p:nvPr>
+            <p:ph type="body" idx="1"/>
+          </p:nvPr>
+        </p:nvSpPr>
+        <p:spPr/>
+        <p:txBody>
+          <a:bodyPr/>
+          <a:lstStyle/>
+          <a:p>
+            <a:r>
+              <a:rPr lang="en-US" dirty="0" smtClean="0"/>
+              <a:t>Build, enhanced development process and how to test</a:t>
+            </a:r>
+            <a:endParaRPr lang="fr-FR" dirty="0"/>
+          </a:p>
+        </p:txBody>
+      </p:sp>
+      <p:sp>
+        <p:nvSpPr>
+          <p:cNvPr id="4" name="Date Placeholder 3"/>
+          <p:cNvSpPr>
+            <a:spLocks noGrp="1"/>
+          </p:cNvSpPr>
+          <p:nvPr>
+            <p:ph type="dt" sz="half" idx="10"/>
+          </p:nvPr>
+        </p:nvSpPr>
+        <p:spPr/>
+        <p:txBody>
+          <a:bodyPr/>
+          <a:lstStyle/>
+          <a:p>
+            <a:r>
+              <a:rPr lang="fr-FR" smtClean="0"/>
+              <a:t>2017</a:t>
+            </a:r>
+            <a:endParaRPr lang="fr-FR"/>
+          </a:p>
+        </p:txBody>
+      </p:sp>
+      <p:sp>
+        <p:nvSpPr>
+          <p:cNvPr id="5" name="Footer Placeholder 4"/>
+          <p:cNvSpPr>
+            <a:spLocks noGrp="1"/>
+          </p:cNvSpPr>
+          <p:nvPr>
+            <p:ph type="ftr" sz="quarter" idx="11"/>
+          </p:nvPr>
+        </p:nvSpPr>
+        <p:spPr/>
+        <p:txBody>
+          <a:bodyPr/>
+          <a:lstStyle/>
+          <a:p>
+            <a:r>
+              <a:rPr lang="fr-FR" smtClean="0"/>
+              <a:t>cedric.hartland@gmail.com</a:t>
+            </a:r>
+            <a:endParaRPr lang="fr-FR"/>
+          </a:p>
+        </p:txBody>
+      </p:sp>
+      <p:sp>
+        <p:nvSpPr>
+          <p:cNvPr id="6" name="Slide Number Placeholder 5"/>
+          <p:cNvSpPr>
+            <a:spLocks noGrp="1"/>
+          </p:cNvSpPr>
+          <p:nvPr>
+            <p:ph type="sldNum" sz="quarter" idx="12"/>
+          </p:nvPr>
+        </p:nvSpPr>
+        <p:spPr/>
+        <p:txBody>
+          <a:bodyPr/>
+          <a:lstStyle/>
+          <a:p>
+            <a:fld id="{44139E8D-6066-4080-AC46-DB89673BFC8E}" type="slidenum">
+              <a:rPr lang="fr-FR" smtClean="0"/>
+              <a:pPr/>
+              <a:t>12</a:t>
+            </a:fld>
+            <a:endParaRPr lang="fr-FR"/>
+          </a:p>
+        </p:txBody>
+      </p:sp>
+    </p:spTree>
+    <p:extLst>
+      <p:ext uri="{BB962C8B-B14F-4D97-AF65-F5344CB8AC3E}">
+        <p14:creationId xmlns:p14="http://schemas.microsoft.com/office/powerpoint/2010/main" val="1940074127"/>
       </p:ext>
     </p:extLst>
   </p:cSld>
@@ -4222,39 +4387,9 @@
           <a:p>
             <a:r>
               <a:rPr lang="en-US" dirty="0" smtClean="0"/>
-              <a:t>React – a gentle introduction</a:t>
+              <a:t>A project we’re targeting	</a:t>
             </a:r>
             <a:endParaRPr lang="fr-FR" dirty="0"/>
-          </a:p>
-        </p:txBody>
-      </p:sp>
-      <p:sp>
-        <p:nvSpPr>
-          <p:cNvPr id="3" name="Content Placeholder 2"/>
-          <p:cNvSpPr>
-            <a:spLocks noGrp="1"/>
-          </p:cNvSpPr>
-          <p:nvPr>
-            <p:ph type="body" idx="1"/>
-          </p:nvPr>
-        </p:nvSpPr>
-        <p:spPr/>
-        <p:txBody>
-          <a:bodyPr anchor="ctr"/>
-          <a:lstStyle/>
-          <a:p>
-            <a:pPr marL="0" indent="0" algn="ctr">
-              <a:buNone/>
-            </a:pPr>
-            <a:r>
-              <a:rPr lang="en-US" i="1" dirty="0" err="1" smtClean="0"/>
-              <a:t>Javascript</a:t>
-            </a:r>
-            <a:r>
-              <a:rPr lang="en-US" i="1" dirty="0" smtClean="0"/>
-              <a:t> library for building user interfaces</a:t>
-            </a:r>
-            <a:endParaRPr lang="fr-FR" i="1" dirty="0"/>
           </a:p>
         </p:txBody>
       </p:sp>
@@ -4328,23 +4463,40 @@
           </a:p>
         </p:txBody>
       </p:sp>
+      <p:pic>
+        <p:nvPicPr>
+          <p:cNvPr id="7" name="Picture 6"/>
+          <p:cNvPicPr>
+            <a:picLocks noChangeAspect="1"/>
+          </p:cNvPicPr>
+          <p:nvPr/>
+        </p:nvPicPr>
+        <p:blipFill>
+          <a:blip r:embed="rId2"/>
+          <a:stretch>
+            <a:fillRect/>
+          </a:stretch>
+        </p:blipFill>
+        <p:spPr>
+          <a:xfrm>
+            <a:off x="2069937" y="1404937"/>
+            <a:ext cx="8063343" cy="4772026"/>
+          </a:xfrm>
+          <a:prstGeom prst="rect">
+            <a:avLst/>
+          </a:prstGeom>
+        </p:spPr>
+      </p:pic>
     </p:spTree>
     <p:extLst>
       <p:ext uri="{BB962C8B-B14F-4D97-AF65-F5344CB8AC3E}">
-        <p14:creationId xmlns:p14="http://schemas.microsoft.com/office/powerpoint/2010/main" xmlns="" val="1106585189"/>
+        <p14:creationId xmlns:p14="http://schemas.microsoft.com/office/powerpoint/2010/main" val="1283000917"/>
       </p:ext>
     </p:extLst>
   </p:cSld>
   <p:clrMapOvr>
     <a:masterClrMapping/>
   </p:clrMapOvr>
-  <p:timing>
-    <p:tnLst>
-      <p:par>
-        <p:cTn id="1" dur="indefinite" restart="never" nodeType="tmRoot"/>
-      </p:par>
-    </p:tnLst>
-  </p:timing>
 </p:sld>
 </file>
 
@@ -4382,7 +4534,7 @@
           <a:p>
             <a:r>
               <a:rPr lang="en-US" dirty="0" smtClean="0"/>
-              <a:t>React – a less gentle introduction</a:t>
+              <a:t>React – a gentle introduction</a:t>
             </a:r>
             <a:endParaRPr lang="fr-FR" dirty="0"/>
           </a:p>
@@ -4395,196 +4547,26 @@
             <a:spLocks noGrp="1"/>
           </p:cNvSpPr>
           <p:nvPr>
-            <p:ph idx="1"/>
-          </p:nvPr>
-        </p:nvSpPr>
-        <p:spPr/>
-        <p:txBody>
-          <a:bodyPr>
-            <a:normAutofit/>
-          </a:bodyPr>
-          <a:lstStyle/>
-          <a:p>
-            <a:r>
-              <a:rPr lang="en-US" dirty="0" smtClean="0"/>
-              <a:t>Library that helps rendering views</a:t>
-            </a:r>
-          </a:p>
-          <a:p>
-            <a:pPr lvl="1"/>
-            <a:r>
-              <a:rPr lang="en-US" dirty="0" smtClean="0"/>
-              <a:t>In a declarative way</a:t>
-            </a:r>
-          </a:p>
-          <a:p>
-            <a:pPr lvl="2"/>
-            <a:r>
-              <a:rPr lang="en-US" dirty="0" smtClean="0"/>
-              <a:t>Given an application state, renders some DOM </a:t>
-            </a:r>
-            <a:endParaRPr lang="en-US" dirty="0" smtClean="0"/>
-          </a:p>
-          <a:p>
-            <a:pPr lvl="2"/>
-            <a:r>
-              <a:rPr lang="en-US" dirty="0" smtClean="0"/>
-              <a:t>It looks like backbone’s views, except that it’s not… </a:t>
-            </a:r>
-            <a:endParaRPr lang="en-US" dirty="0" smtClean="0"/>
-          </a:p>
-          <a:p>
-            <a:pPr lvl="2"/>
-            <a:r>
-              <a:rPr lang="en-US" dirty="0" smtClean="0"/>
-              <a:t>That’s almost all there is to know…</a:t>
-            </a:r>
-            <a:endParaRPr lang="en-US" dirty="0" smtClean="0">
-              <a:solidFill>
-                <a:schemeClr val="accent6"/>
-              </a:solidFill>
-            </a:endParaRPr>
-          </a:p>
-          <a:p>
-            <a:endParaRPr lang="en-US" dirty="0" smtClean="0"/>
-          </a:p>
-          <a:p>
-            <a:pPr lvl="1"/>
-            <a:r>
-              <a:rPr lang="en-US" dirty="0" smtClean="0"/>
-              <a:t>…besides</a:t>
-            </a:r>
-          </a:p>
-          <a:p>
-            <a:pPr lvl="2"/>
-            <a:r>
-              <a:rPr lang="en-US" dirty="0" smtClean="0"/>
-              <a:t>Brings componentization </a:t>
-            </a:r>
-            <a:r>
-              <a:rPr lang="en-US" sz="1400" dirty="0" smtClean="0">
-                <a:solidFill>
-                  <a:schemeClr val="accent6"/>
-                </a:solidFill>
-              </a:rPr>
-              <a:t>non standard web components approach</a:t>
-            </a:r>
-            <a:endParaRPr lang="en-US" dirty="0" smtClean="0"/>
-          </a:p>
-          <a:p>
-            <a:pPr lvl="3"/>
-            <a:r>
-              <a:rPr lang="en-US" dirty="0" smtClean="0"/>
-              <a:t>Optimized rendering workflow </a:t>
-            </a:r>
-            <a:r>
-              <a:rPr lang="en-US" sz="1400" dirty="0" smtClean="0">
-                <a:solidFill>
-                  <a:schemeClr val="accent6"/>
-                </a:solidFill>
-              </a:rPr>
-              <a:t>inspired from </a:t>
-            </a:r>
-            <a:r>
-              <a:rPr lang="en-US" sz="1400" dirty="0" smtClean="0">
-                <a:solidFill>
-                  <a:schemeClr val="accent6"/>
-                </a:solidFill>
-              </a:rPr>
-              <a:t>game </a:t>
-            </a:r>
-            <a:r>
-              <a:rPr lang="en-US" sz="1400" dirty="0" smtClean="0">
-                <a:solidFill>
-                  <a:schemeClr val="accent6"/>
-                </a:solidFill>
-              </a:rPr>
-              <a:t>engines</a:t>
-            </a:r>
-            <a:endParaRPr lang="en-US" dirty="0" smtClean="0">
-              <a:solidFill>
-                <a:schemeClr val="accent6"/>
-              </a:solidFill>
-            </a:endParaRPr>
-          </a:p>
-          <a:p>
-            <a:pPr lvl="2"/>
-            <a:r>
-              <a:rPr lang="en-US" dirty="0" smtClean="0"/>
-              <a:t>No framework like application structuration </a:t>
-            </a:r>
-          </a:p>
-          <a:p>
-            <a:pPr lvl="3"/>
-            <a:r>
-              <a:rPr lang="en-US" dirty="0" smtClean="0"/>
-              <a:t>Small and no assumptions </a:t>
-            </a:r>
-            <a:r>
-              <a:rPr lang="en-US" sz="1200" dirty="0" smtClean="0">
-                <a:solidFill>
-                  <a:schemeClr val="accent6"/>
-                </a:solidFill>
-              </a:rPr>
-              <a:t>can “easily” integrate with other technologies</a:t>
-            </a:r>
-            <a:endParaRPr lang="en-US" dirty="0" smtClean="0">
-              <a:solidFill>
-                <a:schemeClr val="accent6"/>
-              </a:solidFill>
-            </a:endParaRPr>
-          </a:p>
-          <a:p>
-            <a:pPr lvl="2"/>
-            <a:r>
-              <a:rPr lang="en-US" dirty="0" smtClean="0"/>
-              <a:t>Can render on server side </a:t>
-            </a:r>
-            <a:r>
-              <a:rPr lang="en-US" sz="1400" dirty="0" smtClean="0">
-                <a:solidFill>
-                  <a:schemeClr val="accent6"/>
-                </a:solidFill>
-              </a:rPr>
-              <a:t>SEO please</a:t>
-            </a:r>
-            <a:endParaRPr lang="en-US" dirty="0" smtClean="0">
-              <a:solidFill>
-                <a:schemeClr val="accent6"/>
-              </a:solidFill>
-            </a:endParaRPr>
-          </a:p>
-          <a:p>
-            <a:pPr lvl="2"/>
-            <a:r>
-              <a:rPr lang="en-US" dirty="0" smtClean="0"/>
-              <a:t>Comes with ES2016 </a:t>
-            </a:r>
-            <a:r>
-              <a:rPr lang="en-US" dirty="0" smtClean="0">
-                <a:solidFill>
-                  <a:schemeClr val="accent1"/>
-                </a:solidFill>
-              </a:rPr>
-              <a:t>JSX</a:t>
-            </a:r>
-            <a:r>
-              <a:rPr lang="en-US" dirty="0" smtClean="0"/>
-              <a:t> update </a:t>
-            </a:r>
-            <a:r>
-              <a:rPr lang="en-US" sz="1400" dirty="0" smtClean="0">
-                <a:solidFill>
-                  <a:schemeClr val="accent6"/>
-                </a:solidFill>
-              </a:rPr>
-              <a:t>JavaScript with Xml…</a:t>
-            </a:r>
-            <a:endParaRPr lang="fr-FR" dirty="0">
-              <a:solidFill>
-                <a:schemeClr val="accent6"/>
-              </a:solidFill>
-            </a:endParaRPr>
+            <p:ph type="body" idx="1"/>
+          </p:nvPr>
+        </p:nvSpPr>
+        <p:spPr/>
+        <p:txBody>
+          <a:bodyPr anchor="ctr"/>
+          <a:lstStyle/>
+          <a:p>
+            <a:pPr marL="0" indent="0" algn="ctr">
+              <a:buNone/>
+            </a:pPr>
+            <a:r>
+              <a:rPr lang="en-US" i="1" dirty="0" err="1" smtClean="0"/>
+              <a:t>Javascript</a:t>
+            </a:r>
+            <a:r>
+              <a:rPr lang="en-US" i="1" dirty="0" smtClean="0"/>
+              <a:t> library for building user interfaces</a:t>
+            </a:r>
+            <a:endParaRPr lang="fr-FR" i="1" dirty="0"/>
           </a:p>
         </p:txBody>
       </p:sp>
@@ -4661,7 +4643,7 @@
     </p:spTree>
     <p:extLst>
       <p:ext uri="{BB962C8B-B14F-4D97-AF65-F5344CB8AC3E}">
-        <p14:creationId xmlns:p14="http://schemas.microsoft.com/office/powerpoint/2010/main" xmlns="" val="604540945"/>
+        <p14:creationId xmlns:p14="http://schemas.microsoft.com/office/powerpoint/2010/main" val="1106585189"/>
       </p:ext>
     </p:extLst>
   </p:cSld>
@@ -4712,7 +4694,11 @@
           <a:p>
             <a:r>
               <a:rPr lang="en-US" dirty="0" smtClean="0"/>
-              <a:t>React – what’s actually good in it ?</a:t>
+              <a:t>React – a </a:t>
+            </a:r>
+            <a:r>
+              <a:rPr lang="en-US" dirty="0" smtClean="0"/>
+              <a:t>library that defines views through components</a:t>
             </a:r>
             <a:endParaRPr lang="fr-FR" dirty="0"/>
           </a:p>
@@ -4730,38 +4716,44 @@
         </p:nvSpPr>
         <p:spPr/>
         <p:txBody>
-          <a:bodyPr/>
+          <a:bodyPr>
+            <a:normAutofit/>
+          </a:bodyPr>
           <a:lstStyle/>
           <a:p>
             <a:r>
               <a:rPr lang="en-US" dirty="0" smtClean="0"/>
-              <a:t>There are a few good parts</a:t>
+              <a:t>In </a:t>
+            </a:r>
+            <a:r>
+              <a:rPr lang="en-US" dirty="0" smtClean="0"/>
+              <a:t>a declarative way</a:t>
             </a:r>
           </a:p>
           <a:p>
             <a:pPr lvl="1"/>
             <a:r>
               <a:rPr lang="en-US" dirty="0" smtClean="0"/>
-              <a:t>Components</a:t>
-            </a:r>
-          </a:p>
-          <a:p>
-            <a:pPr lvl="2"/>
+              <a:t>Given an application state, renders some </a:t>
+            </a:r>
+            <a:r>
+              <a:rPr lang="en-US" i="1" dirty="0" smtClean="0"/>
+              <a:t>shadow </a:t>
+            </a:r>
             <a:r>
               <a:rPr lang="en-US" dirty="0" smtClean="0"/>
-              <a:t>Enhanced </a:t>
-            </a:r>
-            <a:r>
+              <a:t>DOM </a:t>
+            </a:r>
+            <a:br>
               <a:rPr lang="en-US" dirty="0" smtClean="0"/>
-              <a:t>reusability </a:t>
-            </a:r>
-            <a:r>
-              <a:rPr lang="en-US" sz="1600" dirty="0" smtClean="0">
+            </a:br>
+            <a:r>
+              <a:rPr lang="en-US" sz="1800" dirty="0" smtClean="0">
                 <a:solidFill>
                   <a:schemeClr val="accent6"/>
                 </a:solidFill>
               </a:rPr>
-              <a:t>well, keep it generic if you plan on reusing…</a:t>
+              <a:t>such inputs are named properties</a:t>
             </a:r>
             <a:endParaRPr lang="en-US" dirty="0" smtClean="0">
               <a:solidFill>
@@ -4770,78 +4762,87 @@
             </a:endParaRPr>
           </a:p>
           <a:p>
-            <a:pPr lvl="2"/>
+            <a:pPr lvl="1"/>
+            <a:r>
+              <a:rPr lang="en-US" dirty="0"/>
+              <a:t>Optimized rendering </a:t>
+            </a:r>
             <a:r>
               <a:rPr lang="en-US" dirty="0" smtClean="0"/>
-              <a:t>Rendering lifecycle with optimizations</a:t>
-            </a:r>
-          </a:p>
-          <a:p>
-            <a:pPr lvl="2"/>
+              <a:t>engine </a:t>
+            </a:r>
+            <a:r>
+              <a:rPr lang="en-US" sz="1800" dirty="0" smtClean="0">
+                <a:solidFill>
+                  <a:schemeClr val="accent6"/>
+                </a:solidFill>
+              </a:rPr>
+              <a:t>inspired </a:t>
+            </a:r>
+            <a:r>
+              <a:rPr lang="en-US" sz="1800" dirty="0">
+                <a:solidFill>
+                  <a:schemeClr val="accent6"/>
+                </a:solidFill>
+              </a:rPr>
+              <a:t>from game engines</a:t>
+            </a:r>
+            <a:endParaRPr lang="en-US" dirty="0">
+              <a:solidFill>
+                <a:schemeClr val="accent6"/>
+              </a:solidFill>
+            </a:endParaRPr>
+          </a:p>
+          <a:p>
+            <a:pPr lvl="1"/>
             <a:r>
               <a:rPr lang="en-US" dirty="0" smtClean="0"/>
-              <a:t>Basic type checking</a:t>
+              <a:t>Little </a:t>
+            </a:r>
+            <a:r>
+              <a:rPr lang="en-US" dirty="0"/>
+              <a:t>assumption on application structure </a:t>
+            </a:r>
+            <a:r>
+              <a:rPr lang="en-US" sz="1800" dirty="0">
+                <a:solidFill>
+                  <a:schemeClr val="accent6"/>
+                </a:solidFill>
+              </a:rPr>
+              <a:t>can “easily” integrate with other technologies</a:t>
             </a:r>
           </a:p>
           <a:p>
             <a:pPr lvl="1"/>
             <a:r>
               <a:rPr lang="en-US" dirty="0" smtClean="0"/>
-              <a:t>Becomes powerful with ES6 and more </a:t>
-            </a:r>
-          </a:p>
-          <a:p>
-            <a:pPr lvl="2"/>
-            <a:r>
-              <a:rPr lang="en-US" dirty="0" smtClean="0"/>
-              <a:t>Dependency </a:t>
-            </a:r>
-            <a:r>
-              <a:rPr lang="en-US" dirty="0" smtClean="0"/>
-              <a:t>management</a:t>
-            </a:r>
-          </a:p>
-          <a:p>
-            <a:pPr lvl="2"/>
-            <a:r>
-              <a:rPr lang="en-US" dirty="0" err="1" smtClean="0"/>
-              <a:t>Uptaded</a:t>
-            </a:r>
-            <a:r>
-              <a:rPr lang="en-US" dirty="0" smtClean="0"/>
-              <a:t> syntax and language features</a:t>
-            </a:r>
-            <a:endParaRPr lang="en-US" dirty="0" smtClean="0"/>
-          </a:p>
-          <a:p>
-            <a:pPr lvl="2"/>
-            <a:r>
-              <a:rPr lang="en-US" dirty="0" err="1" smtClean="0"/>
-              <a:t>Css</a:t>
-            </a:r>
-            <a:r>
-              <a:rPr lang="en-US" dirty="0" smtClean="0"/>
-              <a:t> </a:t>
-            </a:r>
-            <a:r>
-              <a:rPr lang="en-US" dirty="0" smtClean="0"/>
-              <a:t>inclusions</a:t>
-            </a:r>
-            <a:endParaRPr lang="en-US" dirty="0" smtClean="0"/>
-          </a:p>
-          <a:p>
-            <a:pPr lvl="1"/>
-            <a:r>
-              <a:rPr lang="en-US" dirty="0" smtClean="0"/>
-              <a:t>Arguably JSX</a:t>
-            </a:r>
-          </a:p>
-          <a:p>
-            <a:pPr lvl="2"/>
-            <a:r>
-              <a:rPr lang="en-US" dirty="0" smtClean="0"/>
-              <a:t>As opposed to string based templates</a:t>
-            </a:r>
+              <a:t>Can </a:t>
+            </a:r>
+            <a:r>
+              <a:rPr lang="en-US" dirty="0"/>
+              <a:t>render on server side </a:t>
+            </a:r>
+            <a:r>
+              <a:rPr lang="en-US" sz="1800" dirty="0">
+                <a:solidFill>
+                  <a:schemeClr val="accent6"/>
+                </a:solidFill>
+              </a:rPr>
+              <a:t>SEO </a:t>
+            </a:r>
+            <a:r>
+              <a:rPr lang="en-US" sz="1800" dirty="0" smtClean="0">
+                <a:solidFill>
+                  <a:schemeClr val="accent6"/>
+                </a:solidFill>
+              </a:rPr>
+              <a:t>please</a:t>
+            </a:r>
+            <a:endParaRPr lang="en-US" dirty="0">
+              <a:solidFill>
+                <a:schemeClr val="accent6"/>
+              </a:solidFill>
+            </a:endParaRPr>
           </a:p>
         </p:txBody>
       </p:sp>
@@ -4918,7 +4919,7 @@
     </p:spTree>
     <p:extLst>
       <p:ext uri="{BB962C8B-B14F-4D97-AF65-F5344CB8AC3E}">
-        <p14:creationId xmlns:p14="http://schemas.microsoft.com/office/powerpoint/2010/main" xmlns="" val="3005486473"/>
+        <p14:creationId xmlns:p14="http://schemas.microsoft.com/office/powerpoint/2010/main" val="604540945"/>
       </p:ext>
     </p:extLst>
   </p:cSld>
@@ -4968,12 +4969,8 @@
           <a:lstStyle/>
           <a:p>
             <a:r>
-              <a:rPr lang="fr-FR" dirty="0" smtClean="0"/>
-              <a:t>A simple </a:t>
-            </a:r>
-            <a:r>
-              <a:rPr lang="fr-FR" dirty="0" err="1" smtClean="0"/>
-              <a:t>view</a:t>
+              <a:rPr lang="en-US" dirty="0" smtClean="0"/>
+              <a:t>React – what’s actually good in it ?</a:t>
             </a:r>
             <a:endParaRPr lang="fr-FR" dirty="0"/>
           </a:p>
@@ -4981,6 +4978,119 @@
       </p:sp>
       <p:sp>
         <p:nvSpPr>
+          <p:cNvPr id="3" name="Content Placeholder 2"/>
+          <p:cNvSpPr>
+            <a:spLocks noGrp="1"/>
+          </p:cNvSpPr>
+          <p:nvPr>
+            <p:ph idx="1"/>
+          </p:nvPr>
+        </p:nvSpPr>
+        <p:spPr/>
+        <p:txBody>
+          <a:bodyPr/>
+          <a:lstStyle/>
+          <a:p>
+            <a:r>
+              <a:rPr lang="en-US" dirty="0" smtClean="0"/>
+              <a:t>There are a few good parts</a:t>
+            </a:r>
+          </a:p>
+          <a:p>
+            <a:pPr lvl="1"/>
+            <a:r>
+              <a:rPr lang="en-US" dirty="0" smtClean="0"/>
+              <a:t>Components</a:t>
+            </a:r>
+          </a:p>
+          <a:p>
+            <a:pPr lvl="2"/>
+            <a:r>
+              <a:rPr lang="en-US" dirty="0" smtClean="0"/>
+              <a:t>Enhanced reusability </a:t>
+            </a:r>
+            <a:r>
+              <a:rPr lang="en-US" sz="1600" dirty="0" smtClean="0">
+                <a:solidFill>
+                  <a:schemeClr val="accent6"/>
+                </a:solidFill>
+              </a:rPr>
+              <a:t>well, keep it generic if you plan on reusing…</a:t>
+            </a:r>
+            <a:endParaRPr lang="en-US" dirty="0" smtClean="0">
+              <a:solidFill>
+                <a:schemeClr val="accent6"/>
+              </a:solidFill>
+            </a:endParaRPr>
+          </a:p>
+          <a:p>
+            <a:pPr lvl="2"/>
+            <a:r>
+              <a:rPr lang="en-US" dirty="0" smtClean="0"/>
+              <a:t>Rendering lifecycle with optimizations</a:t>
+            </a:r>
+          </a:p>
+          <a:p>
+            <a:pPr lvl="2"/>
+            <a:r>
+              <a:rPr lang="en-US" dirty="0" smtClean="0"/>
+              <a:t>Basic type checking</a:t>
+            </a:r>
+          </a:p>
+          <a:p>
+            <a:pPr lvl="1"/>
+            <a:r>
+              <a:rPr lang="en-US" dirty="0" smtClean="0"/>
+              <a:t>Becomes powerful with ES6 and more </a:t>
+            </a:r>
+          </a:p>
+          <a:p>
+            <a:pPr lvl="2"/>
+            <a:r>
+              <a:rPr lang="en-US" dirty="0" smtClean="0"/>
+              <a:t>Dependency management</a:t>
+            </a:r>
+          </a:p>
+          <a:p>
+            <a:pPr lvl="2"/>
+            <a:r>
+              <a:rPr lang="en-US" dirty="0" err="1" smtClean="0"/>
+              <a:t>Uptaded</a:t>
+            </a:r>
+            <a:r>
+              <a:rPr lang="en-US" dirty="0" smtClean="0"/>
+              <a:t> syntax and language features</a:t>
+            </a:r>
+          </a:p>
+          <a:p>
+            <a:pPr lvl="2"/>
+            <a:r>
+              <a:rPr lang="en-US" dirty="0" err="1" smtClean="0"/>
+              <a:t>Css</a:t>
+            </a:r>
+            <a:r>
+              <a:rPr lang="en-US" dirty="0" smtClean="0"/>
+              <a:t> inclusions</a:t>
+            </a:r>
+          </a:p>
+          <a:p>
+            <a:pPr lvl="1"/>
+            <a:r>
+              <a:rPr lang="en-US" dirty="0" smtClean="0"/>
+              <a:t>Arguably JSX</a:t>
+            </a:r>
+          </a:p>
+          <a:p>
+            <a:pPr lvl="2"/>
+            <a:r>
+              <a:rPr lang="en-US" dirty="0" smtClean="0"/>
+              <a:t>As opposed to string based templates</a:t>
+            </a:r>
+          </a:p>
+        </p:txBody>
+      </p:sp>
+      <p:sp>
+        <p:nvSpPr>
           <p:cNvPr id="4" name="Date Placeholder 3"/>
           <p:cNvSpPr>
             <a:spLocks noGrp="1"/>
@@ -4995,10 +5105,10 @@
           <a:lstStyle/>
           <a:p>
             <a:r>
-              <a:rPr lang="fr-FR" dirty="0" smtClean="0"/>
+              <a:rPr lang="fr-FR" smtClean="0"/>
               <a:t>2017</a:t>
             </a:r>
-            <a:endParaRPr lang="fr-FR" dirty="0"/>
+            <a:endParaRPr lang="fr-FR"/>
           </a:p>
         </p:txBody>
       </p:sp>
@@ -5018,7 +5128,7 @@
           <a:lstStyle/>
           <a:p>
             <a:r>
-              <a:rPr lang="fr-FR" dirty="0" smtClean="0"/>
+              <a:rPr lang="fr-FR" smtClean="0"/>
               <a:t>cedric.hartland@gmail.com</a:t>
             </a:r>
             <a:endParaRPr lang="fr-FR" dirty="0"/>
@@ -5045,668 +5155,14 @@
               <a:pPr/>
               <a:t>5</a:t>
             </a:fld>
-            <a:endParaRPr lang="fr-FR" dirty="0"/>
-          </a:p>
-        </p:txBody>
-      </p:sp>
-      <p:sp>
-        <p:nvSpPr>
-          <p:cNvPr id="11" name="Rectangle 10"/>
-          <p:cNvSpPr/>
-          <p:nvPr/>
-        </p:nvSpPr>
-        <p:spPr>
-          <a:xfrm>
-            <a:off x="1851025" y="1714709"/>
-            <a:ext cx="8489950" cy="4247317"/>
-          </a:xfrm>
-          <a:prstGeom prst="rect">
-            <a:avLst/>
-          </a:prstGeom>
-          <a:solidFill>
-            <a:schemeClr val="bg1">
-              <a:lumMod val="95000"/>
-            </a:schemeClr>
-          </a:solidFill>
-          <a:effectLst>
-            <a:outerShdw blurRad="50800" dist="38100" dir="2700000" algn="tl" rotWithShape="0">
-              <a:prstClr val="black">
-                <a:alpha val="40000"/>
-              </a:prstClr>
-            </a:outerShdw>
-          </a:effectLst>
-        </p:spPr>
-        <p:txBody>
-          <a:bodyPr wrap="square">
-            <a:spAutoFit/>
-          </a:bodyPr>
-          <a:lstStyle/>
-          <a:p>
-            <a:endParaRPr lang="fr-FR" dirty="0" smtClean="0"/>
-          </a:p>
-          <a:p>
-            <a:pPr lvl="1"/>
-            <a:r>
-              <a:rPr lang="fr-FR" b="1" dirty="0" smtClean="0">
-                <a:solidFill>
-                  <a:schemeClr val="accent5"/>
-                </a:solidFill>
-              </a:rPr>
-              <a:t>class</a:t>
-            </a:r>
-            <a:r>
-              <a:rPr lang="fr-FR" dirty="0" smtClean="0"/>
-              <a:t> </a:t>
-            </a:r>
-            <a:r>
-              <a:rPr lang="fr-FR" dirty="0" err="1" smtClean="0"/>
-              <a:t>Tile</a:t>
-            </a:r>
-            <a:r>
-              <a:rPr lang="fr-FR" dirty="0" smtClean="0"/>
-              <a:t> </a:t>
-            </a:r>
-            <a:r>
-              <a:rPr lang="fr-FR" b="1" dirty="0" err="1" smtClean="0">
-                <a:solidFill>
-                  <a:schemeClr val="accent5"/>
-                </a:solidFill>
-              </a:rPr>
-              <a:t>extends</a:t>
-            </a:r>
-            <a:r>
-              <a:rPr lang="fr-FR" dirty="0" smtClean="0"/>
-              <a:t> </a:t>
-            </a:r>
-            <a:r>
-              <a:rPr lang="fr-FR" dirty="0" err="1" smtClean="0"/>
-              <a:t>React.Component</a:t>
-            </a:r>
-            <a:r>
-              <a:rPr lang="fr-FR" dirty="0" smtClean="0"/>
-              <a:t> {</a:t>
-            </a:r>
-          </a:p>
-          <a:p>
-            <a:pPr lvl="1"/>
-            <a:r>
-              <a:rPr lang="fr-FR" dirty="0" smtClean="0"/>
-              <a:t>  </a:t>
-            </a:r>
-            <a:r>
-              <a:rPr lang="fr-FR" b="1" dirty="0" err="1" smtClean="0">
-                <a:solidFill>
-                  <a:schemeClr val="accent5"/>
-                </a:solidFill>
-              </a:rPr>
-              <a:t>static</a:t>
-            </a:r>
-            <a:r>
-              <a:rPr lang="fr-FR" dirty="0" smtClean="0"/>
-              <a:t> </a:t>
-            </a:r>
-            <a:r>
-              <a:rPr lang="fr-FR" dirty="0" err="1" smtClean="0">
-                <a:solidFill>
-                  <a:srgbClr val="7030A0"/>
-                </a:solidFill>
-              </a:rPr>
-              <a:t>propTypes</a:t>
-            </a:r>
-            <a:r>
-              <a:rPr lang="fr-FR" dirty="0" smtClean="0"/>
-              <a:t> = {</a:t>
-            </a:r>
-          </a:p>
-          <a:p>
-            <a:pPr lvl="1"/>
-            <a:r>
-              <a:rPr lang="fr-FR" dirty="0" smtClean="0"/>
-              <a:t>    value: </a:t>
-            </a:r>
-            <a:r>
-              <a:rPr lang="fr-FR" dirty="0" err="1" smtClean="0"/>
-              <a:t>React.PropTypes.number</a:t>
-            </a:r>
-            <a:r>
-              <a:rPr lang="fr-FR" dirty="0" smtClean="0"/>
-              <a:t>,</a:t>
-            </a:r>
-          </a:p>
-          <a:p>
-            <a:pPr lvl="1"/>
-            <a:r>
-              <a:rPr lang="fr-FR" dirty="0" smtClean="0"/>
-              <a:t>    </a:t>
-            </a:r>
-            <a:r>
-              <a:rPr lang="fr-FR" dirty="0" err="1" smtClean="0"/>
-              <a:t>title</a:t>
-            </a:r>
-            <a:r>
-              <a:rPr lang="fr-FR" dirty="0" smtClean="0"/>
-              <a:t>: </a:t>
-            </a:r>
-            <a:r>
-              <a:rPr lang="fr-FR" dirty="0" err="1" smtClean="0"/>
-              <a:t>React.PropTypes.string</a:t>
-            </a:r>
-            <a:endParaRPr lang="fr-FR" dirty="0" smtClean="0"/>
-          </a:p>
-          <a:p>
-            <a:pPr lvl="1"/>
-            <a:r>
-              <a:rPr lang="fr-FR" dirty="0" smtClean="0"/>
-              <a:t>  };</a:t>
-            </a:r>
-          </a:p>
-          <a:p>
-            <a:pPr lvl="1"/>
-            <a:r>
-              <a:rPr lang="fr-FR" dirty="0" smtClean="0"/>
-              <a:t>  </a:t>
-            </a:r>
-            <a:r>
-              <a:rPr lang="fr-FR" dirty="0" err="1" smtClean="0">
-                <a:solidFill>
-                  <a:srgbClr val="7030A0"/>
-                </a:solidFill>
-              </a:rPr>
-              <a:t>render</a:t>
-            </a:r>
-            <a:r>
-              <a:rPr lang="fr-FR" dirty="0" smtClean="0"/>
-              <a:t>() {</a:t>
-            </a:r>
-          </a:p>
-          <a:p>
-            <a:pPr lvl="1"/>
-            <a:r>
-              <a:rPr lang="fr-FR" dirty="0" smtClean="0"/>
-              <a:t>    </a:t>
-            </a:r>
-            <a:r>
-              <a:rPr lang="fr-FR" b="1" dirty="0" smtClean="0">
-                <a:solidFill>
-                  <a:schemeClr val="accent5"/>
-                </a:solidFill>
-              </a:rPr>
-              <a:t>return</a:t>
-            </a:r>
-            <a:r>
-              <a:rPr lang="fr-FR" dirty="0" smtClean="0"/>
-              <a:t> ( &lt;</a:t>
-            </a:r>
-            <a:r>
-              <a:rPr lang="fr-FR" dirty="0" err="1" smtClean="0">
-                <a:solidFill>
-                  <a:srgbClr val="C00000"/>
-                </a:solidFill>
-              </a:rPr>
-              <a:t>div</a:t>
-            </a:r>
-            <a:r>
-              <a:rPr lang="fr-FR" dirty="0" smtClean="0"/>
-              <a:t> </a:t>
-            </a:r>
-            <a:r>
-              <a:rPr lang="fr-FR" dirty="0" err="1" smtClean="0"/>
-              <a:t>className</a:t>
-            </a:r>
-            <a:r>
-              <a:rPr lang="fr-FR" dirty="0" smtClean="0"/>
-              <a:t>=</a:t>
-            </a:r>
-            <a:r>
-              <a:rPr lang="fr-FR" dirty="0" smtClean="0">
-                <a:solidFill>
-                  <a:schemeClr val="accent6">
-                    <a:lumMod val="75000"/>
-                  </a:schemeClr>
-                </a:solidFill>
-              </a:rPr>
-              <a:t>"</a:t>
-            </a:r>
-            <a:r>
-              <a:rPr lang="fr-FR" dirty="0" err="1" smtClean="0">
-                <a:solidFill>
-                  <a:schemeClr val="accent6">
-                    <a:lumMod val="75000"/>
-                  </a:schemeClr>
-                </a:solidFill>
-              </a:rPr>
-              <a:t>tile</a:t>
-            </a:r>
-            <a:r>
-              <a:rPr lang="fr-FR" dirty="0" smtClean="0">
-                <a:solidFill>
-                  <a:schemeClr val="accent6">
-                    <a:lumMod val="75000"/>
-                  </a:schemeClr>
-                </a:solidFill>
-              </a:rPr>
-              <a:t>"</a:t>
-            </a:r>
-            <a:r>
-              <a:rPr lang="fr-FR" dirty="0" smtClean="0"/>
-              <a:t>&gt;</a:t>
-            </a:r>
-          </a:p>
-          <a:p>
-            <a:pPr lvl="1"/>
-            <a:r>
-              <a:rPr lang="fr-FR" dirty="0" smtClean="0"/>
-              <a:t>        &lt;</a:t>
-            </a:r>
-            <a:r>
-              <a:rPr lang="fr-FR" dirty="0" err="1" smtClean="0">
-                <a:solidFill>
-                  <a:srgbClr val="C00000"/>
-                </a:solidFill>
-              </a:rPr>
-              <a:t>div</a:t>
-            </a:r>
-            <a:r>
-              <a:rPr lang="fr-FR" dirty="0" smtClean="0"/>
-              <a:t> </a:t>
-            </a:r>
-            <a:r>
-              <a:rPr lang="fr-FR" dirty="0" err="1" smtClean="0"/>
-              <a:t>className</a:t>
-            </a:r>
-            <a:r>
-              <a:rPr lang="fr-FR" dirty="0" smtClean="0"/>
-              <a:t>=</a:t>
-            </a:r>
-            <a:r>
-              <a:rPr lang="fr-FR" dirty="0" smtClean="0">
-                <a:solidFill>
-                  <a:schemeClr val="accent6">
-                    <a:lumMod val="75000"/>
-                  </a:schemeClr>
-                </a:solidFill>
-              </a:rPr>
-              <a:t>"</a:t>
-            </a:r>
-            <a:r>
-              <a:rPr lang="fr-FR" dirty="0" err="1" smtClean="0">
-                <a:solidFill>
-                  <a:schemeClr val="accent6">
-                    <a:lumMod val="75000"/>
-                  </a:schemeClr>
-                </a:solidFill>
-              </a:rPr>
-              <a:t>tile</a:t>
-            </a:r>
-            <a:r>
-              <a:rPr lang="fr-FR" dirty="0" smtClean="0">
-                <a:solidFill>
-                  <a:schemeClr val="accent6">
-                    <a:lumMod val="75000"/>
-                  </a:schemeClr>
-                </a:solidFill>
-              </a:rPr>
-              <a:t>-header"</a:t>
-            </a:r>
-            <a:r>
-              <a:rPr lang="fr-FR" dirty="0" smtClean="0"/>
-              <a:t>&gt;{</a:t>
-            </a:r>
-            <a:r>
-              <a:rPr lang="fr-FR" b="1" dirty="0" err="1" smtClean="0">
-                <a:solidFill>
-                  <a:schemeClr val="accent5"/>
-                </a:solidFill>
-              </a:rPr>
-              <a:t>this</a:t>
-            </a:r>
-            <a:r>
-              <a:rPr lang="fr-FR" dirty="0" err="1" smtClean="0"/>
-              <a:t>.props.title</a:t>
-            </a:r>
-            <a:r>
-              <a:rPr lang="fr-FR" dirty="0" smtClean="0"/>
-              <a:t>}&lt;/</a:t>
-            </a:r>
-            <a:r>
-              <a:rPr lang="fr-FR" dirty="0" err="1" smtClean="0">
-                <a:solidFill>
-                  <a:srgbClr val="C00000"/>
-                </a:solidFill>
-              </a:rPr>
-              <a:t>div</a:t>
-            </a:r>
-            <a:r>
-              <a:rPr lang="fr-FR" dirty="0" smtClean="0"/>
-              <a:t>&gt;</a:t>
-            </a:r>
-          </a:p>
-          <a:p>
-            <a:pPr lvl="1"/>
-            <a:r>
-              <a:rPr lang="fr-FR" dirty="0" smtClean="0"/>
-              <a:t>        &lt;</a:t>
-            </a:r>
-            <a:r>
-              <a:rPr lang="fr-FR" dirty="0" err="1" smtClean="0">
-                <a:solidFill>
-                  <a:srgbClr val="C00000"/>
-                </a:solidFill>
-              </a:rPr>
-              <a:t>div</a:t>
-            </a:r>
-            <a:r>
-              <a:rPr lang="fr-FR" dirty="0" smtClean="0"/>
-              <a:t> </a:t>
-            </a:r>
-            <a:r>
-              <a:rPr lang="fr-FR" dirty="0" err="1" smtClean="0"/>
-              <a:t>className</a:t>
-            </a:r>
-            <a:r>
-              <a:rPr lang="fr-FR" dirty="0" smtClean="0"/>
-              <a:t>=</a:t>
-            </a:r>
-            <a:r>
-              <a:rPr lang="fr-FR" dirty="0" smtClean="0">
-                <a:solidFill>
-                  <a:schemeClr val="accent6">
-                    <a:lumMod val="75000"/>
-                  </a:schemeClr>
-                </a:solidFill>
-              </a:rPr>
-              <a:t>"</a:t>
-            </a:r>
-            <a:r>
-              <a:rPr lang="fr-FR" dirty="0" err="1" smtClean="0">
-                <a:solidFill>
-                  <a:schemeClr val="accent6">
-                    <a:lumMod val="75000"/>
-                  </a:schemeClr>
-                </a:solidFill>
-              </a:rPr>
-              <a:t>tile</a:t>
-            </a:r>
-            <a:r>
-              <a:rPr lang="fr-FR" dirty="0" smtClean="0">
-                <a:solidFill>
-                  <a:schemeClr val="accent6">
-                    <a:lumMod val="75000"/>
-                  </a:schemeClr>
-                </a:solidFill>
-              </a:rPr>
-              <a:t>-value"</a:t>
-            </a:r>
-            <a:r>
-              <a:rPr lang="fr-FR" dirty="0" smtClean="0"/>
-              <a:t>&gt;{</a:t>
-            </a:r>
-            <a:r>
-              <a:rPr lang="fr-FR" dirty="0" err="1" smtClean="0"/>
-              <a:t>numeral</a:t>
-            </a:r>
-            <a:r>
-              <a:rPr lang="fr-FR" dirty="0" smtClean="0"/>
-              <a:t>(</a:t>
-            </a:r>
-            <a:r>
-              <a:rPr lang="fr-FR" b="1" dirty="0" err="1" smtClean="0">
-                <a:solidFill>
-                  <a:schemeClr val="accent5"/>
-                </a:solidFill>
-              </a:rPr>
-              <a:t>this</a:t>
-            </a:r>
-            <a:r>
-              <a:rPr lang="fr-FR" dirty="0" err="1" smtClean="0"/>
-              <a:t>.props.value</a:t>
-            </a:r>
-            <a:r>
-              <a:rPr lang="fr-FR" dirty="0" smtClean="0"/>
-              <a:t>).format(</a:t>
-            </a:r>
-            <a:r>
-              <a:rPr lang="fr-FR" dirty="0" smtClean="0">
-                <a:solidFill>
-                  <a:schemeClr val="accent6">
-                    <a:lumMod val="75000"/>
-                  </a:schemeClr>
-                </a:solidFill>
-              </a:rPr>
-              <a:t>'0.00'</a:t>
-            </a:r>
-            <a:r>
-              <a:rPr lang="fr-FR" dirty="0" smtClean="0"/>
-              <a:t>)}&lt;/</a:t>
-            </a:r>
-            <a:r>
-              <a:rPr lang="fr-FR" dirty="0" err="1" smtClean="0">
-                <a:solidFill>
-                  <a:srgbClr val="C00000"/>
-                </a:solidFill>
-              </a:rPr>
-              <a:t>div</a:t>
-            </a:r>
-            <a:r>
-              <a:rPr lang="fr-FR" dirty="0" smtClean="0"/>
-              <a:t>&gt;</a:t>
-            </a:r>
-          </a:p>
-          <a:p>
-            <a:pPr lvl="1"/>
-            <a:r>
-              <a:rPr lang="fr-FR" dirty="0" smtClean="0"/>
-              <a:t>      &lt;/</a:t>
-            </a:r>
-            <a:r>
-              <a:rPr lang="fr-FR" dirty="0" err="1" smtClean="0">
-                <a:solidFill>
-                  <a:srgbClr val="C00000"/>
-                </a:solidFill>
-              </a:rPr>
-              <a:t>div</a:t>
-            </a:r>
-            <a:r>
-              <a:rPr lang="fr-FR" dirty="0" smtClean="0"/>
-              <a:t>&gt;</a:t>
-            </a:r>
-          </a:p>
-          <a:p>
-            <a:pPr lvl="1"/>
-            <a:r>
-              <a:rPr lang="fr-FR" dirty="0" smtClean="0"/>
-              <a:t>    );</a:t>
-            </a:r>
-          </a:p>
-          <a:p>
-            <a:pPr lvl="1"/>
-            <a:r>
-              <a:rPr lang="fr-FR" dirty="0" smtClean="0"/>
-              <a:t>  }</a:t>
-            </a:r>
-          </a:p>
-          <a:p>
-            <a:pPr lvl="1"/>
-            <a:r>
-              <a:rPr lang="fr-FR" dirty="0" smtClean="0"/>
-              <a:t>}</a:t>
-            </a:r>
-          </a:p>
-          <a:p>
-            <a:pPr lvl="1"/>
-            <a:endParaRPr lang="fr-FR" dirty="0"/>
-          </a:p>
-        </p:txBody>
-      </p:sp>
-      <p:sp>
-        <p:nvSpPr>
-          <p:cNvPr id="12" name="Rectangle 11"/>
-          <p:cNvSpPr/>
-          <p:nvPr/>
-        </p:nvSpPr>
-        <p:spPr>
-          <a:xfrm>
-            <a:off x="203200" y="3060700"/>
-            <a:ext cx="1574800" cy="939800"/>
-          </a:xfrm>
-          <a:prstGeom prst="wedgeRectCallout">
-            <a:avLst>
-              <a:gd name="adj1" fmla="val 97877"/>
-              <a:gd name="adj2" fmla="val -78040"/>
-            </a:avLst>
-          </a:prstGeom>
-        </p:spPr>
-        <p:style>
-          <a:lnRef idx="2">
-            <a:schemeClr val="accent1">
-              <a:shade val="50000"/>
-            </a:schemeClr>
-          </a:lnRef>
-          <a:fillRef idx="1">
-            <a:schemeClr val="accent1"/>
-          </a:fillRef>
-          <a:effectRef idx="0">
-            <a:schemeClr val="accent1"/>
-          </a:effectRef>
-          <a:fontRef idx="minor">
-            <a:schemeClr val="lt1"/>
-          </a:fontRef>
-        </p:style>
-        <p:txBody>
-          <a:bodyPr rtlCol="0" anchor="ctr"/>
-          <a:lstStyle/>
-          <a:p>
-            <a:pPr algn="ctr"/>
-            <a:r>
-              <a:rPr lang="fr-FR" dirty="0" err="1" smtClean="0"/>
-              <a:t>Properties</a:t>
-            </a:r>
-            <a:r>
-              <a:rPr lang="fr-FR" dirty="0" smtClean="0"/>
-              <a:t> types</a:t>
-            </a:r>
-            <a:endParaRPr lang="fr-FR" dirty="0"/>
-          </a:p>
-        </p:txBody>
-      </p:sp>
-      <p:sp>
-        <p:nvSpPr>
-          <p:cNvPr id="13" name="Rectangle 12"/>
-          <p:cNvSpPr/>
-          <p:nvPr/>
-        </p:nvSpPr>
-        <p:spPr>
-          <a:xfrm>
-            <a:off x="10452100" y="4445000"/>
-            <a:ext cx="1574800" cy="939800"/>
-          </a:xfrm>
-          <a:prstGeom prst="wedgeRectCallout">
-            <a:avLst>
-              <a:gd name="adj1" fmla="val -117446"/>
-              <a:gd name="adj2" fmla="val -38851"/>
-            </a:avLst>
-          </a:prstGeom>
-        </p:spPr>
-        <p:style>
-          <a:lnRef idx="2">
-            <a:schemeClr val="accent1">
-              <a:shade val="50000"/>
-            </a:schemeClr>
-          </a:lnRef>
-          <a:fillRef idx="1">
-            <a:schemeClr val="accent1"/>
-          </a:fillRef>
-          <a:effectRef idx="0">
-            <a:schemeClr val="accent1"/>
-          </a:effectRef>
-          <a:fontRef idx="minor">
-            <a:schemeClr val="lt1"/>
-          </a:fontRef>
-        </p:style>
-        <p:txBody>
-          <a:bodyPr rtlCol="0" anchor="ctr"/>
-          <a:lstStyle/>
-          <a:p>
-            <a:pPr algn="ctr"/>
-            <a:r>
-              <a:rPr lang="fr-FR" dirty="0" smtClean="0"/>
-              <a:t>JSX </a:t>
-            </a:r>
-            <a:r>
-              <a:rPr lang="fr-FR" dirty="0" err="1" smtClean="0"/>
-              <a:t>declarations</a:t>
-            </a:r>
-            <a:endParaRPr lang="fr-FR" dirty="0"/>
-          </a:p>
-        </p:txBody>
-      </p:sp>
-      <p:sp>
-        <p:nvSpPr>
-          <p:cNvPr id="14" name="Rectangle 13"/>
-          <p:cNvSpPr/>
-          <p:nvPr/>
-        </p:nvSpPr>
-        <p:spPr>
-          <a:xfrm>
-            <a:off x="190500" y="1854200"/>
-            <a:ext cx="1574800" cy="939800"/>
-          </a:xfrm>
-          <a:prstGeom prst="wedgeRectCallout">
-            <a:avLst>
-              <a:gd name="adj1" fmla="val 87393"/>
-              <a:gd name="adj2" fmla="val -15878"/>
-            </a:avLst>
-          </a:prstGeom>
-        </p:spPr>
-        <p:style>
-          <a:lnRef idx="2">
-            <a:schemeClr val="accent1">
-              <a:shade val="50000"/>
-            </a:schemeClr>
-          </a:lnRef>
-          <a:fillRef idx="1">
-            <a:schemeClr val="accent1"/>
-          </a:fillRef>
-          <a:effectRef idx="0">
-            <a:schemeClr val="accent1"/>
-          </a:effectRef>
-          <a:fontRef idx="minor">
-            <a:schemeClr val="lt1"/>
-          </a:fontRef>
-        </p:style>
-        <p:txBody>
-          <a:bodyPr rtlCol="0" anchor="ctr"/>
-          <a:lstStyle/>
-          <a:p>
-            <a:pPr algn="ctr"/>
-            <a:r>
-              <a:rPr lang="fr-FR" dirty="0" err="1" smtClean="0"/>
-              <a:t>Reusable</a:t>
-            </a:r>
-            <a:r>
-              <a:rPr lang="fr-FR" dirty="0" smtClean="0"/>
-              <a:t> </a:t>
-            </a:r>
-            <a:r>
-              <a:rPr lang="fr-FR" b="1" dirty="0" smtClean="0"/>
-              <a:t>class</a:t>
-            </a:r>
-            <a:r>
-              <a:rPr lang="fr-FR" dirty="0" smtClean="0"/>
-              <a:t> or </a:t>
-            </a:r>
-            <a:r>
-              <a:rPr lang="fr-FR" b="1" dirty="0" err="1" smtClean="0"/>
-              <a:t>function</a:t>
-            </a:r>
-            <a:endParaRPr lang="fr-FR" b="1" dirty="0"/>
+            <a:endParaRPr lang="fr-FR"/>
           </a:p>
         </p:txBody>
       </p:sp>
     </p:spTree>
     <p:extLst>
       <p:ext uri="{BB962C8B-B14F-4D97-AF65-F5344CB8AC3E}">
-        <p14:creationId xmlns:p14="http://schemas.microsoft.com/office/powerpoint/2010/main" xmlns="" val="3296308957"/>
+        <p14:creationId xmlns:p14="http://schemas.microsoft.com/office/powerpoint/2010/main" val="3005486473"/>
       </p:ext>
     </p:extLst>
   </p:cSld>
@@ -5756,12 +5212,12 @@
           <a:lstStyle/>
           <a:p>
             <a:r>
+              <a:rPr lang="fr-FR" dirty="0" smtClean="0"/>
+              <a:t>A simple </a:t>
+            </a:r>
+            <a:r>
               <a:rPr lang="fr-FR" dirty="0" err="1" smtClean="0"/>
-              <a:t>Adding</a:t>
-            </a:r>
-            <a:r>
-              <a:rPr lang="fr-FR" dirty="0" smtClean="0"/>
-              <a:t> user interactions</a:t>
+              <a:t>view</a:t>
             </a:r>
             <a:endParaRPr lang="fr-FR" dirty="0"/>
           </a:p>
@@ -5846,7 +5302,7 @@
         <p:spPr>
           <a:xfrm>
             <a:off x="1851025" y="1714709"/>
-            <a:ext cx="8489950" cy="3970318"/>
+            <a:ext cx="8489950" cy="4247317"/>
           </a:xfrm>
           <a:prstGeom prst="rect">
             <a:avLst/>
@@ -5870,6 +5326,10 @@
           </a:bodyPr>
           <a:lstStyle/>
           <a:p>
+            <a:endParaRPr lang="fr-FR" dirty="0" smtClean="0"/>
+          </a:p>
+          <a:p>
+            <a:pPr lvl="1"/>
             <a:r>
               <a:rPr lang="fr-FR" b="1" dirty="0" smtClean="0">
                 <a:solidFill>
@@ -5884,7 +5344,7 @@
             </a:r>
             <a:r>
               <a:rPr lang="fr-FR" dirty="0" err="1" smtClean="0"/>
-              <a:t>Filter</a:t>
+              <a:t>Tile</a:t>
             </a:r>
             <a:r>
               <a:rPr lang="fr-FR" dirty="0" smtClean="0"/>
@@ -5912,13 +5372,80 @@
             </a:r>
           </a:p>
           <a:p>
-            <a:r>
-              <a:rPr lang="fr-FR" dirty="0" smtClean="0"/>
-              <a:t>  …</a:t>
+            <a:pPr lvl="1"/>
+            <a:r>
+              <a:rPr lang="fr-FR" dirty="0" smtClean="0"/>
+              <a:t>  </a:t>
+            </a:r>
+            <a:r>
+              <a:rPr lang="fr-FR" b="1" dirty="0" err="1" smtClean="0">
+                <a:solidFill>
+                  <a:schemeClr val="accent5"/>
+                </a:solidFill>
+              </a:rPr>
+              <a:t>static</a:t>
+            </a:r>
+            <a:r>
+              <a:rPr lang="fr-FR" dirty="0" smtClean="0"/>
+              <a:t> </a:t>
+            </a:r>
+            <a:r>
+              <a:rPr lang="fr-FR" dirty="0" err="1" smtClean="0">
+                <a:solidFill>
+                  <a:srgbClr val="7030A0"/>
+                </a:solidFill>
+              </a:rPr>
+              <a:t>propTypes</a:t>
+            </a:r>
+            <a:r>
+              <a:rPr lang="fr-FR" dirty="0" smtClean="0"/>
+              <a:t> = {</a:t>
+            </a:r>
+          </a:p>
+          <a:p>
+            <a:pPr lvl="1"/>
+            <a:r>
+              <a:rPr lang="fr-FR" dirty="0" smtClean="0"/>
+              <a:t>    value: </a:t>
+            </a:r>
+            <a:r>
+              <a:rPr lang="fr-FR" dirty="0" err="1" smtClean="0"/>
+              <a:t>React.PropTypes.number</a:t>
+            </a:r>
+            <a:r>
+              <a:rPr lang="fr-FR" dirty="0" smtClean="0"/>
+              <a:t>,</a:t>
+            </a:r>
+          </a:p>
+          <a:p>
+            <a:pPr lvl="1"/>
+            <a:r>
+              <a:rPr lang="fr-FR" dirty="0" smtClean="0"/>
+              <a:t>    </a:t>
+            </a:r>
+            <a:r>
+              <a:rPr lang="fr-FR" dirty="0" err="1" smtClean="0"/>
+              <a:t>title</a:t>
+            </a:r>
+            <a:r>
+              <a:rPr lang="fr-FR" dirty="0" smtClean="0"/>
+              <a:t>: </a:t>
+            </a:r>
+            <a:r>
+              <a:rPr lang="fr-FR" dirty="0" err="1" smtClean="0"/>
+              <a:t>React.PropTypes.string</a:t>
             </a:r>
             <a:endParaRPr lang="fr-FR" dirty="0" smtClean="0"/>
           </a:p>
           <a:p>
+            <a:pPr lvl="1"/>
+            <a:r>
+              <a:rPr lang="fr-FR" dirty="0" smtClean="0"/>
+              <a:t>  };</a:t>
+            </a:r>
+          </a:p>
+          <a:p>
+            <a:pPr lvl="1"/>
             <a:r>
               <a:rPr lang="fr-FR" dirty="0" smtClean="0"/>
               <a:t>  </a:t>
@@ -5937,6 +5464,7 @@
             </a:r>
           </a:p>
           <a:p>
+            <a:pPr lvl="1"/>
             <a:r>
               <a:rPr lang="fr-FR" dirty="0" smtClean="0"/>
               <a:t>    </a:t>
@@ -5951,13 +5479,7 @@
             </a:r>
             <a:r>
               <a:rPr lang="fr-FR" dirty="0" smtClean="0"/>
-              <a:t> (</a:t>
-            </a:r>
-          </a:p>
-          <a:p>
-            <a:r>
-              <a:rPr lang="fr-FR" dirty="0" smtClean="0"/>
-              <a:t>      &lt;</a:t>
+              <a:t> ( &lt;</a:t>
             </a:r>
             <a:r>
               <a:rPr lang="fr-FR" dirty="0" err="1" smtClean="0">
@@ -5997,41 +5519,7 @@
                   </a:schemeClr>
                 </a:solidFill>
               </a:rPr>
-              <a:t>filter</a:t>
-            </a:r>
-            <a:r>
-              <a:rPr lang="fr-FR" dirty="0" smtClean="0">
-                <a:solidFill>
-                  <a:schemeClr val="accent6">
-                    <a:lumMod val="75000"/>
-                  </a:schemeClr>
-                </a:solidFill>
-              </a:rPr>
-              <a:t>-input"</a:t>
-            </a:r>
-            <a:r>
-              <a:rPr lang="fr-FR" dirty="0" smtClean="0"/>
-              <a:t>&gt;</a:t>
-            </a:r>
-          </a:p>
-          <a:p>
-            <a:r>
-              <a:rPr lang="fr-FR" dirty="0" smtClean="0"/>
-              <a:t>        &lt;</a:t>
-            </a:r>
-            <a:r>
-              <a:rPr lang="fr-FR" dirty="0" smtClean="0">
-                <a:solidFill>
-                  <a:srgbClr val="C00000"/>
-                </a:solidFill>
-              </a:rPr>
-              <a:t>input</a:t>
-            </a:r>
-          </a:p>
-          <a:p>
-            <a:r>
-              <a:rPr lang="fr-FR" dirty="0" smtClean="0"/>
-              <a:t>          type=</a:t>
+              <a:t>tile</a:t>
             </a:r>
             <a:r>
               <a:rPr lang="fr-FR" dirty="0" smtClean="0">
@@ -6044,14 +5532,35 @@
               <a:t>"</a:t>
             </a:r>
             <a:r>
+              <a:rPr lang="fr-FR" dirty="0" smtClean="0"/>
+              <a:t>&gt;</a:t>
+            </a:r>
+          </a:p>
+          <a:p>
+            <a:pPr lvl="1"/>
+            <a:r>
+              <a:rPr lang="fr-FR" dirty="0" smtClean="0"/>
+              <a:t>        &lt;</a:t>
+            </a:r>
+            <a:r>
               <a:rPr lang="fr-FR" dirty="0" err="1" smtClean="0">
                 <a:solidFill>
-                  <a:schemeClr val="accent6">
-                    <a:lumMod val="75000"/>
-                  </a:schemeClr>
+                  <a:srgbClr val="C00000"/>
                 </a:solidFill>
               </a:rPr>
-              <a:t>text</a:t>
+              <a:t>div</a:t>
+            </a:r>
+            <a:r>
+              <a:rPr lang="fr-FR" dirty="0" smtClean="0"/>
+              <a:t> </a:t>
+            </a:r>
+            <a:r>
+              <a:rPr lang="fr-FR" dirty="0" err="1" smtClean="0"/>
+              <a:t>className</a:t>
+            </a:r>
+            <a:r>
+              <a:rPr lang="fr-FR" dirty="0" smtClean="0"/>
+              <a:t>=</a:t>
             </a:r>
             <a:r>
               <a:rPr lang="fr-FR" dirty="0" smtClean="0">
@@ -6063,75 +5572,45 @@
               </a:rPr>
               <a:t>"</a:t>
             </a:r>
-          </a:p>
-          <a:p>
-            <a:r>
-              <a:rPr lang="fr-FR" dirty="0" smtClean="0"/>
-              <a:t>          value={</a:t>
+            <a:r>
+              <a:rPr lang="fr-FR" dirty="0" err="1" smtClean="0">
+                <a:solidFill>
+                  <a:schemeClr val="accent6">
+                    <a:lumMod val="75000"/>
+                  </a:schemeClr>
+                </a:solidFill>
+              </a:rPr>
+              <a:t>tile</a:t>
+            </a:r>
+            <a:r>
+              <a:rPr lang="fr-FR" dirty="0" smtClean="0">
+                <a:solidFill>
+                  <a:schemeClr val="accent6">
+                    <a:lumMod val="75000"/>
+                  </a:schemeClr>
+                </a:solidFill>
+              </a:rPr>
+              <a:t>-header"</a:t>
+            </a:r>
+            <a:r>
+              <a:rPr lang="fr-FR" dirty="0" smtClean="0"/>
+              <a:t>&gt;{</a:t>
+            </a:r>
+            <a:r>
+              <a:rPr lang="fr-FR" b="1" dirty="0" err="1" smtClean="0">
+                <a:solidFill>
+                  <a:schemeClr val="accent5"/>
+                </a:solidFill>
+              </a:rPr>
+              <a:t>this</a:t>
             </a:r>
             <a:r>
               <a:rPr lang="fr-FR" dirty="0" err="1" smtClean="0"/>
-              <a:t>this.props.filterText</a:t>
-            </a:r>
-            <a:r>
-              <a:rPr lang="fr-FR" dirty="0" smtClean="0"/>
-              <a:t>}</a:t>
-            </a:r>
-          </a:p>
-          <a:p>
-            <a:r>
-              <a:rPr lang="fr-FR" dirty="0" smtClean="0"/>
-              <a:t>          </a:t>
-            </a:r>
-            <a:r>
-              <a:rPr lang="fr-FR" dirty="0" err="1" smtClean="0"/>
-              <a:t>placeholder</a:t>
-            </a:r>
-            <a:r>
-              <a:rPr lang="fr-FR" dirty="0" smtClean="0"/>
-              <a:t>={</a:t>
-            </a:r>
-            <a:r>
-              <a:rPr lang="fr-FR" dirty="0" err="1" smtClean="0"/>
-              <a:t>this.props.placeholder</a:t>
-            </a:r>
-            <a:r>
-              <a:rPr lang="fr-FR" dirty="0" smtClean="0"/>
-              <a:t>}</a:t>
-            </a:r>
-          </a:p>
-          <a:p>
-            <a:r>
-              <a:rPr lang="fr-FR" dirty="0" smtClean="0"/>
-              <a:t>          </a:t>
-            </a:r>
-            <a:r>
-              <a:rPr lang="fr-FR" dirty="0" err="1" smtClean="0"/>
-              <a:t>onChange</a:t>
-            </a:r>
-            <a:r>
-              <a:rPr lang="fr-FR" dirty="0" smtClean="0"/>
-              <a:t>={</a:t>
-            </a:r>
-            <a:r>
-              <a:rPr lang="fr-FR" dirty="0" err="1" smtClean="0"/>
-              <a:t>this.props.handleFilter</a:t>
-            </a:r>
-            <a:r>
-              <a:rPr lang="fr-FR" dirty="0" smtClean="0"/>
-              <a:t>}</a:t>
-            </a:r>
-          </a:p>
-          <a:p>
-            <a:r>
-              <a:rPr lang="fr-FR" dirty="0" smtClean="0"/>
-              <a:t>        /&gt;</a:t>
-            </a:r>
-          </a:p>
-          <a:p>
-            <a:r>
-              <a:rPr lang="fr-FR" dirty="0" smtClean="0"/>
-              <a:t>      &lt;/</a:t>
+              <a:t>.props.title</a:t>
+            </a:r>
+            <a:r>
+              <a:rPr lang="fr-FR" dirty="0" smtClean="0"/>
+              <a:t>}&lt;/</a:t>
             </a:r>
             <a:r>
               <a:rPr lang="fr-FR" dirty="0" err="1" smtClean="0">
@@ -6143,20 +5622,162 @@
             </a:r>
             <a:r>
               <a:rPr lang="fr-FR" dirty="0" smtClean="0"/>
-              <a:t>&gt;);</a:t>
-            </a:r>
-          </a:p>
-          <a:p>
+              <a:t>&gt;</a:t>
+            </a:r>
+          </a:p>
+          <a:p>
+            <a:pPr lvl="1"/>
+            <a:r>
+              <a:rPr lang="fr-FR" dirty="0" smtClean="0"/>
+              <a:t>        &lt;</a:t>
+            </a:r>
+            <a:r>
+              <a:rPr lang="fr-FR" dirty="0" err="1" smtClean="0">
+                <a:solidFill>
+                  <a:srgbClr val="C00000"/>
+                </a:solidFill>
+              </a:rPr>
+              <a:t>div</a:t>
+            </a:r>
+            <a:r>
+              <a:rPr lang="fr-FR" dirty="0" smtClean="0"/>
+              <a:t> </a:t>
+            </a:r>
+            <a:r>
+              <a:rPr lang="fr-FR" dirty="0" err="1" smtClean="0"/>
+              <a:t>className</a:t>
+            </a:r>
+            <a:r>
+              <a:rPr lang="fr-FR" dirty="0" smtClean="0"/>
+              <a:t>=</a:t>
+            </a:r>
+            <a:r>
+              <a:rPr lang="fr-FR" dirty="0" smtClean="0">
+                <a:solidFill>
+                  <a:schemeClr val="accent6">
+                    <a:lumMod val="75000"/>
+                  </a:schemeClr>
+                </a:solidFill>
+              </a:rPr>
+              <a:t>"</a:t>
+            </a:r>
+            <a:r>
+              <a:rPr lang="fr-FR" dirty="0" err="1" smtClean="0">
+                <a:solidFill>
+                  <a:schemeClr val="accent6">
+                    <a:lumMod val="75000"/>
+                  </a:schemeClr>
+                </a:solidFill>
+              </a:rPr>
+              <a:t>tile</a:t>
+            </a:r>
+            <a:r>
+              <a:rPr lang="fr-FR" dirty="0" smtClean="0">
+                <a:solidFill>
+                  <a:schemeClr val="accent6">
+                    <a:lumMod val="75000"/>
+                  </a:schemeClr>
+                </a:solidFill>
+              </a:rPr>
+              <a:t>-value"</a:t>
+            </a:r>
+            <a:r>
+              <a:rPr lang="fr-FR" dirty="0" smtClean="0"/>
+              <a:t>&gt;{</a:t>
+            </a:r>
+            <a:r>
+              <a:rPr lang="fr-FR" dirty="0" err="1" smtClean="0"/>
+              <a:t>numeral</a:t>
+            </a:r>
+            <a:r>
+              <a:rPr lang="fr-FR" dirty="0" smtClean="0"/>
+              <a:t>(</a:t>
+            </a:r>
+            <a:r>
+              <a:rPr lang="fr-FR" b="1" dirty="0" err="1" smtClean="0">
+                <a:solidFill>
+                  <a:schemeClr val="accent5"/>
+                </a:solidFill>
+              </a:rPr>
+              <a:t>this</a:t>
+            </a:r>
+            <a:r>
+              <a:rPr lang="fr-FR" dirty="0" err="1" smtClean="0"/>
+              <a:t>.props.value</a:t>
+            </a:r>
+            <a:r>
+              <a:rPr lang="fr-FR" dirty="0" smtClean="0"/>
+              <a:t>).format(</a:t>
+            </a:r>
+            <a:r>
+              <a:rPr lang="fr-FR" dirty="0" smtClean="0">
+                <a:solidFill>
+                  <a:schemeClr val="accent6">
+                    <a:lumMod val="75000"/>
+                  </a:schemeClr>
+                </a:solidFill>
+              </a:rPr>
+              <a:t>'0.00'</a:t>
+            </a:r>
+            <a:r>
+              <a:rPr lang="fr-FR" dirty="0" smtClean="0"/>
+              <a:t>)}&lt;/</a:t>
+            </a:r>
+            <a:r>
+              <a:rPr lang="fr-FR" dirty="0" err="1" smtClean="0">
+                <a:solidFill>
+                  <a:srgbClr val="C00000"/>
+                </a:solidFill>
+              </a:rPr>
+              <a:t>div</a:t>
+            </a:r>
+            <a:r>
+              <a:rPr lang="fr-FR" dirty="0" smtClean="0"/>
+              <a:t>&gt;</a:t>
+            </a:r>
+          </a:p>
+          <a:p>
+            <a:pPr lvl="1"/>
+            <a:r>
+              <a:rPr lang="fr-FR" dirty="0" smtClean="0"/>
+              <a:t>      &lt;/</a:t>
+            </a:r>
+            <a:r>
+              <a:rPr lang="fr-FR" dirty="0" err="1" smtClean="0">
+                <a:solidFill>
+                  <a:srgbClr val="C00000"/>
+                </a:solidFill>
+              </a:rPr>
+              <a:t>div</a:t>
+            </a:r>
+            <a:r>
+              <a:rPr lang="fr-FR" dirty="0" smtClean="0"/>
+              <a:t>&gt;</a:t>
+            </a:r>
+          </a:p>
+          <a:p>
+            <a:pPr lvl="1"/>
+            <a:r>
+              <a:rPr lang="fr-FR" dirty="0" smtClean="0"/>
+              <a:t>    );</a:t>
+            </a:r>
+          </a:p>
+          <a:p>
+            <a:pPr lvl="1"/>
             <a:r>
               <a:rPr lang="fr-FR" dirty="0" smtClean="0"/>
               <a:t>  }</a:t>
             </a:r>
           </a:p>
           <a:p>
+            <a:pPr lvl="1"/>
             <a:r>
               <a:rPr lang="fr-FR" dirty="0" smtClean="0"/>
               <a:t>}</a:t>
             </a:r>
+          </a:p>
+          <a:p>
+            <a:pPr lvl="1"/>
             <a:endParaRPr lang="fr-FR" dirty="0"/>
           </a:p>
         </p:txBody>
@@ -6169,13 +5790,13 @@
         </p:nvSpPr>
         <p:spPr>
           <a:xfrm>
-            <a:off x="190500" y="4356100"/>
-            <a:ext cx="1574800" cy="1295400"/>
+            <a:off x="203200" y="3060700"/>
+            <a:ext cx="1574800" cy="939800"/>
           </a:xfrm>
           <a:prstGeom prst="wedgeRectCallout">
             <a:avLst>
-              <a:gd name="adj1" fmla="val 91425"/>
-              <a:gd name="adj2" fmla="val -49370"/>
+              <a:gd name="adj1" fmla="val 97877"/>
+              <a:gd name="adj2" fmla="val -78040"/>
             </a:avLst>
           </a:prstGeom>
         </p:spPr>
@@ -6202,32 +5823,134 @@
             <a:pPr algn="ctr"/>
             <a:r>
               <a:rPr lang="fr-FR" dirty="0" err="1" smtClean="0"/>
-              <a:t>Bind</a:t>
+              <a:t>Properties</a:t>
+            </a:r>
+            <a:r>
+              <a:rPr lang="fr-FR" dirty="0" smtClean="0"/>
+              <a:t> types</a:t>
+            </a:r>
+            <a:endParaRPr lang="fr-FR" dirty="0"/>
+          </a:p>
+        </p:txBody>
+      </p:sp>
+      <p:sp>
+        <p:nvSpPr>
+          <p:cNvPr id="13" name="Rectangle 12"/>
+          <p:cNvSpPr/>
+          <p:nvPr/>
+        </p:nvSpPr>
+        <p:spPr>
+          <a:xfrm>
+            <a:off x="10452100" y="4445000"/>
+            <a:ext cx="1574800" cy="939800"/>
+          </a:xfrm>
+          <a:prstGeom prst="wedgeRectCallout">
+            <a:avLst>
+              <a:gd name="adj1" fmla="val -117446"/>
+              <a:gd name="adj2" fmla="val -38851"/>
+            </a:avLst>
+          </a:prstGeom>
+        </p:spPr>
+        <p:style>
+          <a:lnRef idx="2">
+            <a:schemeClr val="accent1">
+              <a:shade val="50000"/>
+            </a:schemeClr>
+          </a:lnRef>
+          <a:fillRef idx="1">
+            <a:schemeClr val="accent1"/>
+          </a:fillRef>
+          <a:effectRef idx="0">
+            <a:schemeClr val="accent1"/>
+          </a:effectRef>
+          <a:fontRef idx="minor">
+            <a:schemeClr val="lt1"/>
+          </a:fontRef>
+        </p:style>
+        <p:txBody>
+          <a:bodyPr rtlCol="0" anchor="ctr"/>
+          <a:lstStyle/>
+          <a:p>
+            <a:pPr algn="ctr"/>
+            <a:r>
+              <a:rPr lang="fr-FR" dirty="0" smtClean="0"/>
+              <a:t>JSX </a:t>
+            </a:r>
+            <a:r>
+              <a:rPr lang="fr-FR" dirty="0" err="1" smtClean="0"/>
+              <a:t>declarations</a:t>
+            </a:r>
+            <a:endParaRPr lang="fr-FR" dirty="0"/>
+          </a:p>
+        </p:txBody>
+      </p:sp>
+      <p:sp>
+        <p:nvSpPr>
+          <p:cNvPr id="14" name="Rectangle 13"/>
+          <p:cNvSpPr/>
+          <p:nvPr/>
+        </p:nvSpPr>
+        <p:spPr>
+          <a:xfrm>
+            <a:off x="190500" y="1854200"/>
+            <a:ext cx="1574800" cy="939800"/>
+          </a:xfrm>
+          <a:prstGeom prst="wedgeRectCallout">
+            <a:avLst>
+              <a:gd name="adj1" fmla="val 87393"/>
+              <a:gd name="adj2" fmla="val -15878"/>
+            </a:avLst>
+          </a:prstGeom>
+        </p:spPr>
+        <p:style>
+          <a:lnRef idx="2">
+            <a:schemeClr val="accent1">
+              <a:shade val="50000"/>
+            </a:schemeClr>
+          </a:lnRef>
+          <a:fillRef idx="1">
+            <a:schemeClr val="accent1"/>
+          </a:fillRef>
+          <a:effectRef idx="0">
+            <a:schemeClr val="accent1"/>
+          </a:effectRef>
+          <a:fontRef idx="minor">
+            <a:schemeClr val="lt1"/>
+          </a:fontRef>
+        </p:style>
+        <p:txBody>
+          <a:bodyPr rtlCol="0" anchor="ctr"/>
+          <a:lstStyle/>
+          <a:p>
+            <a:pPr algn="ctr"/>
+            <a:r>
+              <a:rPr lang="fr-FR" dirty="0" err="1" smtClean="0"/>
+              <a:t>Reusable</a:t>
             </a:r>
             <a:r>
               <a:rPr lang="fr-FR" dirty="0" smtClean="0"/>
               <a:t> </a:t>
             </a:r>
             <a:r>
-              <a:rPr lang="fr-FR" dirty="0" err="1" smtClean="0"/>
-              <a:t>functions</a:t>
-            </a:r>
-            <a:r>
-              <a:rPr lang="fr-FR" dirty="0" smtClean="0"/>
-              <a:t> to </a:t>
-            </a:r>
-            <a:r>
-              <a:rPr lang="fr-FR" dirty="0" err="1" smtClean="0"/>
-              <a:t>events</a:t>
-            </a:r>
-            <a:endParaRPr lang="fr-FR" dirty="0"/>
+              <a:rPr lang="fr-FR" b="1" dirty="0" smtClean="0"/>
+              <a:t>class</a:t>
+            </a:r>
+            <a:r>
+              <a:rPr lang="fr-FR" dirty="0" smtClean="0"/>
+              <a:t> or </a:t>
+            </a:r>
+            <a:r>
+              <a:rPr lang="fr-FR" b="1" dirty="0" err="1" smtClean="0"/>
+              <a:t>function</a:t>
+            </a:r>
+            <a:endParaRPr lang="fr-FR" b="1" dirty="0"/>
           </a:p>
         </p:txBody>
       </p:sp>
     </p:spTree>
     <p:extLst>
       <p:ext uri="{BB962C8B-B14F-4D97-AF65-F5344CB8AC3E}">
-        <p14:creationId xmlns:p14="http://schemas.microsoft.com/office/powerpoint/2010/main" xmlns="" val="3296308957"/>
+        <p14:creationId xmlns:p14="http://schemas.microsoft.com/office/powerpoint/2010/main" val="3296308957"/>
       </p:ext>
     </p:extLst>
   </p:cSld>
@@ -6263,7 +5986,7 @@
       </p:grpSpPr>
       <p:sp>
         <p:nvSpPr>
-          <p:cNvPr id="2" name="Titre 1"/>
+          <p:cNvPr id="2" name="Title 1"/>
           <p:cNvSpPr>
             <a:spLocks noGrp="1"/>
           </p:cNvSpPr>
@@ -6278,15 +6001,11 @@
           <a:p>
             <a:r>
               <a:rPr lang="fr-FR" dirty="0" err="1" smtClean="0"/>
-              <a:t>Rendering</a:t>
-            </a:r>
-            <a:r>
-              <a:rPr lang="fr-FR" dirty="0" smtClean="0"/>
-              <a:t> </a:t>
-            </a:r>
-            <a:r>
-              <a:rPr lang="fr-FR" dirty="0" err="1" smtClean="0"/>
-              <a:t>workflow</a:t>
+              <a:t>Adding</a:t>
+            </a:r>
+            <a:r>
+              <a:rPr lang="fr-FR" dirty="0" smtClean="0"/>
+              <a:t> user interactions</a:t>
             </a:r>
             <a:endParaRPr lang="fr-FR" dirty="0"/>
           </a:p>
@@ -6294,26 +6013,7 @@
       </p:sp>
       <p:sp>
         <p:nvSpPr>
-          <p:cNvPr id="3" name="Espace réservé du contenu 2"/>
-          <p:cNvSpPr>
-            <a:spLocks noGrp="1"/>
-          </p:cNvSpPr>
-          <p:nvPr>
-            <p:ph idx="1"/>
-          </p:nvPr>
-        </p:nvSpPr>
-        <p:spPr/>
-        <p:txBody>
-          <a:bodyPr/>
-          <a:lstStyle/>
-          <a:p>
-            <a:endParaRPr lang="fr-FR"/>
-          </a:p>
-        </p:txBody>
-      </p:sp>
-      <p:sp>
-        <p:nvSpPr>
-          <p:cNvPr id="4" name="Espace réservé de la date 3"/>
+          <p:cNvPr id="4" name="Date Placeholder 3"/>
           <p:cNvSpPr>
             <a:spLocks noGrp="1"/>
           </p:cNvSpPr>
@@ -6327,16 +6027,16 @@
           <a:lstStyle/>
           <a:p>
             <a:r>
-              <a:rPr lang="fr-FR" smtClean="0"/>
+              <a:rPr lang="fr-FR" dirty="0" smtClean="0"/>
               <a:t>2017</a:t>
             </a:r>
-            <a:endParaRPr lang="fr-FR"/>
-          </a:p>
-        </p:txBody>
-      </p:sp>
-      <p:sp>
-        <p:nvSpPr>
-          <p:cNvPr id="5" name="Espace réservé du pied de page 4"/>
+            <a:endParaRPr lang="fr-FR" dirty="0"/>
+          </a:p>
+        </p:txBody>
+      </p:sp>
+      <p:sp>
+        <p:nvSpPr>
+          <p:cNvPr id="5" name="Footer Placeholder 4"/>
           <p:cNvSpPr>
             <a:spLocks noGrp="1"/>
           </p:cNvSpPr>
@@ -6350,7 +6050,7 @@
           <a:lstStyle/>
           <a:p>
             <a:r>
-              <a:rPr lang="fr-FR" smtClean="0"/>
+              <a:rPr lang="fr-FR" dirty="0" smtClean="0"/>
               <a:t>cedric.hartland@gmail.com</a:t>
             </a:r>
             <a:endParaRPr lang="fr-FR" dirty="0"/>
@@ -6359,7 +6059,7 @@
       </p:sp>
       <p:sp>
         <p:nvSpPr>
-          <p:cNvPr id="6" name="Espace réservé du numéro de diapositive 5"/>
+          <p:cNvPr id="6" name="Slide Number Placeholder 5"/>
           <p:cNvSpPr>
             <a:spLocks noGrp="1"/>
           </p:cNvSpPr>
@@ -6377,11 +6077,402 @@
               <a:pPr/>
               <a:t>7</a:t>
             </a:fld>
-            <a:endParaRPr lang="fr-FR"/>
+            <a:endParaRPr lang="fr-FR" dirty="0"/>
+          </a:p>
+        </p:txBody>
+      </p:sp>
+      <p:sp>
+        <p:nvSpPr>
+          <p:cNvPr id="11" name="Rectangle 10"/>
+          <p:cNvSpPr/>
+          <p:nvPr/>
+        </p:nvSpPr>
+        <p:spPr>
+          <a:xfrm>
+            <a:off x="1851025" y="1714709"/>
+            <a:ext cx="8489950" cy="3970318"/>
+          </a:xfrm>
+          <a:prstGeom prst="rect">
+            <a:avLst/>
+          </a:prstGeom>
+          <a:solidFill>
+            <a:schemeClr val="bg1">
+              <a:lumMod val="95000"/>
+            </a:schemeClr>
+          </a:solidFill>
+          <a:effectLst>
+            <a:outerShdw blurRad="50800" dist="38100" dir="2700000" algn="tl" rotWithShape="0">
+              <a:prstClr val="black">
+                <a:alpha val="40000"/>
+              </a:prstClr>
+            </a:outerShdw>
+          </a:effectLst>
+        </p:spPr>
+        <p:txBody>
+          <a:bodyPr wrap="square">
+            <a:spAutoFit/>
+          </a:bodyPr>
+          <a:lstStyle/>
+          <a:p>
+            <a:r>
+              <a:rPr lang="fr-FR" b="1" dirty="0" smtClean="0">
+                <a:solidFill>
+                  <a:schemeClr val="accent5"/>
+                </a:solidFill>
+              </a:rPr>
+              <a:t>class</a:t>
+            </a:r>
+            <a:r>
+              <a:rPr lang="fr-FR" dirty="0" smtClean="0"/>
+              <a:t> </a:t>
+            </a:r>
+            <a:r>
+              <a:rPr lang="fr-FR" dirty="0" err="1" smtClean="0"/>
+              <a:t>Filter</a:t>
+            </a:r>
+            <a:r>
+              <a:rPr lang="fr-FR" dirty="0" smtClean="0"/>
+              <a:t> </a:t>
+            </a:r>
+            <a:r>
+              <a:rPr lang="fr-FR" b="1" dirty="0" err="1" smtClean="0">
+                <a:solidFill>
+                  <a:schemeClr val="accent5"/>
+                </a:solidFill>
+              </a:rPr>
+              <a:t>extends</a:t>
+            </a:r>
+            <a:r>
+              <a:rPr lang="fr-FR" dirty="0" smtClean="0"/>
+              <a:t> </a:t>
+            </a:r>
+            <a:r>
+              <a:rPr lang="fr-FR" dirty="0" err="1" smtClean="0"/>
+              <a:t>React.Component</a:t>
+            </a:r>
+            <a:r>
+              <a:rPr lang="fr-FR" dirty="0" smtClean="0"/>
+              <a:t> {</a:t>
+            </a:r>
+          </a:p>
+          <a:p>
+            <a:r>
+              <a:rPr lang="fr-FR" dirty="0" smtClean="0"/>
+              <a:t>  …</a:t>
+            </a:r>
+          </a:p>
+          <a:p>
+            <a:r>
+              <a:rPr lang="fr-FR" dirty="0" smtClean="0"/>
+              <a:t>  </a:t>
+            </a:r>
+            <a:r>
+              <a:rPr lang="fr-FR" dirty="0" err="1" smtClean="0">
+                <a:solidFill>
+                  <a:srgbClr val="7030A0"/>
+                </a:solidFill>
+              </a:rPr>
+              <a:t>render</a:t>
+            </a:r>
+            <a:r>
+              <a:rPr lang="fr-FR" dirty="0" smtClean="0"/>
+              <a:t>() {</a:t>
+            </a:r>
+          </a:p>
+          <a:p>
+            <a:r>
+              <a:rPr lang="fr-FR" dirty="0" smtClean="0"/>
+              <a:t>    </a:t>
+            </a:r>
+            <a:r>
+              <a:rPr lang="fr-FR" b="1" dirty="0" smtClean="0">
+                <a:solidFill>
+                  <a:schemeClr val="accent5"/>
+                </a:solidFill>
+              </a:rPr>
+              <a:t>return</a:t>
+            </a:r>
+            <a:r>
+              <a:rPr lang="fr-FR" dirty="0" smtClean="0"/>
+              <a:t> (</a:t>
+            </a:r>
+          </a:p>
+          <a:p>
+            <a:r>
+              <a:rPr lang="fr-FR" dirty="0" smtClean="0"/>
+              <a:t>      &lt;</a:t>
+            </a:r>
+            <a:r>
+              <a:rPr lang="fr-FR" dirty="0" err="1" smtClean="0">
+                <a:solidFill>
+                  <a:srgbClr val="C00000"/>
+                </a:solidFill>
+              </a:rPr>
+              <a:t>div</a:t>
+            </a:r>
+            <a:r>
+              <a:rPr lang="fr-FR" dirty="0" smtClean="0"/>
+              <a:t> </a:t>
+            </a:r>
+            <a:r>
+              <a:rPr lang="fr-FR" dirty="0" err="1" smtClean="0"/>
+              <a:t>className</a:t>
+            </a:r>
+            <a:r>
+              <a:rPr lang="fr-FR" dirty="0" smtClean="0"/>
+              <a:t>=</a:t>
+            </a:r>
+            <a:r>
+              <a:rPr lang="fr-FR" dirty="0" smtClean="0">
+                <a:solidFill>
+                  <a:schemeClr val="accent6">
+                    <a:lumMod val="75000"/>
+                  </a:schemeClr>
+                </a:solidFill>
+              </a:rPr>
+              <a:t>"</a:t>
+            </a:r>
+            <a:r>
+              <a:rPr lang="fr-FR" dirty="0" err="1" smtClean="0">
+                <a:solidFill>
+                  <a:schemeClr val="accent6">
+                    <a:lumMod val="75000"/>
+                  </a:schemeClr>
+                </a:solidFill>
+              </a:rPr>
+              <a:t>filter</a:t>
+            </a:r>
+            <a:r>
+              <a:rPr lang="fr-FR" dirty="0" smtClean="0">
+                <a:solidFill>
+                  <a:schemeClr val="accent6">
+                    <a:lumMod val="75000"/>
+                  </a:schemeClr>
+                </a:solidFill>
+              </a:rPr>
+              <a:t>-input"</a:t>
+            </a:r>
+            <a:r>
+              <a:rPr lang="fr-FR" dirty="0" smtClean="0"/>
+              <a:t>&gt;</a:t>
+            </a:r>
+          </a:p>
+          <a:p>
+            <a:r>
+              <a:rPr lang="fr-FR" dirty="0" smtClean="0"/>
+              <a:t>        &lt;</a:t>
+            </a:r>
+            <a:r>
+              <a:rPr lang="fr-FR" dirty="0" smtClean="0">
+                <a:solidFill>
+                  <a:srgbClr val="C00000"/>
+                </a:solidFill>
+              </a:rPr>
+              <a:t>input</a:t>
+            </a:r>
+          </a:p>
+          <a:p>
+            <a:r>
+              <a:rPr lang="fr-FR" dirty="0" smtClean="0"/>
+              <a:t>          type=</a:t>
+            </a:r>
+            <a:r>
+              <a:rPr lang="fr-FR" dirty="0" smtClean="0">
+                <a:solidFill>
+                  <a:schemeClr val="accent6">
+                    <a:lumMod val="75000"/>
+                  </a:schemeClr>
+                </a:solidFill>
+              </a:rPr>
+              <a:t>"</a:t>
+            </a:r>
+            <a:r>
+              <a:rPr lang="fr-FR" dirty="0" err="1" smtClean="0">
+                <a:solidFill>
+                  <a:schemeClr val="accent6">
+                    <a:lumMod val="75000"/>
+                  </a:schemeClr>
+                </a:solidFill>
+              </a:rPr>
+              <a:t>text</a:t>
+            </a:r>
+            <a:r>
+              <a:rPr lang="fr-FR" dirty="0" smtClean="0">
+                <a:solidFill>
+                  <a:schemeClr val="accent6">
+                    <a:lumMod val="75000"/>
+                  </a:schemeClr>
+                </a:solidFill>
+              </a:rPr>
+              <a:t>"</a:t>
+            </a:r>
+          </a:p>
+          <a:p>
+            <a:r>
+              <a:rPr lang="fr-FR" dirty="0" smtClean="0"/>
+              <a:t>          value={</a:t>
+            </a:r>
+            <a:r>
+              <a:rPr lang="fr-FR" dirty="0" err="1" smtClean="0"/>
+              <a:t>this.props.filterText</a:t>
+            </a:r>
+            <a:r>
+              <a:rPr lang="fr-FR" dirty="0" smtClean="0"/>
+              <a:t>}</a:t>
+            </a:r>
+          </a:p>
+          <a:p>
+            <a:r>
+              <a:rPr lang="fr-FR" dirty="0" smtClean="0"/>
+              <a:t>          </a:t>
+            </a:r>
+            <a:r>
+              <a:rPr lang="fr-FR" dirty="0" err="1" smtClean="0"/>
+              <a:t>placeholder</a:t>
+            </a:r>
+            <a:r>
+              <a:rPr lang="fr-FR" dirty="0" smtClean="0"/>
+              <a:t>={</a:t>
+            </a:r>
+            <a:r>
+              <a:rPr lang="fr-FR" dirty="0" err="1" smtClean="0"/>
+              <a:t>this.props.placeholder</a:t>
+            </a:r>
+            <a:r>
+              <a:rPr lang="fr-FR" dirty="0" smtClean="0"/>
+              <a:t>}</a:t>
+            </a:r>
+          </a:p>
+          <a:p>
+            <a:r>
+              <a:rPr lang="fr-FR" dirty="0" smtClean="0"/>
+              <a:t>          </a:t>
+            </a:r>
+            <a:r>
+              <a:rPr lang="fr-FR" dirty="0" err="1" smtClean="0"/>
+              <a:t>onChange</a:t>
+            </a:r>
+            <a:r>
+              <a:rPr lang="fr-FR" dirty="0" smtClean="0"/>
+              <a:t>={</a:t>
+            </a:r>
+            <a:r>
+              <a:rPr lang="fr-FR" dirty="0" err="1" smtClean="0"/>
+              <a:t>this.props.handleFilter</a:t>
+            </a:r>
+            <a:r>
+              <a:rPr lang="fr-FR" dirty="0" smtClean="0"/>
+              <a:t>}</a:t>
+            </a:r>
+          </a:p>
+          <a:p>
+            <a:r>
+              <a:rPr lang="fr-FR" dirty="0" smtClean="0"/>
+              <a:t>        /&gt;</a:t>
+            </a:r>
+          </a:p>
+          <a:p>
+            <a:r>
+              <a:rPr lang="fr-FR" dirty="0" smtClean="0"/>
+              <a:t>      &lt;/</a:t>
+            </a:r>
+            <a:r>
+              <a:rPr lang="fr-FR" dirty="0" err="1" smtClean="0">
+                <a:solidFill>
+                  <a:srgbClr val="C00000"/>
+                </a:solidFill>
+              </a:rPr>
+              <a:t>div</a:t>
+            </a:r>
+            <a:r>
+              <a:rPr lang="fr-FR" dirty="0" smtClean="0"/>
+              <a:t>&gt;);</a:t>
+            </a:r>
+          </a:p>
+          <a:p>
+            <a:r>
+              <a:rPr lang="fr-FR" dirty="0" smtClean="0"/>
+              <a:t>  }</a:t>
+            </a:r>
+          </a:p>
+          <a:p>
+            <a:r>
+              <a:rPr lang="fr-FR" dirty="0" smtClean="0"/>
+              <a:t>}</a:t>
+            </a:r>
+            <a:endParaRPr lang="fr-FR" dirty="0"/>
+          </a:p>
+        </p:txBody>
+      </p:sp>
+      <p:sp>
+        <p:nvSpPr>
+          <p:cNvPr id="12" name="Rectangle 11"/>
+          <p:cNvSpPr/>
+          <p:nvPr/>
+        </p:nvSpPr>
+        <p:spPr>
+          <a:xfrm>
+            <a:off x="190500" y="4356100"/>
+            <a:ext cx="1574800" cy="1295400"/>
+          </a:xfrm>
+          <a:prstGeom prst="wedgeRectCallout">
+            <a:avLst>
+              <a:gd name="adj1" fmla="val 91425"/>
+              <a:gd name="adj2" fmla="val -49370"/>
+            </a:avLst>
+          </a:prstGeom>
+        </p:spPr>
+        <p:style>
+          <a:lnRef idx="2">
+            <a:schemeClr val="accent1">
+              <a:shade val="50000"/>
+            </a:schemeClr>
+          </a:lnRef>
+          <a:fillRef idx="1">
+            <a:schemeClr val="accent1"/>
+          </a:fillRef>
+          <a:effectRef idx="0">
+            <a:schemeClr val="accent1"/>
+          </a:effectRef>
+          <a:fontRef idx="minor">
+            <a:schemeClr val="lt1"/>
+          </a:fontRef>
+        </p:style>
+        <p:txBody>
+          <a:bodyPr rtlCol="0" anchor="ctr"/>
+          <a:lstStyle/>
+          <a:p>
+            <a:pPr algn="ctr"/>
+            <a:r>
+              <a:rPr lang="fr-FR" dirty="0" err="1" smtClean="0"/>
+              <a:t>Bind</a:t>
+            </a:r>
+            <a:r>
+              <a:rPr lang="fr-FR" dirty="0" smtClean="0"/>
+              <a:t> </a:t>
+            </a:r>
+            <a:r>
+              <a:rPr lang="fr-FR" dirty="0" err="1" smtClean="0"/>
+              <a:t>functions</a:t>
+            </a:r>
+            <a:r>
+              <a:rPr lang="fr-FR" dirty="0" smtClean="0"/>
+              <a:t> to </a:t>
+            </a:r>
+            <a:r>
+              <a:rPr lang="fr-FR" dirty="0" err="1" smtClean="0"/>
+              <a:t>events</a:t>
+            </a:r>
+            <a:endParaRPr lang="fr-FR" dirty="0"/>
           </a:p>
         </p:txBody>
       </p:sp>
     </p:spTree>
+    <p:extLst>
+      <p:ext uri="{BB962C8B-B14F-4D97-AF65-F5344CB8AC3E}">
+        <p14:creationId xmlns:p14="http://schemas.microsoft.com/office/powerpoint/2010/main" val="3296308957"/>
+      </p:ext>
+    </p:extLst>
   </p:cSld>
   <p:clrMapOvr>
     <a:masterClrMapping/>
@@ -6415,7 +6506,7 @@
       </p:grpSpPr>
       <p:sp>
         <p:nvSpPr>
-          <p:cNvPr id="7" name="Title 6"/>
+          <p:cNvPr id="2" name="Titre 1"/>
           <p:cNvSpPr>
             <a:spLocks noGrp="1"/>
           </p:cNvSpPr>
@@ -6429,8 +6520,16 @@
           <a:lstStyle/>
           <a:p>
             <a:r>
-              <a:rPr lang="en-US" dirty="0" smtClean="0"/>
-              <a:t>Redux, a sweet introduction</a:t>
+              <a:rPr lang="fr-FR" dirty="0" err="1" smtClean="0"/>
+              <a:t>Rendering</a:t>
+            </a:r>
+            <a:r>
+              <a:rPr lang="fr-FR" dirty="0" smtClean="0"/>
+              <a:t> </a:t>
+            </a:r>
+            <a:r>
+              <a:rPr lang="fr-FR" dirty="0" err="1" smtClean="0"/>
+              <a:t>workflow</a:t>
             </a:r>
             <a:endParaRPr lang="fr-FR" dirty="0"/>
           </a:p>
@@ -6438,30 +6537,7 @@
       </p:sp>
       <p:sp>
         <p:nvSpPr>
-          <p:cNvPr id="8" name="Text Placeholder 7"/>
-          <p:cNvSpPr>
-            <a:spLocks noGrp="1"/>
-          </p:cNvSpPr>
-          <p:nvPr>
-            <p:ph type="body" idx="1"/>
-          </p:nvPr>
-        </p:nvSpPr>
-        <p:spPr/>
-        <p:txBody>
-          <a:bodyPr/>
-          <a:lstStyle/>
-          <a:p>
-            <a:r>
-              <a:rPr lang="en-US" dirty="0" smtClean="0"/>
-              <a:t>Single source of truth, read-only state, pure functions</a:t>
-            </a:r>
-            <a:endParaRPr lang="fr-FR" dirty="0"/>
-          </a:p>
-        </p:txBody>
-      </p:sp>
-      <p:sp>
-        <p:nvSpPr>
-          <p:cNvPr id="4" name="Date Placeholder 3"/>
+          <p:cNvPr id="4" name="Espace réservé de la date 3"/>
           <p:cNvSpPr>
             <a:spLocks noGrp="1"/>
           </p:cNvSpPr>
@@ -6484,7 +6560,7 @@
       </p:sp>
       <p:sp>
         <p:nvSpPr>
-          <p:cNvPr id="5" name="Footer Placeholder 4"/>
+          <p:cNvPr id="5" name="Espace réservé du pied de page 4"/>
           <p:cNvSpPr>
             <a:spLocks noGrp="1"/>
           </p:cNvSpPr>
@@ -6507,7 +6583,7 @@
       </p:sp>
       <p:sp>
         <p:nvSpPr>
-          <p:cNvPr id="6" name="Slide Number Placeholder 5"/>
+          <p:cNvPr id="6" name="Espace réservé du numéro de diapositive 5"/>
           <p:cNvSpPr>
             <a:spLocks noGrp="1"/>
           </p:cNvSpPr>
@@ -6529,12 +6605,31 @@
           </a:p>
         </p:txBody>
       </p:sp>
+      <p:pic>
+        <p:nvPicPr>
+          <p:cNvPr id="8" name="Picture 7"/>
+          <p:cNvPicPr>
+            <a:picLocks noChangeAspect="1"/>
+          </p:cNvPicPr>
+          <p:nvPr/>
+        </p:nvPicPr>
+        <p:blipFill>
+          <a:blip r:embed="rId2"/>
+          <a:stretch>
+            <a:fillRect/>
+          </a:stretch>
+        </p:blipFill>
+        <p:spPr>
+          <a:xfrm>
+            <a:off x="376063" y="1416908"/>
+            <a:ext cx="11439874" cy="4748084"/>
+          </a:xfrm>
+          <a:prstGeom prst="rect">
+            <a:avLst/>
+          </a:prstGeom>
+        </p:spPr>
+      </p:pic>
     </p:spTree>
-    <p:extLst>
-      <p:ext uri="{BB962C8B-B14F-4D97-AF65-F5344CB8AC3E}">
-        <p14:creationId xmlns:p14="http://schemas.microsoft.com/office/powerpoint/2010/main" xmlns="" val="188073970"/>
-      </p:ext>
-    </p:extLst>
   </p:cSld>
   <p:clrMapOvr>
     <a:masterClrMapping/>
@@ -6581,26 +6676,34 @@
           <a:bodyPr/>
           <a:lstStyle/>
           <a:p>
-            <a:endParaRPr lang="fr-FR"/>
-          </a:p>
-        </p:txBody>
-      </p:sp>
-      <p:sp>
-        <p:nvSpPr>
-          <p:cNvPr id="8" name="Content Placeholder 7"/>
-          <p:cNvSpPr>
-            <a:spLocks noGrp="1"/>
-          </p:cNvSpPr>
-          <p:nvPr>
-            <p:ph idx="1"/>
-          </p:nvPr>
-        </p:nvSpPr>
-        <p:spPr/>
-        <p:txBody>
-          <a:bodyPr/>
-          <a:lstStyle/>
-          <a:p>
-            <a:endParaRPr lang="fr-FR"/>
+            <a:r>
+              <a:rPr lang="en-US" dirty="0" smtClean="0"/>
+              <a:t>Redux, a sweet introduction</a:t>
+            </a:r>
+            <a:endParaRPr lang="fr-FR" dirty="0"/>
+          </a:p>
+        </p:txBody>
+      </p:sp>
+      <p:sp>
+        <p:nvSpPr>
+          <p:cNvPr id="8" name="Text Placeholder 7"/>
+          <p:cNvSpPr>
+            <a:spLocks noGrp="1"/>
+          </p:cNvSpPr>
+          <p:nvPr>
+            <p:ph type="body" idx="1"/>
+          </p:nvPr>
+        </p:nvSpPr>
+        <p:spPr/>
+        <p:txBody>
+          <a:bodyPr/>
+          <a:lstStyle/>
+          <a:p>
+            <a:r>
+              <a:rPr lang="en-US" dirty="0" smtClean="0"/>
+              <a:t>Single source of truth, read-only state, pure functions</a:t>
+            </a:r>
+            <a:endParaRPr lang="fr-FR" dirty="0"/>
           </a:p>
         </p:txBody>
       </p:sp>
@@ -6646,7 +6749,7 @@
               <a:rPr lang="fr-FR" smtClean="0"/>
               <a:t>cedric.hartland@gmail.com</a:t>
             </a:r>
-            <a:endParaRPr lang="fr-FR"/>
+            <a:endParaRPr lang="fr-FR" dirty="0"/>
           </a:p>
         </p:txBody>
       </p:sp>
@@ -6677,7 +6780,7 @@
     </p:spTree>
     <p:extLst>
       <p:ext uri="{BB962C8B-B14F-4D97-AF65-F5344CB8AC3E}">
-        <p14:creationId xmlns:p14="http://schemas.microsoft.com/office/powerpoint/2010/main" xmlns="" val="3916897931"/>
+        <p14:creationId xmlns:p14="http://schemas.microsoft.com/office/powerpoint/2010/main" val="188073970"/>
       </p:ext>
     </p:extLst>
   </p:cSld>
@@ -6949,7 +7052,7 @@
   <a:extraClrSchemeLst/>
   <a:extLst>
     <a:ext uri="{05A4C25C-085E-4340-85A3-A5531E510DB2}">
-      <thm15:themeFamily xmlns:thm15="http://schemas.microsoft.com/office/thememl/2012/main" xmlns="" name="Office Theme" id="{62F939B6-93AF-4DB8-9C6B-D6C7DFDC589F}" vid="{4A3C46E8-61CC-4603-A589-7422A47A8E4A}"/>
+      <thm15:themeFamily xmlns:thm15="http://schemas.microsoft.com/office/thememl/2012/main" name="Office Theme" id="{62F939B6-93AF-4DB8-9C6B-D6C7DFDC589F}" vid="{4A3C46E8-61CC-4603-A589-7422A47A8E4A}"/>
     </a:ext>
   </a:extLst>
 </a:theme>
@@ -7210,7 +7313,7 @@
   <a:extraClrSchemeLst/>
   <a:extLst>
     <a:ext uri="{05A4C25C-085E-4340-85A3-A5531E510DB2}">
-      <thm15:themeFamily xmlns:thm15="http://schemas.microsoft.com/office/thememl/2012/main" xmlns="" name="Office Theme" id="{62F939B6-93AF-4DB8-9C6B-D6C7DFDC589F}" vid="{4A3C46E8-61CC-4603-A589-7422A47A8E4A}"/>
+      <thm15:themeFamily xmlns:thm15="http://schemas.microsoft.com/office/thememl/2012/main" name="Office Theme" id="{62F939B6-93AF-4DB8-9C6B-D6C7DFDC589F}" vid="{4A3C46E8-61CC-4603-A589-7422A47A8E4A}"/>
     </a:ext>
   </a:extLst>
 </a:theme>

</xml_diff>

<commit_message>
update react rendering workflow diagram
</commit_message>
<xml_diff>
--- a/docs/React & Redux.pptx
+++ b/docs/React & Redux.pptx
@@ -137,7 +137,7 @@
   </p:defaultTextStyle>
   <p:extLst>
     <p:ext uri="{521415D9-36F7-43E2-AB2F-B90AF26B5E84}">
-      <p14:sectionLst xmlns:p14="http://schemas.microsoft.com/office/powerpoint/2010/main" xmlns="">
+      <p14:sectionLst xmlns:p14="http://schemas.microsoft.com/office/powerpoint/2010/main">
         <p14:section name="Default Section" id="{38AEF286-1107-4392-A940-F023FF97C08A}">
           <p14:sldIdLst>
             <p14:sldId id="256"/>
@@ -190,7 +190,7 @@
       </p14:sectionLst>
     </p:ext>
     <p:ext uri="{EFAFB233-063F-42B5-8137-9DF3F51BA10A}">
-      <p15:sldGuideLst xmlns:p15="http://schemas.microsoft.com/office/powerpoint/2012/main" xmlns="">
+      <p15:sldGuideLst xmlns:p15="http://schemas.microsoft.com/office/powerpoint/2012/main">
         <p15:guide id="1" orient="horz" pos="2160">
           <p15:clr>
             <a:srgbClr val="A4A3A4"/>
@@ -204,7 +204,7 @@
       </p15:sldGuideLst>
     </p:ext>
     <p:ext uri="{2D200454-40CA-4A62-9FC3-DE9A4176ACB9}">
-      <p15:notesGuideLst xmlns:p15="http://schemas.microsoft.com/office/powerpoint/2012/main" xmlns=""/>
+      <p15:notesGuideLst xmlns:p15="http://schemas.microsoft.com/office/powerpoint/2012/main"/>
     </p:ext>
   </p:extLst>
 </p:presentation>
@@ -293,7 +293,7 @@
             <a:fld id="{68F520A5-0AD6-418C-8F4A-9FB003B35E28}" type="datetimeFigureOut">
               <a:rPr lang="fr-FR" smtClean="0"/>
               <a:pPr/>
-              <a:t>27/03/2017</a:t>
+              <a:t>31/03/2017</a:t>
             </a:fld>
             <a:endParaRPr lang="fr-FR"/>
           </a:p>
@@ -453,7 +453,7 @@
             <a:fld id="{BEBDC360-122B-48B3-A8C4-3D87876233B6}" type="slidenum">
               <a:rPr lang="fr-FR" smtClean="0"/>
               <a:pPr/>
-              <a:t>‹N°›</a:t>
+              <a:t>‹#›</a:t>
             </a:fld>
             <a:endParaRPr lang="fr-FR"/>
           </a:p>
@@ -462,7 +462,7 @@
     </p:spTree>
     <p:extLst>
       <p:ext uri="{BB962C8B-B14F-4D97-AF65-F5344CB8AC3E}">
-        <p14:creationId xmlns:p14="http://schemas.microsoft.com/office/powerpoint/2010/main" xmlns="" val="713127464"/>
+        <p14:creationId xmlns:p14="http://schemas.microsoft.com/office/powerpoint/2010/main" val="713127464"/>
       </p:ext>
     </p:extLst>
   </p:cSld>
@@ -637,7 +637,7 @@
     </p:spTree>
     <p:extLst>
       <p:ext uri="{BB962C8B-B14F-4D97-AF65-F5344CB8AC3E}">
-        <p14:creationId xmlns:p14="http://schemas.microsoft.com/office/powerpoint/2010/main" xmlns="" val="3739366414"/>
+        <p14:creationId xmlns:p14="http://schemas.microsoft.com/office/powerpoint/2010/main" val="3739366414"/>
       </p:ext>
     </p:extLst>
   </p:cSld>
@@ -676,7 +676,7 @@
           <a:blip r:embed="rId2" cstate="print">
             <a:extLst>
               <a:ext uri="{28A0092B-C50C-407E-A947-70E740481C1C}">
-                <a14:useLocalDpi xmlns:a14="http://schemas.microsoft.com/office/drawing/2010/main" xmlns="" val="0"/>
+                <a14:useLocalDpi xmlns:a14="http://schemas.microsoft.com/office/drawing/2010/main" val="0"/>
               </a:ext>
             </a:extLst>
           </a:blip>
@@ -859,7 +859,7 @@
             <a:fld id="{44139E8D-6066-4080-AC46-DB89673BFC8E}" type="slidenum">
               <a:rPr lang="fr-FR" smtClean="0"/>
               <a:pPr/>
-              <a:t>‹N°›</a:t>
+              <a:t>‹#›</a:t>
             </a:fld>
             <a:endParaRPr lang="fr-FR"/>
           </a:p>
@@ -868,7 +868,7 @@
     </p:spTree>
     <p:extLst>
       <p:ext uri="{BB962C8B-B14F-4D97-AF65-F5344CB8AC3E}">
-        <p14:creationId xmlns:p14="http://schemas.microsoft.com/office/powerpoint/2010/main" xmlns="" val="2394847408"/>
+        <p14:creationId xmlns:p14="http://schemas.microsoft.com/office/powerpoint/2010/main" val="2394847408"/>
       </p:ext>
     </p:extLst>
   </p:cSld>
@@ -1041,7 +1041,7 @@
             <a:fld id="{44139E8D-6066-4080-AC46-DB89673BFC8E}" type="slidenum">
               <a:rPr lang="fr-FR" smtClean="0"/>
               <a:pPr/>
-              <a:t>‹N°›</a:t>
+              <a:t>‹#›</a:t>
             </a:fld>
             <a:endParaRPr lang="fr-FR"/>
           </a:p>
@@ -1050,7 +1050,7 @@
     </p:spTree>
     <p:extLst>
       <p:ext uri="{BB962C8B-B14F-4D97-AF65-F5344CB8AC3E}">
-        <p14:creationId xmlns:p14="http://schemas.microsoft.com/office/powerpoint/2010/main" xmlns="" val="2354828228"/>
+        <p14:creationId xmlns:p14="http://schemas.microsoft.com/office/powerpoint/2010/main" val="2354828228"/>
       </p:ext>
     </p:extLst>
   </p:cSld>
@@ -1226,7 +1226,7 @@
             <a:fld id="{44139E8D-6066-4080-AC46-DB89673BFC8E}" type="slidenum">
               <a:rPr lang="fr-FR" smtClean="0"/>
               <a:pPr/>
-              <a:t>‹N°›</a:t>
+              <a:t>‹#›</a:t>
             </a:fld>
             <a:endParaRPr lang="fr-FR"/>
           </a:p>
@@ -1235,7 +1235,7 @@
     </p:spTree>
     <p:extLst>
       <p:ext uri="{BB962C8B-B14F-4D97-AF65-F5344CB8AC3E}">
-        <p14:creationId xmlns:p14="http://schemas.microsoft.com/office/powerpoint/2010/main" xmlns="" val="449464392"/>
+        <p14:creationId xmlns:p14="http://schemas.microsoft.com/office/powerpoint/2010/main" val="449464392"/>
       </p:ext>
     </p:extLst>
   </p:cSld>
@@ -1445,7 +1445,7 @@
             <a:fld id="{44139E8D-6066-4080-AC46-DB89673BFC8E}" type="slidenum">
               <a:rPr lang="fr-FR" smtClean="0"/>
               <a:pPr/>
-              <a:t>‹N°›</a:t>
+              <a:t>‹#›</a:t>
             </a:fld>
             <a:endParaRPr lang="fr-FR"/>
           </a:p>
@@ -1454,7 +1454,7 @@
     </p:spTree>
     <p:extLst>
       <p:ext uri="{BB962C8B-B14F-4D97-AF65-F5344CB8AC3E}">
-        <p14:creationId xmlns:p14="http://schemas.microsoft.com/office/powerpoint/2010/main" xmlns="" val="2540995877"/>
+        <p14:creationId xmlns:p14="http://schemas.microsoft.com/office/powerpoint/2010/main" val="2540995877"/>
       </p:ext>
     </p:extLst>
   </p:cSld>
@@ -1736,7 +1736,7 @@
             <a:fld id="{44139E8D-6066-4080-AC46-DB89673BFC8E}" type="slidenum">
               <a:rPr lang="fr-FR" smtClean="0"/>
               <a:pPr/>
-              <a:t>‹N°›</a:t>
+              <a:t>‹#›</a:t>
             </a:fld>
             <a:endParaRPr lang="fr-FR"/>
           </a:p>
@@ -1745,7 +1745,7 @@
     </p:spTree>
     <p:extLst>
       <p:ext uri="{BB962C8B-B14F-4D97-AF65-F5344CB8AC3E}">
-        <p14:creationId xmlns:p14="http://schemas.microsoft.com/office/powerpoint/2010/main" xmlns="" val="658130668"/>
+        <p14:creationId xmlns:p14="http://schemas.microsoft.com/office/powerpoint/2010/main" val="658130668"/>
       </p:ext>
     </p:extLst>
   </p:cSld>
@@ -2020,7 +2020,7 @@
             <a:fld id="{44139E8D-6066-4080-AC46-DB89673BFC8E}" type="slidenum">
               <a:rPr lang="fr-FR" smtClean="0"/>
               <a:pPr/>
-              <a:t>‹N°›</a:t>
+              <a:t>‹#›</a:t>
             </a:fld>
             <a:endParaRPr lang="fr-FR"/>
           </a:p>
@@ -2029,7 +2029,7 @@
     </p:spTree>
     <p:extLst>
       <p:ext uri="{BB962C8B-B14F-4D97-AF65-F5344CB8AC3E}">
-        <p14:creationId xmlns:p14="http://schemas.microsoft.com/office/powerpoint/2010/main" xmlns="" val="3650240110"/>
+        <p14:creationId xmlns:p14="http://schemas.microsoft.com/office/powerpoint/2010/main" val="3650240110"/>
       </p:ext>
     </p:extLst>
   </p:cSld>
@@ -2434,7 +2434,7 @@
             <a:fld id="{44139E8D-6066-4080-AC46-DB89673BFC8E}" type="slidenum">
               <a:rPr lang="fr-FR" smtClean="0"/>
               <a:pPr/>
-              <a:t>‹N°›</a:t>
+              <a:t>‹#›</a:t>
             </a:fld>
             <a:endParaRPr lang="fr-FR"/>
           </a:p>
@@ -2443,7 +2443,7 @@
     </p:spTree>
     <p:extLst>
       <p:ext uri="{BB962C8B-B14F-4D97-AF65-F5344CB8AC3E}">
-        <p14:creationId xmlns:p14="http://schemas.microsoft.com/office/powerpoint/2010/main" xmlns="" val="2798887854"/>
+        <p14:creationId xmlns:p14="http://schemas.microsoft.com/office/powerpoint/2010/main" val="2798887854"/>
       </p:ext>
     </p:extLst>
   </p:cSld>
@@ -2604,7 +2604,7 @@
             <a:fld id="{44139E8D-6066-4080-AC46-DB89673BFC8E}" type="slidenum">
               <a:rPr lang="fr-FR" smtClean="0"/>
               <a:pPr/>
-              <a:t>‹N°›</a:t>
+              <a:t>‹#›</a:t>
             </a:fld>
             <a:endParaRPr lang="fr-FR"/>
           </a:p>
@@ -2613,7 +2613,7 @@
     </p:spTree>
     <p:extLst>
       <p:ext uri="{BB962C8B-B14F-4D97-AF65-F5344CB8AC3E}">
-        <p14:creationId xmlns:p14="http://schemas.microsoft.com/office/powerpoint/2010/main" xmlns="" val="1141629464"/>
+        <p14:creationId xmlns:p14="http://schemas.microsoft.com/office/powerpoint/2010/main" val="1141629464"/>
       </p:ext>
     </p:extLst>
   </p:cSld>
@@ -2711,7 +2711,7 @@
             <a:fld id="{44139E8D-6066-4080-AC46-DB89673BFC8E}" type="slidenum">
               <a:rPr lang="fr-FR" smtClean="0"/>
               <a:pPr/>
-              <a:t>‹N°›</a:t>
+              <a:t>‹#›</a:t>
             </a:fld>
             <a:endParaRPr lang="fr-FR"/>
           </a:p>
@@ -2720,7 +2720,7 @@
     </p:spTree>
     <p:extLst>
       <p:ext uri="{BB962C8B-B14F-4D97-AF65-F5344CB8AC3E}">
-        <p14:creationId xmlns:p14="http://schemas.microsoft.com/office/powerpoint/2010/main" xmlns="" val="1467798435"/>
+        <p14:creationId xmlns:p14="http://schemas.microsoft.com/office/powerpoint/2010/main" val="1467798435"/>
       </p:ext>
     </p:extLst>
   </p:cSld>
@@ -3000,7 +3000,7 @@
             <a:fld id="{44139E8D-6066-4080-AC46-DB89673BFC8E}" type="slidenum">
               <a:rPr lang="fr-FR" smtClean="0"/>
               <a:pPr/>
-              <a:t>‹N°›</a:t>
+              <a:t>‹#›</a:t>
             </a:fld>
             <a:endParaRPr lang="fr-FR"/>
           </a:p>
@@ -3009,7 +3009,7 @@
     </p:spTree>
     <p:extLst>
       <p:ext uri="{BB962C8B-B14F-4D97-AF65-F5344CB8AC3E}">
-        <p14:creationId xmlns:p14="http://schemas.microsoft.com/office/powerpoint/2010/main" xmlns="" val="3610359101"/>
+        <p14:creationId xmlns:p14="http://schemas.microsoft.com/office/powerpoint/2010/main" val="3610359101"/>
       </p:ext>
     </p:extLst>
   </p:cSld>
@@ -3265,7 +3265,7 @@
             <a:fld id="{44139E8D-6066-4080-AC46-DB89673BFC8E}" type="slidenum">
               <a:rPr lang="fr-FR" smtClean="0"/>
               <a:pPr/>
-              <a:t>‹N°›</a:t>
+              <a:t>‹#›</a:t>
             </a:fld>
             <a:endParaRPr lang="fr-FR"/>
           </a:p>
@@ -3274,7 +3274,7 @@
     </p:spTree>
     <p:extLst>
       <p:ext uri="{BB962C8B-B14F-4D97-AF65-F5344CB8AC3E}">
-        <p14:creationId xmlns:p14="http://schemas.microsoft.com/office/powerpoint/2010/main" xmlns="" val="3433813898"/>
+        <p14:creationId xmlns:p14="http://schemas.microsoft.com/office/powerpoint/2010/main" val="3433813898"/>
       </p:ext>
     </p:extLst>
   </p:cSld>
@@ -3526,7 +3526,7 @@
             <a:fld id="{44139E8D-6066-4080-AC46-DB89673BFC8E}" type="slidenum">
               <a:rPr lang="fr-FR" smtClean="0"/>
               <a:pPr/>
-              <a:t>‹N°›</a:t>
+              <a:t>‹#›</a:t>
             </a:fld>
             <a:endParaRPr lang="fr-FR"/>
           </a:p>
@@ -3535,7 +3535,7 @@
     </p:spTree>
     <p:extLst>
       <p:ext uri="{BB962C8B-B14F-4D97-AF65-F5344CB8AC3E}">
-        <p14:creationId xmlns:p14="http://schemas.microsoft.com/office/powerpoint/2010/main" xmlns="" val="530832461"/>
+        <p14:creationId xmlns:p14="http://schemas.microsoft.com/office/powerpoint/2010/main" val="530832461"/>
       </p:ext>
     </p:extLst>
   </p:cSld>
@@ -3919,7 +3919,7 @@
     </p:spTree>
     <p:extLst>
       <p:ext uri="{BB962C8B-B14F-4D97-AF65-F5344CB8AC3E}">
-        <p14:creationId xmlns:p14="http://schemas.microsoft.com/office/powerpoint/2010/main" xmlns="" val="1719999807"/>
+        <p14:creationId xmlns:p14="http://schemas.microsoft.com/office/powerpoint/2010/main" val="1719999807"/>
       </p:ext>
     </p:extLst>
   </p:cSld>
@@ -4048,22 +4048,22 @@
       </p:sp>
       <p:pic>
         <p:nvPicPr>
-          <p:cNvPr id="3" name="Picture 2"/>
+          <p:cNvPr id="8" name="Picture 7"/>
           <p:cNvPicPr>
             <a:picLocks noChangeAspect="1"/>
           </p:cNvPicPr>
           <p:nvPr/>
         </p:nvPicPr>
         <p:blipFill>
-          <a:blip r:embed="rId2" cstate="print"/>
+          <a:blip r:embed="rId2"/>
           <a:stretch>
             <a:fillRect/>
           </a:stretch>
         </p:blipFill>
         <p:spPr>
           <a:xfrm>
-            <a:off x="634089" y="1638300"/>
-            <a:ext cx="10923822" cy="4533900"/>
+            <a:off x="611682" y="1645920"/>
+            <a:ext cx="10968636" cy="4427220"/>
           </a:xfrm>
           <a:prstGeom prst="rect">
             <a:avLst/>
@@ -4332,7 +4332,7 @@
     </p:spTree>
     <p:extLst>
       <p:ext uri="{BB962C8B-B14F-4D97-AF65-F5344CB8AC3E}">
-        <p14:creationId xmlns:p14="http://schemas.microsoft.com/office/powerpoint/2010/main" xmlns="" val="812129721"/>
+        <p14:creationId xmlns:p14="http://schemas.microsoft.com/office/powerpoint/2010/main" val="812129721"/>
       </p:ext>
     </p:extLst>
   </p:cSld>
@@ -4570,7 +4570,7 @@
     </p:spTree>
     <p:extLst>
       <p:ext uri="{BB962C8B-B14F-4D97-AF65-F5344CB8AC3E}">
-        <p14:creationId xmlns:p14="http://schemas.microsoft.com/office/powerpoint/2010/main" xmlns="" val="2829083960"/>
+        <p14:creationId xmlns:p14="http://schemas.microsoft.com/office/powerpoint/2010/main" val="2829083960"/>
       </p:ext>
     </p:extLst>
   </p:cSld>
@@ -4922,7 +4922,7 @@
     </p:spTree>
     <p:extLst>
       <p:ext uri="{BB962C8B-B14F-4D97-AF65-F5344CB8AC3E}">
-        <p14:creationId xmlns:p14="http://schemas.microsoft.com/office/powerpoint/2010/main" xmlns="" val="188073970"/>
+        <p14:creationId xmlns:p14="http://schemas.microsoft.com/office/powerpoint/2010/main" val="188073970"/>
       </p:ext>
     </p:extLst>
   </p:cSld>
@@ -5575,7 +5575,7 @@
     </p:spTree>
     <p:extLst>
       <p:ext uri="{BB962C8B-B14F-4D97-AF65-F5344CB8AC3E}">
-        <p14:creationId xmlns:p14="http://schemas.microsoft.com/office/powerpoint/2010/main" xmlns="" val="3916897931"/>
+        <p14:creationId xmlns:p14="http://schemas.microsoft.com/office/powerpoint/2010/main" val="3916897931"/>
       </p:ext>
     </p:extLst>
   </p:cSld>
@@ -6836,18 +6836,18 @@
     </p:spTree>
     <p:extLst>
       <p:ext uri="{BB962C8B-B14F-4D97-AF65-F5344CB8AC3E}">
-        <p14:creationId xmlns:p14="http://schemas.microsoft.com/office/powerpoint/2010/main" xmlns="" val="3916897931"/>
+        <p14:creationId xmlns:p14="http://schemas.microsoft.com/office/powerpoint/2010/main" val="3916897931"/>
       </p:ext>
     </p:extLst>
   </p:cSld>
   <p:clrMapOvr>
     <a:masterClrMapping/>
   </p:clrMapOvr>
-  <mc:AlternateContent xmlns:mc="http://schemas.openxmlformats.org/markup-compatibility/2006">
-    <mc:Choice xmlns:p14="http://schemas.microsoft.com/office/powerpoint/2010/main" xmlns="" Requires="p14">
+  <mc:AlternateContent xmlns:mc="http://schemas.openxmlformats.org/markup-compatibility/2006" xmlns:p14="http://schemas.microsoft.com/office/powerpoint/2010/main">
+    <mc:Choice Requires="p14">
       <p:transition spd="slow" p14:dur="2000"/>
     </mc:Choice>
-    <mc:Fallback>
+    <mc:Fallback xmlns="">
       <p:transition spd="slow"/>
     </mc:Fallback>
   </mc:AlternateContent>
@@ -7764,7 +7764,7 @@
     </p:spTree>
     <p:extLst>
       <p:ext uri="{BB962C8B-B14F-4D97-AF65-F5344CB8AC3E}">
-        <p14:creationId xmlns:p14="http://schemas.microsoft.com/office/powerpoint/2010/main" xmlns="" val="2970959322"/>
+        <p14:creationId xmlns:p14="http://schemas.microsoft.com/office/powerpoint/2010/main" val="2970959322"/>
       </p:ext>
     </p:extLst>
   </p:cSld>
@@ -8648,7 +8648,7 @@
     </p:spTree>
     <p:extLst>
       <p:ext uri="{BB962C8B-B14F-4D97-AF65-F5344CB8AC3E}">
-        <p14:creationId xmlns:p14="http://schemas.microsoft.com/office/powerpoint/2010/main" xmlns="" val="1056566985"/>
+        <p14:creationId xmlns:p14="http://schemas.microsoft.com/office/powerpoint/2010/main" val="1056566985"/>
       </p:ext>
     </p:extLst>
   </p:cSld>
@@ -8802,7 +8802,7 @@
     </p:spTree>
     <p:extLst>
       <p:ext uri="{BB962C8B-B14F-4D97-AF65-F5344CB8AC3E}">
-        <p14:creationId xmlns:p14="http://schemas.microsoft.com/office/powerpoint/2010/main" xmlns="" val="1283000917"/>
+        <p14:creationId xmlns:p14="http://schemas.microsoft.com/office/powerpoint/2010/main" val="1283000917"/>
       </p:ext>
     </p:extLst>
   </p:cSld>
@@ -10158,7 +10158,7 @@
     </p:spTree>
     <p:extLst>
       <p:ext uri="{BB962C8B-B14F-4D97-AF65-F5344CB8AC3E}">
-        <p14:creationId xmlns:p14="http://schemas.microsoft.com/office/powerpoint/2010/main" xmlns="" val="3822647716"/>
+        <p14:creationId xmlns:p14="http://schemas.microsoft.com/office/powerpoint/2010/main" val="3822647716"/>
       </p:ext>
     </p:extLst>
   </p:cSld>
@@ -11561,7 +11561,7 @@
     </p:spTree>
     <p:extLst>
       <p:ext uri="{BB962C8B-B14F-4D97-AF65-F5344CB8AC3E}">
-        <p14:creationId xmlns:p14="http://schemas.microsoft.com/office/powerpoint/2010/main" xmlns="" val="1808425269"/>
+        <p14:creationId xmlns:p14="http://schemas.microsoft.com/office/powerpoint/2010/main" val="1808425269"/>
       </p:ext>
     </p:extLst>
   </p:cSld>
@@ -12964,7 +12964,7 @@
     </p:spTree>
     <p:extLst>
       <p:ext uri="{BB962C8B-B14F-4D97-AF65-F5344CB8AC3E}">
-        <p14:creationId xmlns:p14="http://schemas.microsoft.com/office/powerpoint/2010/main" xmlns="" val="214338730"/>
+        <p14:creationId xmlns:p14="http://schemas.microsoft.com/office/powerpoint/2010/main" val="214338730"/>
       </p:ext>
     </p:extLst>
   </p:cSld>
@@ -14450,7 +14450,7 @@
     </p:spTree>
     <p:extLst>
       <p:ext uri="{BB962C8B-B14F-4D97-AF65-F5344CB8AC3E}">
-        <p14:creationId xmlns:p14="http://schemas.microsoft.com/office/powerpoint/2010/main" xmlns="" val="3988002708"/>
+        <p14:creationId xmlns:p14="http://schemas.microsoft.com/office/powerpoint/2010/main" val="3988002708"/>
       </p:ext>
     </p:extLst>
   </p:cSld>
@@ -15853,7 +15853,7 @@
     </p:spTree>
     <p:extLst>
       <p:ext uri="{BB962C8B-B14F-4D97-AF65-F5344CB8AC3E}">
-        <p14:creationId xmlns:p14="http://schemas.microsoft.com/office/powerpoint/2010/main" xmlns="" val="2590363394"/>
+        <p14:creationId xmlns:p14="http://schemas.microsoft.com/office/powerpoint/2010/main" val="2590363394"/>
       </p:ext>
     </p:extLst>
   </p:cSld>
@@ -17256,7 +17256,7 @@
     </p:spTree>
     <p:extLst>
       <p:ext uri="{BB962C8B-B14F-4D97-AF65-F5344CB8AC3E}">
-        <p14:creationId xmlns:p14="http://schemas.microsoft.com/office/powerpoint/2010/main" xmlns="" val="128642618"/>
+        <p14:creationId xmlns:p14="http://schemas.microsoft.com/office/powerpoint/2010/main" val="128642618"/>
       </p:ext>
     </p:extLst>
   </p:cSld>
@@ -18697,7 +18697,7 @@
     </p:spTree>
     <p:extLst>
       <p:ext uri="{BB962C8B-B14F-4D97-AF65-F5344CB8AC3E}">
-        <p14:creationId xmlns:p14="http://schemas.microsoft.com/office/powerpoint/2010/main" xmlns="" val="2685233104"/>
+        <p14:creationId xmlns:p14="http://schemas.microsoft.com/office/powerpoint/2010/main" val="2685233104"/>
       </p:ext>
     </p:extLst>
   </p:cSld>
@@ -20099,7 +20099,7 @@
     </p:spTree>
     <p:extLst>
       <p:ext uri="{BB962C8B-B14F-4D97-AF65-F5344CB8AC3E}">
-        <p14:creationId xmlns:p14="http://schemas.microsoft.com/office/powerpoint/2010/main" xmlns="" val="899195258"/>
+        <p14:creationId xmlns:p14="http://schemas.microsoft.com/office/powerpoint/2010/main" val="899195258"/>
       </p:ext>
     </p:extLst>
   </p:cSld>
@@ -20252,7 +20252,7 @@
     </p:spTree>
     <p:extLst>
       <p:ext uri="{BB962C8B-B14F-4D97-AF65-F5344CB8AC3E}">
-        <p14:creationId xmlns:p14="http://schemas.microsoft.com/office/powerpoint/2010/main" xmlns="" val="3691361"/>
+        <p14:creationId xmlns:p14="http://schemas.microsoft.com/office/powerpoint/2010/main" val="3691361"/>
       </p:ext>
     </p:extLst>
   </p:cSld>
@@ -20405,7 +20405,7 @@
     </p:spTree>
     <p:extLst>
       <p:ext uri="{BB962C8B-B14F-4D97-AF65-F5344CB8AC3E}">
-        <p14:creationId xmlns:p14="http://schemas.microsoft.com/office/powerpoint/2010/main" xmlns="" val="1940074127"/>
+        <p14:creationId xmlns:p14="http://schemas.microsoft.com/office/powerpoint/2010/main" val="1940074127"/>
       </p:ext>
     </p:extLst>
   </p:cSld>
@@ -20561,7 +20561,7 @@
     </p:spTree>
     <p:extLst>
       <p:ext uri="{BB962C8B-B14F-4D97-AF65-F5344CB8AC3E}">
-        <p14:creationId xmlns:p14="http://schemas.microsoft.com/office/powerpoint/2010/main" xmlns="" val="1106585189"/>
+        <p14:creationId xmlns:p14="http://schemas.microsoft.com/office/powerpoint/2010/main" val="1106585189"/>
       </p:ext>
     </p:extLst>
   </p:cSld>
@@ -20868,7 +20868,7 @@
     </p:spTree>
     <p:extLst>
       <p:ext uri="{BB962C8B-B14F-4D97-AF65-F5344CB8AC3E}">
-        <p14:creationId xmlns:p14="http://schemas.microsoft.com/office/powerpoint/2010/main" xmlns="" val="604540945"/>
+        <p14:creationId xmlns:p14="http://schemas.microsoft.com/office/powerpoint/2010/main" val="604540945"/>
       </p:ext>
     </p:extLst>
   </p:cSld>
@@ -21118,7 +21118,7 @@
     </p:spTree>
     <p:extLst>
       <p:ext uri="{BB962C8B-B14F-4D97-AF65-F5344CB8AC3E}">
-        <p14:creationId xmlns:p14="http://schemas.microsoft.com/office/powerpoint/2010/main" xmlns="" val="3005486473"/>
+        <p14:creationId xmlns:p14="http://schemas.microsoft.com/office/powerpoint/2010/main" val="3005486473"/>
       </p:ext>
     </p:extLst>
   </p:cSld>
@@ -22826,7 +22826,7 @@
     </p:spTree>
     <p:extLst>
       <p:ext uri="{BB962C8B-B14F-4D97-AF65-F5344CB8AC3E}">
-        <p14:creationId xmlns:p14="http://schemas.microsoft.com/office/powerpoint/2010/main" xmlns="" val="3296308957"/>
+        <p14:creationId xmlns:p14="http://schemas.microsoft.com/office/powerpoint/2010/main" val="3296308957"/>
       </p:ext>
     </p:extLst>
   </p:cSld>
@@ -23765,7 +23765,7 @@
     </p:spTree>
     <p:extLst>
       <p:ext uri="{BB962C8B-B14F-4D97-AF65-F5344CB8AC3E}">
-        <p14:creationId xmlns:p14="http://schemas.microsoft.com/office/powerpoint/2010/main" xmlns="" val="2384916904"/>
+        <p14:creationId xmlns:p14="http://schemas.microsoft.com/office/powerpoint/2010/main" val="2384916904"/>
       </p:ext>
     </p:extLst>
   </p:cSld>
@@ -24404,7 +24404,7 @@
     </p:spTree>
     <p:extLst>
       <p:ext uri="{BB962C8B-B14F-4D97-AF65-F5344CB8AC3E}">
-        <p14:creationId xmlns:p14="http://schemas.microsoft.com/office/powerpoint/2010/main" xmlns="" val="3296308957"/>
+        <p14:creationId xmlns:p14="http://schemas.microsoft.com/office/powerpoint/2010/main" val="3296308957"/>
       </p:ext>
     </p:extLst>
   </p:cSld>
@@ -24676,7 +24676,7 @@
   <a:extraClrSchemeLst/>
   <a:extLst>
     <a:ext uri="{05A4C25C-085E-4340-85A3-A5531E510DB2}">
-      <thm15:themeFamily xmlns:thm15="http://schemas.microsoft.com/office/thememl/2012/main" xmlns="" name="Office Theme" id="{62F939B6-93AF-4DB8-9C6B-D6C7DFDC589F}" vid="{4A3C46E8-61CC-4603-A589-7422A47A8E4A}"/>
+      <thm15:themeFamily xmlns:thm15="http://schemas.microsoft.com/office/thememl/2012/main" name="Office Theme" id="{62F939B6-93AF-4DB8-9C6B-D6C7DFDC589F}" vid="{4A3C46E8-61CC-4603-A589-7422A47A8E4A}"/>
     </a:ext>
   </a:extLst>
 </a:theme>
@@ -24937,7 +24937,7 @@
   <a:extraClrSchemeLst/>
   <a:extLst>
     <a:ext uri="{05A4C25C-085E-4340-85A3-A5531E510DB2}">
-      <thm15:themeFamily xmlns:thm15="http://schemas.microsoft.com/office/thememl/2012/main" xmlns="" name="Office Theme" id="{62F939B6-93AF-4DB8-9C6B-D6C7DFDC589F}" vid="{4A3C46E8-61CC-4603-A589-7422A47A8E4A}"/>
+      <thm15:themeFamily xmlns:thm15="http://schemas.microsoft.com/office/thememl/2012/main" name="Office Theme" id="{62F939B6-93AF-4DB8-9C6B-D6C7DFDC589F}" vid="{4A3C46E8-61CC-4603-A589-7422A47A8E4A}"/>
     </a:ext>
   </a:extLst>
 </a:theme>

</xml_diff>

<commit_message>
minor updates on project structure
</commit_message>
<xml_diff>
--- a/docs/React & Redux.pptx
+++ b/docs/React & Redux.pptx
@@ -5,7 +5,7 @@
     <p:sldMasterId id="2147483648" r:id="rId1"/>
   </p:sldMasterIdLst>
   <p:notesMasterIdLst>
-    <p:notesMasterId r:id="rId35"/>
+    <p:notesMasterId r:id="rId37"/>
   </p:notesMasterIdLst>
   <p:sldIdLst>
     <p:sldId id="256" r:id="rId2"/>
@@ -40,7 +40,9 @@
     <p:sldId id="294" r:id="rId31"/>
     <p:sldId id="295" r:id="rId32"/>
     <p:sldId id="297" r:id="rId33"/>
-    <p:sldId id="263" r:id="rId34"/>
+    <p:sldId id="302" r:id="rId34"/>
+    <p:sldId id="303" r:id="rId35"/>
+    <p:sldId id="263" r:id="rId36"/>
   </p:sldIdLst>
   <p:sldSz cx="12192000" cy="6858000"/>
   <p:notesSz cx="6858000" cy="9144000"/>
@@ -187,7 +189,10 @@
           </p14:sldIdLst>
         </p14:section>
         <p14:section name="React &amp; redux" id="{B6BBBED2-AAF2-42B9-90F4-682CAD6B1544}">
-          <p14:sldIdLst/>
+          <p14:sldIdLst>
+            <p14:sldId id="302"/>
+            <p14:sldId id="303"/>
+          </p14:sldIdLst>
         </p14:section>
         <p14:section name="build, development &amp; testing" id="{B7ABC3F2-4084-450A-B2C4-E886F60B3B22}">
           <p14:sldIdLst>
@@ -300,7 +305,7 @@
             <a:fld id="{68F520A5-0AD6-418C-8F4A-9FB003B35E28}" type="datetimeFigureOut">
               <a:rPr lang="fr-FR" smtClean="0"/>
               <a:pPr/>
-              <a:t>02/04/2017</a:t>
+              <a:t>18/04/2017</a:t>
             </a:fld>
             <a:endParaRPr lang="fr-FR"/>
           </a:p>
@@ -4175,23 +4180,7 @@
                   <a:schemeClr val="accent6"/>
                 </a:solidFill>
               </a:rPr>
-              <a:t> </a:t>
-            </a:r>
-            <a:r>
-              <a:rPr lang="en-US" sz="2000" noProof="0" dirty="0" smtClean="0">
-                <a:solidFill>
-                  <a:schemeClr val="accent6"/>
-                </a:solidFill>
-              </a:rPr>
-              <a:t>times slower </a:t>
-            </a:r>
-            <a:r>
-              <a:rPr lang="en-US" sz="2000" noProof="0" dirty="0" smtClean="0">
-                <a:solidFill>
-                  <a:schemeClr val="accent6"/>
-                </a:solidFill>
-              </a:rPr>
-              <a:t>than </a:t>
+              <a:t> times slower than </a:t>
             </a:r>
             <a:r>
               <a:rPr lang="en-US" sz="2000" noProof="0" dirty="0" err="1" smtClean="0">
@@ -4218,11 +4207,7 @@
             <a:pPr lvl="1"/>
             <a:r>
               <a:rPr lang="en-US" noProof="0" dirty="0" smtClean="0"/>
-              <a:t>Rendering of shadow DOM elements to actual </a:t>
-            </a:r>
-            <a:r>
-              <a:rPr lang="en-US" noProof="0" dirty="0" smtClean="0"/>
-              <a:t>DOM</a:t>
+              <a:t>Rendering of shadow DOM elements to actual DOM</a:t>
             </a:r>
           </a:p>
           <a:p>
@@ -4241,19 +4226,7 @@
             </a:pPr>
             <a:r>
               <a:rPr lang="en-US" noProof="0" dirty="0" smtClean="0"/>
-              <a:t>Component properties (</a:t>
-            </a:r>
-            <a:r>
-              <a:rPr lang="en-US" noProof="0" dirty="0" smtClean="0"/>
-              <a:t>inputs) </a:t>
-            </a:r>
-            <a:r>
-              <a:rPr lang="en-US" noProof="0" dirty="0" smtClean="0"/>
-              <a:t>changes trigger </a:t>
-            </a:r>
-            <a:r>
-              <a:rPr lang="en-US" noProof="0" dirty="0" smtClean="0"/>
-              <a:t>re-rendering </a:t>
+              <a:t>Component properties (inputs) changes trigger re-rendering </a:t>
             </a:r>
             <a:br>
               <a:rPr lang="en-US" noProof="0" dirty="0" smtClean="0"/>
@@ -4295,15 +4268,7 @@
             </a:pPr>
             <a:r>
               <a:rPr lang="en-US" noProof="0" dirty="0" smtClean="0"/>
-              <a:t>Rendering creates a </a:t>
-            </a:r>
-            <a:r>
-              <a:rPr lang="en-US" noProof="0" dirty="0" smtClean="0"/>
-              <a:t>shadow </a:t>
-            </a:r>
-            <a:r>
-              <a:rPr lang="en-US" noProof="0" dirty="0" smtClean="0"/>
-              <a:t>DOM </a:t>
+              <a:t>Rendering creates a shadow DOM </a:t>
             </a:r>
             <a:r>
               <a:rPr lang="en-US" sz="1900" noProof="0" dirty="0" smtClean="0">
@@ -4365,15 +4330,7 @@
                   <a:schemeClr val="accent6"/>
                 </a:solidFill>
               </a:rPr>
-              <a:t>strong positive impact on </a:t>
-            </a:r>
-            <a:r>
-              <a:rPr lang="en-US" sz="1800" noProof="0" dirty="0" smtClean="0">
-                <a:solidFill>
-                  <a:schemeClr val="accent6"/>
-                </a:solidFill>
-              </a:rPr>
-              <a:t>performance</a:t>
+              <a:t>strong positive impact on performance</a:t>
             </a:r>
             <a:endParaRPr lang="en-US" noProof="0" dirty="0" smtClean="0"/>
           </a:p>
@@ -4383,11 +4340,7 @@
           <a:p>
             <a:r>
               <a:rPr lang="en-US" noProof="0" dirty="0" smtClean="0"/>
-              <a:t>Optimize </a:t>
-            </a:r>
-            <a:r>
-              <a:rPr lang="en-US" noProof="0" dirty="0" smtClean="0"/>
-              <a:t>via </a:t>
+              <a:t>Optimize via </a:t>
             </a:r>
             <a:r>
               <a:rPr lang="en-US" i="1" noProof="0" dirty="0" err="1" smtClean="0"/>
@@ -4399,11 +4352,7 @@
             <a:pPr lvl="1"/>
             <a:r>
               <a:rPr lang="en-US" noProof="0" dirty="0" smtClean="0"/>
-              <a:t>Bring business logic and guess whether the component should call render at </a:t>
-            </a:r>
-            <a:r>
-              <a:rPr lang="en-US" noProof="0" dirty="0" smtClean="0"/>
-              <a:t>all </a:t>
+              <a:t>Bring business logic and guess whether the component should call render at all </a:t>
             </a:r>
             <a:br>
               <a:rPr lang="en-US" noProof="0" dirty="0" smtClean="0"/>
@@ -4597,23 +4546,7 @@
             <a:pPr lvl="1"/>
             <a:r>
               <a:rPr lang="en-US" noProof="0" dirty="0" smtClean="0"/>
-              <a:t>...most components </a:t>
-            </a:r>
-            <a:r>
-              <a:rPr lang="en-US" noProof="0" dirty="0" smtClean="0"/>
-              <a:t>should always </a:t>
-            </a:r>
-            <a:r>
-              <a:rPr lang="en-US" noProof="0" dirty="0" smtClean="0"/>
-              <a:t>return same content for given input and not </a:t>
-            </a:r>
-            <a:r>
-              <a:rPr lang="en-US" noProof="0" dirty="0" smtClean="0"/>
-              <a:t>have internal </a:t>
-            </a:r>
-            <a:r>
-              <a:rPr lang="en-US" noProof="0" dirty="0" smtClean="0"/>
-              <a:t>state </a:t>
+              <a:t>...most components should always return same content for given input and not have internal state </a:t>
             </a:r>
             <a:r>
               <a:rPr lang="en-US" sz="1800" noProof="0" dirty="0" smtClean="0">
@@ -4681,11 +4614,7 @@
             <a:pPr lvl="1"/>
             <a:r>
               <a:rPr lang="en-US" noProof="0" dirty="0" smtClean="0"/>
-              <a:t>Application state </a:t>
-            </a:r>
-            <a:r>
-              <a:rPr lang="en-US" noProof="0" dirty="0" smtClean="0"/>
-              <a:t>only belong in data </a:t>
+              <a:t>Application state only belong in data </a:t>
             </a:r>
             <a:r>
               <a:rPr lang="en-US" sz="1900" noProof="0" dirty="0" smtClean="0">
@@ -4878,11 +4807,7 @@
             <a:pPr lvl="1"/>
             <a:r>
               <a:rPr lang="en-US" dirty="0" smtClean="0"/>
-              <a:t>Many components </a:t>
-            </a:r>
-            <a:r>
-              <a:rPr lang="en-US" dirty="0" smtClean="0"/>
-              <a:t>are said to be </a:t>
+              <a:t>Many components are said to be </a:t>
             </a:r>
             <a:r>
               <a:rPr lang="en-US" i="1" dirty="0" smtClean="0"/>
@@ -4931,13 +4856,8 @@
             <a:pPr lvl="1"/>
             <a:r>
               <a:rPr lang="en-US" dirty="0" smtClean="0"/>
-              <a:t>Some bind </a:t>
-            </a:r>
-            <a:r>
-              <a:rPr lang="en-US" dirty="0" smtClean="0"/>
-              <a:t>to data-source to manage application state updates</a:t>
-            </a:r>
-            <a:endParaRPr lang="en-US" dirty="0" smtClean="0"/>
+              <a:t>Some bind to data-source to manage application state updates</a:t>
+            </a:r>
           </a:p>
         </p:txBody>
       </p:sp>
@@ -5237,11 +5157,7 @@
             </a:r>
             <a:r>
               <a:rPr lang="fr-FR" dirty="0" smtClean="0"/>
-              <a:t> consumes </a:t>
-            </a:r>
-            <a:r>
-              <a:rPr lang="fr-FR" dirty="0" smtClean="0"/>
-              <a:t>data and </a:t>
+              <a:t> consumes data and </a:t>
             </a:r>
             <a:br>
               <a:rPr lang="fr-FR" dirty="0" smtClean="0"/>
@@ -5280,7 +5196,6 @@
               <a:rPr lang="fr-FR" dirty="0" smtClean="0"/>
               <a:t>data changes</a:t>
             </a:r>
-            <a:endParaRPr lang="fr-FR" dirty="0" smtClean="0"/>
           </a:p>
           <a:p>
             <a:pPr lvl="1"/>
@@ -5322,15 +5237,7 @@
             </a:br>
             <a:r>
               <a:rPr lang="en-US" dirty="0" smtClean="0"/>
-              <a:t>centralized data </a:t>
-            </a:r>
-            <a:r>
-              <a:rPr lang="en-US" dirty="0" smtClean="0"/>
-              <a:t>store</a:t>
-            </a:r>
-            <a:r>
-              <a:rPr lang="en-US" dirty="0" smtClean="0"/>
-              <a:t/>
+              <a:t>centralized data store</a:t>
             </a:r>
             <a:br>
               <a:rPr lang="en-US" dirty="0" smtClean="0"/>
@@ -5341,23 +5248,7 @@
                   <a:schemeClr val="accent6"/>
                 </a:solidFill>
               </a:rPr>
-              <a:t>not hidden in </a:t>
-            </a:r>
-            <a:r>
-              <a:rPr lang="en-US" sz="1800" dirty="0" smtClean="0">
-                <a:solidFill>
-                  <a:schemeClr val="accent6"/>
-                </a:solidFill>
-              </a:rPr>
-              <a:t>DOM </a:t>
-            </a:r>
-            <a:r>
-              <a:rPr lang="en-US" sz="1800" dirty="0" smtClean="0">
-                <a:solidFill>
-                  <a:schemeClr val="accent6"/>
-                </a:solidFill>
-              </a:rPr>
-              <a:t>or other weird places</a:t>
+              <a:t>not hidden in DOM or other weird places</a:t>
             </a:r>
             <a:endParaRPr lang="fr-FR" sz="1800" dirty="0" smtClean="0">
               <a:solidFill>
@@ -7748,11 +7639,7 @@
           <a:p>
             <a:r>
               <a:rPr lang="en-US" dirty="0" smtClean="0"/>
-              <a:t>Reducers </a:t>
-            </a:r>
-            <a:r>
-              <a:rPr lang="en-US" dirty="0" smtClean="0"/>
-              <a:t>can be combined</a:t>
+              <a:t>Reducers can be combined</a:t>
             </a:r>
           </a:p>
           <a:p>
@@ -8490,10 +8377,10 @@
           <a:lstStyle/>
           <a:p>
             <a:r>
-              <a:rPr lang="en-US" noProof="0" smtClean="0"/>
+              <a:rPr lang="en-US" noProof="0" dirty="0" smtClean="0"/>
               <a:t>A project we’re targeting	</a:t>
             </a:r>
-            <a:endParaRPr lang="en-US" noProof="0"/>
+            <a:endParaRPr lang="en-US" noProof="0" dirty="0"/>
           </a:p>
         </p:txBody>
       </p:sp>
@@ -15953,7 +15840,6 @@
               <a:rPr lang="fr-FR" b="1" dirty="0"/>
               <a:t>Logs</a:t>
             </a:r>
-            <a:endParaRPr lang="fr-FR" b="1" dirty="0"/>
           </a:p>
         </p:txBody>
       </p:sp>
@@ -20140,7 +20026,6 @@
               <a:rPr lang="fr-FR" b="1" dirty="0"/>
               <a:t>API</a:t>
             </a:r>
-            <a:endParaRPr lang="fr-FR" b="1" dirty="0"/>
           </a:p>
         </p:txBody>
       </p:sp>
@@ -24057,6 +23942,13 @@
   <p:clrMapOvr>
     <a:masterClrMapping/>
   </p:clrMapOvr>
+  <p:timing>
+    <p:tnLst>
+      <p:par>
+        <p:cTn id="1" dur="indefinite" restart="never" nodeType="tmRoot"/>
+      </p:par>
+    </p:tnLst>
+  </p:timing>
 </p:sld>
 </file>
 
@@ -24336,6 +24228,832 @@
           <a:lstStyle/>
           <a:p>
             <a:r>
+              <a:rPr lang="en-US" dirty="0" smtClean="0"/>
+              <a:t>Application structure</a:t>
+            </a:r>
+            <a:endParaRPr lang="fr-FR" dirty="0"/>
+          </a:p>
+        </p:txBody>
+      </p:sp>
+      <p:sp>
+        <p:nvSpPr>
+          <p:cNvPr id="3" name="Content Placeholder 2"/>
+          <p:cNvSpPr>
+            <a:spLocks noGrp="1"/>
+          </p:cNvSpPr>
+          <p:nvPr>
+            <p:ph idx="1"/>
+          </p:nvPr>
+        </p:nvSpPr>
+        <p:spPr/>
+        <p:txBody>
+          <a:bodyPr/>
+          <a:lstStyle/>
+          <a:p>
+            <a:r>
+              <a:rPr lang="en-US" dirty="0" smtClean="0"/>
+              <a:t>sources</a:t>
+            </a:r>
+          </a:p>
+          <a:p>
+            <a:pPr lvl="1">
+              <a:buClr>
+                <a:schemeClr val="tx1"/>
+              </a:buClr>
+              <a:buFont typeface="Calibri" panose="020F0502020204030204" pitchFamily="34" charset="0"/>
+              <a:buChar char="⁄"/>
+            </a:pPr>
+            <a:r>
+              <a:rPr lang="en-US" dirty="0" err="1" smtClean="0">
+                <a:solidFill>
+                  <a:schemeClr val="accent5"/>
+                </a:solidFill>
+              </a:rPr>
+              <a:t>api</a:t>
+            </a:r>
+            <a:r>
+              <a:rPr lang="en-US" dirty="0" smtClean="0">
+                <a:solidFill>
+                  <a:schemeClr val="accent5"/>
+                </a:solidFill>
+              </a:rPr>
+              <a:t>/			</a:t>
+            </a:r>
+            <a:r>
+              <a:rPr lang="en-US" sz="1800" dirty="0" smtClean="0">
+                <a:solidFill>
+                  <a:schemeClr val="accent6"/>
+                </a:solidFill>
+              </a:rPr>
+              <a:t>// </a:t>
+            </a:r>
+            <a:r>
+              <a:rPr lang="en-US" sz="1800" dirty="0">
+                <a:solidFill>
+                  <a:schemeClr val="accent6"/>
+                </a:solidFill>
+              </a:rPr>
+              <a:t>contains </a:t>
+            </a:r>
+            <a:r>
+              <a:rPr lang="en-US" sz="1800" dirty="0" err="1">
+                <a:solidFill>
+                  <a:schemeClr val="accent6"/>
+                </a:solidFill>
+              </a:rPr>
+              <a:t>url</a:t>
+            </a:r>
+            <a:r>
+              <a:rPr lang="en-US" sz="1800" dirty="0">
+                <a:solidFill>
+                  <a:schemeClr val="accent6"/>
+                </a:solidFill>
+              </a:rPr>
+              <a:t> information (builders) to (RESTful) API resources</a:t>
+            </a:r>
+          </a:p>
+          <a:p>
+            <a:pPr lvl="1">
+              <a:buClr>
+                <a:schemeClr val="tx1"/>
+              </a:buClr>
+              <a:buFont typeface="Calibri" panose="020F0502020204030204" pitchFamily="34" charset="0"/>
+              <a:buChar char="⁄"/>
+            </a:pPr>
+            <a:r>
+              <a:rPr lang="en-US" dirty="0" smtClean="0">
+                <a:solidFill>
+                  <a:schemeClr val="accent5"/>
+                </a:solidFill>
+              </a:rPr>
+              <a:t>business/		</a:t>
+            </a:r>
+            <a:r>
+              <a:rPr lang="en-US" sz="1800" dirty="0" smtClean="0">
+                <a:solidFill>
+                  <a:schemeClr val="accent6"/>
+                </a:solidFill>
+              </a:rPr>
+              <a:t>// </a:t>
+            </a:r>
+            <a:r>
+              <a:rPr lang="en-US" sz="1800" dirty="0">
+                <a:solidFill>
+                  <a:schemeClr val="accent6"/>
+                </a:solidFill>
+              </a:rPr>
+              <a:t>contains data description and manipulations (redux workflow)</a:t>
+            </a:r>
+          </a:p>
+          <a:p>
+            <a:pPr lvl="1">
+              <a:buClr>
+                <a:schemeClr val="tx1"/>
+              </a:buClr>
+              <a:buFont typeface="Calibri" panose="020F0502020204030204" pitchFamily="34" charset="0"/>
+              <a:buChar char="⁄"/>
+            </a:pPr>
+            <a:r>
+              <a:rPr lang="en-US" dirty="0" smtClean="0">
+                <a:solidFill>
+                  <a:schemeClr val="accent5"/>
+                </a:solidFill>
+              </a:rPr>
+              <a:t>components/		</a:t>
+            </a:r>
+            <a:r>
+              <a:rPr lang="en-US" sz="1800" dirty="0" smtClean="0">
+                <a:solidFill>
+                  <a:schemeClr val="accent6"/>
+                </a:solidFill>
+              </a:rPr>
+              <a:t>// </a:t>
+            </a:r>
+            <a:r>
+              <a:rPr lang="en-US" sz="1800" dirty="0">
+                <a:solidFill>
+                  <a:schemeClr val="accent6"/>
+                </a:solidFill>
+              </a:rPr>
+              <a:t>contains React dumb components</a:t>
+            </a:r>
+          </a:p>
+          <a:p>
+            <a:pPr lvl="1">
+              <a:buClr>
+                <a:schemeClr val="tx1"/>
+              </a:buClr>
+              <a:buFont typeface="Calibri" panose="020F0502020204030204" pitchFamily="34" charset="0"/>
+              <a:buChar char="⁄"/>
+            </a:pPr>
+            <a:r>
+              <a:rPr lang="en-US" dirty="0" smtClean="0">
+                <a:solidFill>
+                  <a:schemeClr val="accent5"/>
+                </a:solidFill>
+              </a:rPr>
+              <a:t>containers/		</a:t>
+            </a:r>
+            <a:r>
+              <a:rPr lang="en-US" sz="1800" dirty="0" smtClean="0">
+                <a:solidFill>
+                  <a:schemeClr val="accent6"/>
+                </a:solidFill>
+              </a:rPr>
+              <a:t>// </a:t>
+            </a:r>
+            <a:r>
+              <a:rPr lang="en-US" sz="1800" dirty="0">
+                <a:solidFill>
+                  <a:schemeClr val="accent6"/>
+                </a:solidFill>
+              </a:rPr>
+              <a:t>contains React smart components</a:t>
+            </a:r>
+          </a:p>
+          <a:p>
+            <a:pPr lvl="1">
+              <a:buClr>
+                <a:schemeClr val="tx1"/>
+              </a:buClr>
+              <a:buFont typeface="Calibri" panose="020F0502020204030204" pitchFamily="34" charset="0"/>
+              <a:buChar char="⁄"/>
+            </a:pPr>
+            <a:r>
+              <a:rPr lang="en-US" dirty="0" smtClean="0">
+                <a:solidFill>
+                  <a:schemeClr val="accent5"/>
+                </a:solidFill>
+              </a:rPr>
+              <a:t>core/			</a:t>
+            </a:r>
+            <a:r>
+              <a:rPr lang="en-US" sz="1800" dirty="0" smtClean="0">
+                <a:solidFill>
+                  <a:schemeClr val="accent6"/>
+                </a:solidFill>
+              </a:rPr>
+              <a:t>// </a:t>
+            </a:r>
+            <a:r>
+              <a:rPr lang="en-US" sz="1800" dirty="0">
+                <a:solidFill>
+                  <a:schemeClr val="accent6"/>
+                </a:solidFill>
+              </a:rPr>
+              <a:t>general application configuration skeleton </a:t>
+            </a:r>
+          </a:p>
+          <a:p>
+            <a:pPr lvl="1">
+              <a:buClr>
+                <a:schemeClr val="tx1"/>
+              </a:buClr>
+              <a:buFont typeface="Calibri" panose="020F0502020204030204" pitchFamily="34" charset="0"/>
+              <a:buChar char="⁄"/>
+            </a:pPr>
+            <a:r>
+              <a:rPr lang="en-US" dirty="0" smtClean="0">
+                <a:solidFill>
+                  <a:schemeClr val="accent2"/>
+                </a:solidFill>
+              </a:rPr>
+              <a:t>index.html		</a:t>
+            </a:r>
+            <a:r>
+              <a:rPr lang="en-US" sz="1800" dirty="0" smtClean="0">
+                <a:solidFill>
+                  <a:schemeClr val="accent6"/>
+                </a:solidFill>
+              </a:rPr>
+              <a:t>// </a:t>
+            </a:r>
+            <a:r>
+              <a:rPr lang="en-US" sz="1800" dirty="0">
+                <a:solidFill>
+                  <a:schemeClr val="accent6"/>
+                </a:solidFill>
+              </a:rPr>
+              <a:t>SPA entry point</a:t>
+            </a:r>
+          </a:p>
+          <a:p>
+            <a:pPr lvl="1">
+              <a:buClr>
+                <a:schemeClr val="tx1"/>
+              </a:buClr>
+              <a:buFont typeface="Calibri" panose="020F0502020204030204" pitchFamily="34" charset="0"/>
+              <a:buChar char="⁄"/>
+            </a:pPr>
+            <a:r>
+              <a:rPr lang="en-US" dirty="0" err="1" smtClean="0">
+                <a:solidFill>
+                  <a:schemeClr val="accent2"/>
+                </a:solidFill>
+              </a:rPr>
+              <a:t>main.jsx</a:t>
+            </a:r>
+            <a:r>
+              <a:rPr lang="en-US" dirty="0" smtClean="0">
+                <a:solidFill>
+                  <a:schemeClr val="accent2"/>
+                </a:solidFill>
+              </a:rPr>
+              <a:t>			</a:t>
+            </a:r>
+            <a:r>
+              <a:rPr lang="en-US" sz="1800" dirty="0" smtClean="0">
+                <a:solidFill>
+                  <a:schemeClr val="accent6"/>
+                </a:solidFill>
+              </a:rPr>
+              <a:t>// </a:t>
+            </a:r>
+            <a:r>
+              <a:rPr lang="en-US" sz="1800" dirty="0">
+                <a:solidFill>
+                  <a:schemeClr val="accent6"/>
+                </a:solidFill>
+              </a:rPr>
+              <a:t>SPA code entry point</a:t>
+            </a:r>
+          </a:p>
+          <a:p>
+            <a:pPr lvl="1">
+              <a:buClr>
+                <a:schemeClr val="tx1"/>
+              </a:buClr>
+              <a:buFont typeface="Calibri" panose="020F0502020204030204" pitchFamily="34" charset="0"/>
+              <a:buChar char="⁄"/>
+            </a:pPr>
+            <a:r>
+              <a:rPr lang="en-US" dirty="0" smtClean="0">
+                <a:solidFill>
+                  <a:schemeClr val="accent2"/>
+                </a:solidFill>
+              </a:rPr>
+              <a:t>store.js			</a:t>
+            </a:r>
+            <a:r>
+              <a:rPr lang="en-US" sz="1800" dirty="0" smtClean="0">
+                <a:solidFill>
+                  <a:schemeClr val="accent6"/>
+                </a:solidFill>
+              </a:rPr>
+              <a:t>// redux data store setup</a:t>
+            </a:r>
+            <a:endParaRPr lang="fr-FR" dirty="0">
+              <a:solidFill>
+                <a:schemeClr val="accent6"/>
+              </a:solidFill>
+            </a:endParaRPr>
+          </a:p>
+        </p:txBody>
+      </p:sp>
+      <p:sp>
+        <p:nvSpPr>
+          <p:cNvPr id="4" name="Date Placeholder 3"/>
+          <p:cNvSpPr>
+            <a:spLocks noGrp="1"/>
+          </p:cNvSpPr>
+          <p:nvPr>
+            <p:ph type="dt" sz="half" idx="10"/>
+          </p:nvPr>
+        </p:nvSpPr>
+        <p:spPr/>
+        <p:txBody>
+          <a:bodyPr/>
+          <a:lstStyle/>
+          <a:p>
+            <a:r>
+              <a:rPr lang="fr-FR" smtClean="0"/>
+              <a:t>2017</a:t>
+            </a:r>
+            <a:endParaRPr lang="fr-FR"/>
+          </a:p>
+        </p:txBody>
+      </p:sp>
+      <p:sp>
+        <p:nvSpPr>
+          <p:cNvPr id="5" name="Footer Placeholder 4"/>
+          <p:cNvSpPr>
+            <a:spLocks noGrp="1"/>
+          </p:cNvSpPr>
+          <p:nvPr>
+            <p:ph type="ftr" sz="quarter" idx="11"/>
+          </p:nvPr>
+        </p:nvSpPr>
+        <p:spPr/>
+        <p:txBody>
+          <a:bodyPr/>
+          <a:lstStyle/>
+          <a:p>
+            <a:r>
+              <a:rPr lang="fr-FR" smtClean="0"/>
+              <a:t>cedric.hartland@gmail.com</a:t>
+            </a:r>
+            <a:endParaRPr lang="fr-FR" dirty="0"/>
+          </a:p>
+        </p:txBody>
+      </p:sp>
+      <p:sp>
+        <p:nvSpPr>
+          <p:cNvPr id="6" name="Slide Number Placeholder 5"/>
+          <p:cNvSpPr>
+            <a:spLocks noGrp="1"/>
+          </p:cNvSpPr>
+          <p:nvPr>
+            <p:ph type="sldNum" sz="quarter" idx="12"/>
+          </p:nvPr>
+        </p:nvSpPr>
+        <p:spPr/>
+        <p:txBody>
+          <a:bodyPr/>
+          <a:lstStyle/>
+          <a:p>
+            <a:fld id="{44139E8D-6066-4080-AC46-DB89673BFC8E}" type="slidenum">
+              <a:rPr lang="fr-FR" smtClean="0"/>
+              <a:pPr/>
+              <a:t>33</a:t>
+            </a:fld>
+            <a:endParaRPr lang="fr-FR"/>
+          </a:p>
+        </p:txBody>
+      </p:sp>
+    </p:spTree>
+    <p:extLst>
+      <p:ext uri="{BB962C8B-B14F-4D97-AF65-F5344CB8AC3E}">
+        <p14:creationId xmlns:p14="http://schemas.microsoft.com/office/powerpoint/2010/main" val="3243038628"/>
+      </p:ext>
+    </p:extLst>
+  </p:cSld>
+  <p:clrMapOvr>
+    <a:masterClrMapping/>
+  </p:clrMapOvr>
+</p:sld>
+</file>
+
+<file path=ppt/slides/slide34.xml><?xml version="1.0" encoding="utf-8"?>
+<p:sld xmlns:a="http://schemas.openxmlformats.org/drawingml/2006/main" xmlns:r="http://schemas.openxmlformats.org/officeDocument/2006/relationships" xmlns:p="http://schemas.openxmlformats.org/presentationml/2006/main">
+  <p:cSld>
+    <p:spTree>
+      <p:nvGrpSpPr>
+        <p:cNvPr id="1" name=""/>
+        <p:cNvGrpSpPr/>
+        <p:nvPr/>
+      </p:nvGrpSpPr>
+      <p:grpSpPr>
+        <a:xfrm>
+          <a:off x="0" y="0"/>
+          <a:ext cx="0" cy="0"/>
+          <a:chOff x="0" y="0"/>
+          <a:chExt cx="0" cy="0"/>
+        </a:xfrm>
+      </p:grpSpPr>
+      <p:sp>
+        <p:nvSpPr>
+          <p:cNvPr id="2" name="Title 1"/>
+          <p:cNvSpPr>
+            <a:spLocks noGrp="1"/>
+          </p:cNvSpPr>
+          <p:nvPr>
+            <p:ph type="title"/>
+          </p:nvPr>
+        </p:nvSpPr>
+        <p:spPr/>
+        <p:txBody>
+          <a:bodyPr/>
+          <a:lstStyle/>
+          <a:p>
+            <a:r>
+              <a:rPr lang="en-US" dirty="0" smtClean="0"/>
+              <a:t>Business logic</a:t>
+            </a:r>
+            <a:endParaRPr lang="fr-FR" dirty="0"/>
+          </a:p>
+        </p:txBody>
+      </p:sp>
+      <p:sp>
+        <p:nvSpPr>
+          <p:cNvPr id="3" name="Content Placeholder 2"/>
+          <p:cNvSpPr>
+            <a:spLocks noGrp="1"/>
+          </p:cNvSpPr>
+          <p:nvPr>
+            <p:ph idx="1"/>
+          </p:nvPr>
+        </p:nvSpPr>
+        <p:spPr/>
+        <p:txBody>
+          <a:bodyPr/>
+          <a:lstStyle/>
+          <a:p>
+            <a:r>
+              <a:rPr lang="en-US" dirty="0" smtClean="0"/>
+              <a:t>sources</a:t>
+            </a:r>
+          </a:p>
+          <a:p>
+            <a:pPr lvl="1">
+              <a:buClr>
+                <a:schemeClr val="tx1"/>
+              </a:buClr>
+              <a:buFont typeface="Calibri" panose="020F0502020204030204" pitchFamily="34" charset="0"/>
+              <a:buChar char="⁄"/>
+            </a:pPr>
+            <a:r>
+              <a:rPr lang="en-US" dirty="0" smtClean="0"/>
+              <a:t>…</a:t>
+            </a:r>
+          </a:p>
+          <a:p>
+            <a:pPr lvl="1">
+              <a:buClr>
+                <a:schemeClr val="tx1"/>
+              </a:buClr>
+              <a:buFont typeface="Calibri" panose="020F0502020204030204" pitchFamily="34" charset="0"/>
+              <a:buChar char="⁄"/>
+            </a:pPr>
+            <a:r>
+              <a:rPr lang="en-US" dirty="0" smtClean="0">
+                <a:solidFill>
+                  <a:schemeClr val="accent5"/>
+                </a:solidFill>
+              </a:rPr>
+              <a:t>business/</a:t>
+            </a:r>
+          </a:p>
+          <a:p>
+            <a:pPr lvl="2">
+              <a:buClr>
+                <a:schemeClr val="tx1"/>
+              </a:buClr>
+              <a:buFont typeface="Calibri" panose="020F0502020204030204" pitchFamily="34" charset="0"/>
+              <a:buChar char="⁄"/>
+            </a:pPr>
+            <a:r>
+              <a:rPr lang="en-US" dirty="0" smtClean="0">
+                <a:solidFill>
+                  <a:schemeClr val="accent5"/>
+                </a:solidFill>
+              </a:rPr>
+              <a:t>any-concept/</a:t>
+            </a:r>
+          </a:p>
+          <a:p>
+            <a:pPr lvl="3">
+              <a:buClr>
+                <a:schemeClr val="tx1"/>
+              </a:buClr>
+              <a:buFont typeface="Calibri" panose="020F0502020204030204" pitchFamily="34" charset="0"/>
+              <a:buChar char="⁄"/>
+            </a:pPr>
+            <a:r>
+              <a:rPr lang="en-US" dirty="0" smtClean="0">
+                <a:solidFill>
+                  <a:schemeClr val="accent5"/>
+                </a:solidFill>
+              </a:rPr>
+              <a:t>specs/		</a:t>
+            </a:r>
+            <a:r>
+              <a:rPr lang="en-US" dirty="0">
+                <a:solidFill>
+                  <a:schemeClr val="accent6"/>
+                </a:solidFill>
+              </a:rPr>
+              <a:t>// tests for business files, may be flat to folder or in such subfolder</a:t>
+            </a:r>
+          </a:p>
+          <a:p>
+            <a:pPr lvl="3">
+              <a:buClr>
+                <a:schemeClr val="tx1"/>
+              </a:buClr>
+              <a:buFont typeface="Calibri" panose="020F0502020204030204" pitchFamily="34" charset="0"/>
+              <a:buChar char="⁄"/>
+            </a:pPr>
+            <a:r>
+              <a:rPr lang="en-US" dirty="0" smtClean="0">
+                <a:solidFill>
+                  <a:schemeClr val="accent2"/>
+                </a:solidFill>
+              </a:rPr>
+              <a:t>actions.js		</a:t>
+            </a:r>
+            <a:r>
+              <a:rPr lang="en-US" dirty="0">
+                <a:solidFill>
+                  <a:schemeClr val="accent6"/>
+                </a:solidFill>
+              </a:rPr>
+              <a:t>// action creators (business logic operations there)</a:t>
+            </a:r>
+          </a:p>
+          <a:p>
+            <a:pPr lvl="3">
+              <a:buClr>
+                <a:schemeClr val="tx1"/>
+              </a:buClr>
+              <a:buFont typeface="Calibri" panose="020F0502020204030204" pitchFamily="34" charset="0"/>
+              <a:buChar char="⁄"/>
+            </a:pPr>
+            <a:r>
+              <a:rPr lang="en-US" dirty="0" smtClean="0">
+                <a:solidFill>
+                  <a:schemeClr val="accent2"/>
+                </a:solidFill>
+              </a:rPr>
+              <a:t>constants.js*	</a:t>
+            </a:r>
+            <a:r>
+              <a:rPr lang="en-US" dirty="0">
+                <a:solidFill>
+                  <a:schemeClr val="accent6"/>
+                </a:solidFill>
+              </a:rPr>
+              <a:t>// reusable constants (e.g. action variables)</a:t>
+            </a:r>
+          </a:p>
+          <a:p>
+            <a:pPr lvl="3">
+              <a:buClr>
+                <a:schemeClr val="tx1"/>
+              </a:buClr>
+              <a:buFont typeface="Calibri" panose="020F0502020204030204" pitchFamily="34" charset="0"/>
+              <a:buChar char="⁄"/>
+            </a:pPr>
+            <a:r>
+              <a:rPr lang="en-US" dirty="0" smtClean="0">
+                <a:solidFill>
+                  <a:schemeClr val="accent2"/>
+                </a:solidFill>
+              </a:rPr>
+              <a:t>reducers.js 		</a:t>
+            </a:r>
+            <a:r>
+              <a:rPr lang="en-US" dirty="0" smtClean="0">
+                <a:solidFill>
+                  <a:schemeClr val="accent6"/>
+                </a:solidFill>
+              </a:rPr>
+              <a:t>// reducer functions</a:t>
+            </a:r>
+            <a:endParaRPr lang="en-US" dirty="0" smtClean="0">
+              <a:solidFill>
+                <a:schemeClr val="accent2"/>
+              </a:solidFill>
+            </a:endParaRPr>
+          </a:p>
+          <a:p>
+            <a:pPr lvl="3">
+              <a:buClr>
+                <a:schemeClr val="tx1"/>
+              </a:buClr>
+              <a:buFont typeface="Calibri" panose="020F0502020204030204" pitchFamily="34" charset="0"/>
+              <a:buChar char="⁄"/>
+            </a:pPr>
+            <a:r>
+              <a:rPr lang="en-US" dirty="0" smtClean="0">
+                <a:solidFill>
+                  <a:schemeClr val="accent2"/>
+                </a:solidFill>
+              </a:rPr>
+              <a:t>sagas.js*		</a:t>
+            </a:r>
+            <a:r>
+              <a:rPr lang="en-US" dirty="0" smtClean="0">
+                <a:solidFill>
+                  <a:schemeClr val="accent6"/>
+                </a:solidFill>
+              </a:rPr>
+              <a:t>// sagas middleware operations</a:t>
+            </a:r>
+          </a:p>
+          <a:p>
+            <a:pPr lvl="3">
+              <a:buClr>
+                <a:schemeClr val="tx1"/>
+              </a:buClr>
+              <a:buFont typeface="Calibri" panose="020F0502020204030204" pitchFamily="34" charset="0"/>
+              <a:buChar char="⁄"/>
+            </a:pPr>
+            <a:r>
+              <a:rPr lang="en-US" dirty="0" smtClean="0">
+                <a:solidFill>
+                  <a:schemeClr val="accent2"/>
+                </a:solidFill>
+              </a:rPr>
+              <a:t>..middleware.js</a:t>
+            </a:r>
+            <a:r>
+              <a:rPr lang="en-US" dirty="0" smtClean="0">
+                <a:solidFill>
+                  <a:schemeClr val="accent6"/>
+                </a:solidFill>
+              </a:rPr>
+              <a:t>	// other possible middleware linked to business logic concept</a:t>
+            </a:r>
+          </a:p>
+          <a:p>
+            <a:pPr lvl="1">
+              <a:buClr>
+                <a:schemeClr val="tx1"/>
+              </a:buClr>
+              <a:buFont typeface="Calibri" panose="020F0502020204030204" pitchFamily="34" charset="0"/>
+              <a:buChar char="⁄"/>
+            </a:pPr>
+            <a:r>
+              <a:rPr lang="en-US" dirty="0" smtClean="0"/>
+              <a:t>…</a:t>
+            </a:r>
+            <a:endParaRPr lang="en-US" dirty="0"/>
+          </a:p>
+          <a:p>
+            <a:pPr lvl="3">
+              <a:buClr>
+                <a:schemeClr val="tx1"/>
+              </a:buClr>
+              <a:buFont typeface="Calibri" panose="020F0502020204030204" pitchFamily="34" charset="0"/>
+              <a:buChar char="⁄"/>
+            </a:pPr>
+            <a:endParaRPr lang="en-US" dirty="0" smtClean="0">
+              <a:solidFill>
+                <a:schemeClr val="accent2"/>
+              </a:solidFill>
+            </a:endParaRPr>
+          </a:p>
+          <a:p>
+            <a:pPr marL="0" indent="0">
+              <a:buClr>
+                <a:schemeClr val="tx1"/>
+              </a:buClr>
+              <a:buNone/>
+            </a:pPr>
+            <a:r>
+              <a:rPr lang="en-US" sz="2400" dirty="0" smtClean="0"/>
+              <a:t>Components with * are optional depending on context</a:t>
+            </a:r>
+            <a:endParaRPr lang="fr-FR" sz="2400" dirty="0"/>
+          </a:p>
+        </p:txBody>
+      </p:sp>
+      <p:sp>
+        <p:nvSpPr>
+          <p:cNvPr id="4" name="Date Placeholder 3"/>
+          <p:cNvSpPr>
+            <a:spLocks noGrp="1"/>
+          </p:cNvSpPr>
+          <p:nvPr>
+            <p:ph type="dt" sz="half" idx="10"/>
+          </p:nvPr>
+        </p:nvSpPr>
+        <p:spPr/>
+        <p:txBody>
+          <a:bodyPr/>
+          <a:lstStyle/>
+          <a:p>
+            <a:r>
+              <a:rPr lang="fr-FR" smtClean="0"/>
+              <a:t>2017</a:t>
+            </a:r>
+            <a:endParaRPr lang="fr-FR"/>
+          </a:p>
+        </p:txBody>
+      </p:sp>
+      <p:sp>
+        <p:nvSpPr>
+          <p:cNvPr id="5" name="Footer Placeholder 4"/>
+          <p:cNvSpPr>
+            <a:spLocks noGrp="1"/>
+          </p:cNvSpPr>
+          <p:nvPr>
+            <p:ph type="ftr" sz="quarter" idx="11"/>
+          </p:nvPr>
+        </p:nvSpPr>
+        <p:spPr/>
+        <p:txBody>
+          <a:bodyPr/>
+          <a:lstStyle/>
+          <a:p>
+            <a:r>
+              <a:rPr lang="fr-FR" smtClean="0"/>
+              <a:t>cedric.hartland@gmail.com</a:t>
+            </a:r>
+            <a:endParaRPr lang="fr-FR" dirty="0"/>
+          </a:p>
+        </p:txBody>
+      </p:sp>
+      <p:sp>
+        <p:nvSpPr>
+          <p:cNvPr id="6" name="Slide Number Placeholder 5"/>
+          <p:cNvSpPr>
+            <a:spLocks noGrp="1"/>
+          </p:cNvSpPr>
+          <p:nvPr>
+            <p:ph type="sldNum" sz="quarter" idx="12"/>
+          </p:nvPr>
+        </p:nvSpPr>
+        <p:spPr/>
+        <p:txBody>
+          <a:bodyPr/>
+          <a:lstStyle/>
+          <a:p>
+            <a:fld id="{44139E8D-6066-4080-AC46-DB89673BFC8E}" type="slidenum">
+              <a:rPr lang="fr-FR" smtClean="0"/>
+              <a:pPr/>
+              <a:t>34</a:t>
+            </a:fld>
+            <a:endParaRPr lang="fr-FR"/>
+          </a:p>
+        </p:txBody>
+      </p:sp>
+    </p:spTree>
+    <p:extLst>
+      <p:ext uri="{BB962C8B-B14F-4D97-AF65-F5344CB8AC3E}">
+        <p14:creationId xmlns:p14="http://schemas.microsoft.com/office/powerpoint/2010/main" val="105811837"/>
+      </p:ext>
+    </p:extLst>
+  </p:cSld>
+  <p:clrMapOvr>
+    <a:masterClrMapping/>
+  </p:clrMapOvr>
+</p:sld>
+</file>
+
+<file path=ppt/slides/slide35.xml><?xml version="1.0" encoding="utf-8"?>
+<p:sld xmlns:a="http://schemas.openxmlformats.org/drawingml/2006/main" xmlns:r="http://schemas.openxmlformats.org/officeDocument/2006/relationships" xmlns:p="http://schemas.openxmlformats.org/presentationml/2006/main">
+  <p:cSld>
+    <p:spTree>
+      <p:nvGrpSpPr>
+        <p:cNvPr id="1" name=""/>
+        <p:cNvGrpSpPr/>
+        <p:nvPr/>
+      </p:nvGrpSpPr>
+      <p:grpSpPr>
+        <a:xfrm>
+          <a:off x="0" y="0"/>
+          <a:ext cx="0" cy="0"/>
+          <a:chOff x="0" y="0"/>
+          <a:chExt cx="0" cy="0"/>
+        </a:xfrm>
+      </p:grpSpPr>
+      <p:sp>
+        <p:nvSpPr>
+          <p:cNvPr id="2" name="Title 1"/>
+          <p:cNvSpPr>
+            <a:spLocks noGrp="1"/>
+          </p:cNvSpPr>
+          <p:nvPr>
+            <p:ph type="title"/>
+          </p:nvPr>
+        </p:nvSpPr>
+        <p:spPr/>
+        <p:txBody>
+          <a:bodyPr/>
+          <a:lstStyle/>
+          <a:p>
+            <a:r>
               <a:rPr lang="en-US" noProof="0" smtClean="0"/>
               <a:t>Wait, there’s more</a:t>
             </a:r>
@@ -24430,7 +25148,7 @@
             <a:fld id="{44139E8D-6066-4080-AC46-DB89673BFC8E}" type="slidenum">
               <a:rPr lang="fr-FR" smtClean="0"/>
               <a:pPr/>
-              <a:t>33</a:t>
+              <a:t>35</a:t>
             </a:fld>
             <a:endParaRPr lang="fr-FR"/>
           </a:p>

</xml_diff>